<commit_message>
adding restore data in app dependency.
</commit_message>
<xml_diff>
--- a/Billing app.pptx
+++ b/Billing app.pptx
@@ -5,15 +5,24 @@
     <p:sldMasterId id="2147483648" r:id="rId4"/>
   </p:sldMasterIdLst>
   <p:notesMasterIdLst>
-    <p:notesMasterId r:id="rId8"/>
+    <p:notesMasterId r:id="rId17"/>
   </p:notesMasterIdLst>
   <p:handoutMasterIdLst>
-    <p:handoutMasterId r:id="rId9"/>
+    <p:handoutMasterId r:id="rId18"/>
   </p:handoutMasterIdLst>
   <p:sldIdLst>
     <p:sldId id="270" r:id="rId5"/>
     <p:sldId id="271" r:id="rId6"/>
     <p:sldId id="272" r:id="rId7"/>
+    <p:sldId id="273" r:id="rId8"/>
+    <p:sldId id="274" r:id="rId9"/>
+    <p:sldId id="275" r:id="rId10"/>
+    <p:sldId id="276" r:id="rId11"/>
+    <p:sldId id="277" r:id="rId12"/>
+    <p:sldId id="278" r:id="rId13"/>
+    <p:sldId id="279" r:id="rId14"/>
+    <p:sldId id="280" r:id="rId15"/>
+    <p:sldId id="281" r:id="rId16"/>
   </p:sldIdLst>
   <p:sldSz cx="12192000" cy="6858000"/>
   <p:notesSz cx="6858000" cy="9144000"/>
@@ -335,7 +344,7 @@
           <a:p>
             <a:fld id="{97AB3EA8-A58D-4C92-A3AB-D271CCC294C7}" type="datetimeFigureOut">
               <a:rPr lang="en-US" smtClean="0"/>
-              <a:t>8/22/2021</a:t>
+              <a:t>8/23/2021</a:t>
             </a:fld>
             <a:endParaRPr lang="en-US" dirty="0"/>
           </a:p>
@@ -512,7 +521,7 @@
           <a:p>
             <a:fld id="{0AEFB4FA-E877-413E-B608-88789D806C57}" type="datetimeFigureOut">
               <a:rPr lang="en-US" noProof="0" smtClean="0"/>
-              <a:t>8/22/2021</a:t>
+              <a:t>8/23/2021</a:t>
             </a:fld>
             <a:endParaRPr lang="en-US" noProof="0" dirty="0"/>
           </a:p>
@@ -16446,7 +16455,7 @@
           <a:p>
             <a:fld id="{D951F27F-98F9-A147-8986-34441C7B752D}" type="datetime1">
               <a:rPr lang="en-US" noProof="0" smtClean="0"/>
-              <a:t>8/22/2021</a:t>
+              <a:t>8/23/2021</a:t>
             </a:fld>
             <a:endParaRPr lang="en-US" noProof="0" dirty="0"/>
           </a:p>
@@ -16919,13 +16928,22 @@
           <a:lstStyle/>
           <a:p>
             <a:r>
-              <a:rPr lang="en-US" dirty="0"/>
+              <a:rPr lang="en-US" dirty="0">
+                <a:latin typeface="Agency FB" panose="020B0503020202020204" pitchFamily="34" charset="0"/>
+                <a:cs typeface="Dubai" panose="020B0503030403030204" pitchFamily="34" charset="-78"/>
+              </a:rPr>
               <a:t>Billing app</a:t>
             </a:r>
             <a:br>
-              <a:rPr lang="en-US" dirty="0"/>
+              <a:rPr lang="en-US" dirty="0">
+                <a:latin typeface="Abhaya Libre" panose="02000503000000000000" pitchFamily="2" charset="0"/>
+                <a:cs typeface="Abhaya Libre" panose="02000503000000000000" pitchFamily="2" charset="0"/>
+              </a:rPr>
             </a:br>
-            <a:endParaRPr lang="en-US" dirty="0"/>
+            <a:endParaRPr lang="en-US" dirty="0">
+              <a:latin typeface="Abhaya Libre" panose="02000503000000000000" pitchFamily="2" charset="0"/>
+              <a:cs typeface="Abhaya Libre" panose="02000503000000000000" pitchFamily="2" charset="0"/>
+            </a:endParaRPr>
           </a:p>
         </p:txBody>
       </p:sp>
@@ -17059,6 +17077,186 @@
     <p:extLst>
       <p:ext uri="{BB962C8B-B14F-4D97-AF65-F5344CB8AC3E}">
         <p14:creationId xmlns:p14="http://schemas.microsoft.com/office/powerpoint/2010/main" val="961730162"/>
+      </p:ext>
+    </p:extLst>
+  </p:cSld>
+  <p:clrMapOvr>
+    <a:masterClrMapping/>
+  </p:clrMapOvr>
+</p:sld>
+</file>
+
+<file path=ppt/slides/slide10.xml><?xml version="1.0" encoding="utf-8"?>
+<p:sld xmlns:a="http://schemas.openxmlformats.org/drawingml/2006/main" xmlns:r="http://schemas.openxmlformats.org/officeDocument/2006/relationships" xmlns:p="http://schemas.openxmlformats.org/presentationml/2006/main">
+  <p:cSld>
+    <p:spTree>
+      <p:nvGrpSpPr>
+        <p:cNvPr id="1" name=""/>
+        <p:cNvGrpSpPr/>
+        <p:nvPr/>
+      </p:nvGrpSpPr>
+      <p:grpSpPr>
+        <a:xfrm>
+          <a:off x="0" y="0"/>
+          <a:ext cx="0" cy="0"/>
+          <a:chOff x="0" y="0"/>
+          <a:chExt cx="0" cy="0"/>
+        </a:xfrm>
+      </p:grpSpPr>
+      <p:sp>
+        <p:nvSpPr>
+          <p:cNvPr id="3" name="Slide Number Placeholder 2">
+            <a:extLst>
+              <a:ext uri="{FF2B5EF4-FFF2-40B4-BE49-F238E27FC236}">
+                <a16:creationId xmlns:a16="http://schemas.microsoft.com/office/drawing/2014/main" id="{449377D7-CC7C-47CD-B8BE-F55004CAC5C8}"/>
+              </a:ext>
+            </a:extLst>
+          </p:cNvPr>
+          <p:cNvSpPr>
+            <a:spLocks noGrp="1"/>
+          </p:cNvSpPr>
+          <p:nvPr>
+            <p:ph type="sldNum" sz="quarter" idx="12"/>
+          </p:nvPr>
+        </p:nvSpPr>
+        <p:spPr/>
+        <p:txBody>
+          <a:bodyPr/>
+          <a:lstStyle/>
+          <a:p>
+            <a:fld id="{9EC71654-96A5-4280-94F3-931C61A9F92C}" type="slidenum">
+              <a:rPr lang="en-US" noProof="0" smtClean="0"/>
+              <a:pPr/>
+              <a:t>10</a:t>
+            </a:fld>
+            <a:endParaRPr lang="en-US" noProof="0" dirty="0"/>
+          </a:p>
+        </p:txBody>
+      </p:sp>
+    </p:spTree>
+    <p:extLst>
+      <p:ext uri="{BB962C8B-B14F-4D97-AF65-F5344CB8AC3E}">
+        <p14:creationId xmlns:p14="http://schemas.microsoft.com/office/powerpoint/2010/main" val="4269043281"/>
+      </p:ext>
+    </p:extLst>
+  </p:cSld>
+  <p:clrMapOvr>
+    <a:masterClrMapping/>
+  </p:clrMapOvr>
+</p:sld>
+</file>
+
+<file path=ppt/slides/slide11.xml><?xml version="1.0" encoding="utf-8"?>
+<p:sld xmlns:a="http://schemas.openxmlformats.org/drawingml/2006/main" xmlns:r="http://schemas.openxmlformats.org/officeDocument/2006/relationships" xmlns:p="http://schemas.openxmlformats.org/presentationml/2006/main">
+  <p:cSld>
+    <p:spTree>
+      <p:nvGrpSpPr>
+        <p:cNvPr id="1" name=""/>
+        <p:cNvGrpSpPr/>
+        <p:nvPr/>
+      </p:nvGrpSpPr>
+      <p:grpSpPr>
+        <a:xfrm>
+          <a:off x="0" y="0"/>
+          <a:ext cx="0" cy="0"/>
+          <a:chOff x="0" y="0"/>
+          <a:chExt cx="0" cy="0"/>
+        </a:xfrm>
+      </p:grpSpPr>
+      <p:sp>
+        <p:nvSpPr>
+          <p:cNvPr id="3" name="Slide Number Placeholder 2">
+            <a:extLst>
+              <a:ext uri="{FF2B5EF4-FFF2-40B4-BE49-F238E27FC236}">
+                <a16:creationId xmlns:a16="http://schemas.microsoft.com/office/drawing/2014/main" id="{449377D7-CC7C-47CD-B8BE-F55004CAC5C8}"/>
+              </a:ext>
+            </a:extLst>
+          </p:cNvPr>
+          <p:cNvSpPr>
+            <a:spLocks noGrp="1"/>
+          </p:cNvSpPr>
+          <p:nvPr>
+            <p:ph type="sldNum" sz="quarter" idx="12"/>
+          </p:nvPr>
+        </p:nvSpPr>
+        <p:spPr/>
+        <p:txBody>
+          <a:bodyPr/>
+          <a:lstStyle/>
+          <a:p>
+            <a:fld id="{9EC71654-96A5-4280-94F3-931C61A9F92C}" type="slidenum">
+              <a:rPr lang="en-US" noProof="0" smtClean="0"/>
+              <a:pPr/>
+              <a:t>11</a:t>
+            </a:fld>
+            <a:endParaRPr lang="en-US" noProof="0" dirty="0"/>
+          </a:p>
+        </p:txBody>
+      </p:sp>
+    </p:spTree>
+    <p:extLst>
+      <p:ext uri="{BB962C8B-B14F-4D97-AF65-F5344CB8AC3E}">
+        <p14:creationId xmlns:p14="http://schemas.microsoft.com/office/powerpoint/2010/main" val="2790390646"/>
+      </p:ext>
+    </p:extLst>
+  </p:cSld>
+  <p:clrMapOvr>
+    <a:masterClrMapping/>
+  </p:clrMapOvr>
+</p:sld>
+</file>
+
+<file path=ppt/slides/slide12.xml><?xml version="1.0" encoding="utf-8"?>
+<p:sld xmlns:a="http://schemas.openxmlformats.org/drawingml/2006/main" xmlns:r="http://schemas.openxmlformats.org/officeDocument/2006/relationships" xmlns:p="http://schemas.openxmlformats.org/presentationml/2006/main">
+  <p:cSld>
+    <p:spTree>
+      <p:nvGrpSpPr>
+        <p:cNvPr id="1" name=""/>
+        <p:cNvGrpSpPr/>
+        <p:nvPr/>
+      </p:nvGrpSpPr>
+      <p:grpSpPr>
+        <a:xfrm>
+          <a:off x="0" y="0"/>
+          <a:ext cx="0" cy="0"/>
+          <a:chOff x="0" y="0"/>
+          <a:chExt cx="0" cy="0"/>
+        </a:xfrm>
+      </p:grpSpPr>
+      <p:sp>
+        <p:nvSpPr>
+          <p:cNvPr id="3" name="Slide Number Placeholder 2">
+            <a:extLst>
+              <a:ext uri="{FF2B5EF4-FFF2-40B4-BE49-F238E27FC236}">
+                <a16:creationId xmlns:a16="http://schemas.microsoft.com/office/drawing/2014/main" id="{449377D7-CC7C-47CD-B8BE-F55004CAC5C8}"/>
+              </a:ext>
+            </a:extLst>
+          </p:cNvPr>
+          <p:cNvSpPr>
+            <a:spLocks noGrp="1"/>
+          </p:cNvSpPr>
+          <p:nvPr>
+            <p:ph type="sldNum" sz="quarter" idx="12"/>
+          </p:nvPr>
+        </p:nvSpPr>
+        <p:spPr/>
+        <p:txBody>
+          <a:bodyPr/>
+          <a:lstStyle/>
+          <a:p>
+            <a:fld id="{9EC71654-96A5-4280-94F3-931C61A9F92C}" type="slidenum">
+              <a:rPr lang="en-US" noProof="0" smtClean="0"/>
+              <a:pPr/>
+              <a:t>12</a:t>
+            </a:fld>
+            <a:endParaRPr lang="en-US" noProof="0" dirty="0"/>
+          </a:p>
+        </p:txBody>
+      </p:sp>
+    </p:spTree>
+    <p:extLst>
+      <p:ext uri="{BB962C8B-B14F-4D97-AF65-F5344CB8AC3E}">
+        <p14:creationId xmlns:p14="http://schemas.microsoft.com/office/powerpoint/2010/main" val="2879287872"/>
       </p:ext>
     </p:extLst>
   </p:cSld>
@@ -19012,6 +19210,38 @@
               <a:t>Costs</a:t>
             </a:r>
           </a:p>
+          <a:p>
+            <a:r>
+              <a:rPr lang="en-US" dirty="0">
+                <a:solidFill>
+                  <a:srgbClr val="E6B450"/>
+                </a:solidFill>
+                <a:latin typeface="Consolas" panose="020B0609020204030204" pitchFamily="49" charset="0"/>
+              </a:rPr>
+              <a:t>#00</a:t>
+            </a:r>
+            <a:r>
+              <a:rPr lang="en-US" b="0" dirty="0">
+                <a:solidFill>
+                  <a:srgbClr val="E6B450"/>
+                </a:solidFill>
+                <a:effectLst/>
+                <a:latin typeface="Consolas" panose="020B0609020204030204" pitchFamily="49" charset="0"/>
+              </a:rPr>
+              <a:t>FF1B5E20</a:t>
+            </a:r>
+            <a:endParaRPr lang="en-US" b="0" dirty="0">
+              <a:solidFill>
+                <a:srgbClr val="B3B1AD"/>
+              </a:solidFill>
+              <a:effectLst/>
+              <a:latin typeface="Consolas" panose="020B0609020204030204" pitchFamily="49" charset="0"/>
+            </a:endParaRPr>
+          </a:p>
+          <a:p>
+            <a:pPr algn="ctr"/>
+            <a:endParaRPr lang="en-US" dirty="0"/>
+          </a:p>
         </p:txBody>
       </p:sp>
       <p:sp>
@@ -19116,6 +19346,596 @@
     <p:extLst>
       <p:ext uri="{BB962C8B-B14F-4D97-AF65-F5344CB8AC3E}">
         <p14:creationId xmlns:p14="http://schemas.microsoft.com/office/powerpoint/2010/main" val="509408956"/>
+      </p:ext>
+    </p:extLst>
+  </p:cSld>
+  <p:clrMapOvr>
+    <a:masterClrMapping/>
+  </p:clrMapOvr>
+</p:sld>
+</file>
+
+<file path=ppt/slides/slide4.xml><?xml version="1.0" encoding="utf-8"?>
+<p:sld xmlns:a="http://schemas.openxmlformats.org/drawingml/2006/main" xmlns:r="http://schemas.openxmlformats.org/officeDocument/2006/relationships" xmlns:p="http://schemas.openxmlformats.org/presentationml/2006/main">
+  <p:cSld>
+    <p:spTree>
+      <p:nvGrpSpPr>
+        <p:cNvPr id="1" name=""/>
+        <p:cNvGrpSpPr/>
+        <p:nvPr/>
+      </p:nvGrpSpPr>
+      <p:grpSpPr>
+        <a:xfrm>
+          <a:off x="0" y="0"/>
+          <a:ext cx="0" cy="0"/>
+          <a:chOff x="0" y="0"/>
+          <a:chExt cx="0" cy="0"/>
+        </a:xfrm>
+      </p:grpSpPr>
+      <p:sp>
+        <p:nvSpPr>
+          <p:cNvPr id="3" name="Slide Number Placeholder 2">
+            <a:extLst>
+              <a:ext uri="{FF2B5EF4-FFF2-40B4-BE49-F238E27FC236}">
+                <a16:creationId xmlns:a16="http://schemas.microsoft.com/office/drawing/2014/main" id="{449377D7-CC7C-47CD-B8BE-F55004CAC5C8}"/>
+              </a:ext>
+            </a:extLst>
+          </p:cNvPr>
+          <p:cNvSpPr>
+            <a:spLocks noGrp="1"/>
+          </p:cNvSpPr>
+          <p:nvPr>
+            <p:ph type="sldNum" sz="quarter" idx="12"/>
+          </p:nvPr>
+        </p:nvSpPr>
+        <p:spPr/>
+        <p:txBody>
+          <a:bodyPr/>
+          <a:lstStyle/>
+          <a:p>
+            <a:fld id="{9EC71654-96A5-4280-94F3-931C61A9F92C}" type="slidenum">
+              <a:rPr lang="en-US" noProof="0" smtClean="0"/>
+              <a:pPr/>
+              <a:t>4</a:t>
+            </a:fld>
+            <a:endParaRPr lang="en-US" noProof="0" dirty="0"/>
+          </a:p>
+        </p:txBody>
+      </p:sp>
+      <p:sp>
+        <p:nvSpPr>
+          <p:cNvPr id="8" name="Rectangle: Rounded Corners 7">
+            <a:extLst>
+              <a:ext uri="{FF2B5EF4-FFF2-40B4-BE49-F238E27FC236}">
+                <a16:creationId xmlns:a16="http://schemas.microsoft.com/office/drawing/2014/main" id="{5BE360B0-42CB-4221-97C2-83A2FF4A79F5}"/>
+              </a:ext>
+            </a:extLst>
+          </p:cNvPr>
+          <p:cNvSpPr/>
+          <p:nvPr/>
+        </p:nvSpPr>
+        <p:spPr>
+          <a:xfrm>
+            <a:off x="3771900" y="1226820"/>
+            <a:ext cx="1912620" cy="1409700"/>
+          </a:xfrm>
+          <a:prstGeom prst="roundRect">
+            <a:avLst/>
+          </a:prstGeom>
+        </p:spPr>
+        <p:style>
+          <a:lnRef idx="2">
+            <a:schemeClr val="accent1">
+              <a:shade val="50000"/>
+            </a:schemeClr>
+          </a:lnRef>
+          <a:fillRef idx="1">
+            <a:schemeClr val="accent1"/>
+          </a:fillRef>
+          <a:effectRef idx="0">
+            <a:schemeClr val="accent1"/>
+          </a:effectRef>
+          <a:fontRef idx="minor">
+            <a:schemeClr val="lt1"/>
+          </a:fontRef>
+        </p:style>
+        <p:txBody>
+          <a:bodyPr rtlCol="0" anchor="ctr"/>
+          <a:lstStyle/>
+          <a:p>
+            <a:pPr algn="ctr"/>
+            <a:endParaRPr lang="en-US"/>
+          </a:p>
+        </p:txBody>
+      </p:sp>
+      <p:sp>
+        <p:nvSpPr>
+          <p:cNvPr id="9" name="Rectangle: Rounded Corners 8">
+            <a:extLst>
+              <a:ext uri="{FF2B5EF4-FFF2-40B4-BE49-F238E27FC236}">
+                <a16:creationId xmlns:a16="http://schemas.microsoft.com/office/drawing/2014/main" id="{6D1D72E0-68A0-42CB-A5CD-E9FBE5C666C2}"/>
+              </a:ext>
+            </a:extLst>
+          </p:cNvPr>
+          <p:cNvSpPr/>
+          <p:nvPr/>
+        </p:nvSpPr>
+        <p:spPr>
+          <a:xfrm>
+            <a:off x="5683148" y="1226820"/>
+            <a:ext cx="1912620" cy="1409700"/>
+          </a:xfrm>
+          <a:prstGeom prst="roundRect">
+            <a:avLst/>
+          </a:prstGeom>
+        </p:spPr>
+        <p:style>
+          <a:lnRef idx="2">
+            <a:schemeClr val="accent1">
+              <a:shade val="50000"/>
+            </a:schemeClr>
+          </a:lnRef>
+          <a:fillRef idx="1">
+            <a:schemeClr val="accent1"/>
+          </a:fillRef>
+          <a:effectRef idx="0">
+            <a:schemeClr val="accent1"/>
+          </a:effectRef>
+          <a:fontRef idx="minor">
+            <a:schemeClr val="lt1"/>
+          </a:fontRef>
+        </p:style>
+        <p:txBody>
+          <a:bodyPr rtlCol="0" anchor="ctr"/>
+          <a:lstStyle/>
+          <a:p>
+            <a:pPr algn="ctr"/>
+            <a:endParaRPr lang="en-US"/>
+          </a:p>
+        </p:txBody>
+      </p:sp>
+      <p:sp>
+        <p:nvSpPr>
+          <p:cNvPr id="10" name="Rectangle: Rounded Corners 9">
+            <a:extLst>
+              <a:ext uri="{FF2B5EF4-FFF2-40B4-BE49-F238E27FC236}">
+                <a16:creationId xmlns:a16="http://schemas.microsoft.com/office/drawing/2014/main" id="{3BC2E141-6F6A-4107-8952-106866C1DCD4}"/>
+              </a:ext>
+            </a:extLst>
+          </p:cNvPr>
+          <p:cNvSpPr/>
+          <p:nvPr/>
+        </p:nvSpPr>
+        <p:spPr>
+          <a:xfrm>
+            <a:off x="5681776" y="2632710"/>
+            <a:ext cx="1912620" cy="1409700"/>
+          </a:xfrm>
+          <a:prstGeom prst="roundRect">
+            <a:avLst/>
+          </a:prstGeom>
+        </p:spPr>
+        <p:style>
+          <a:lnRef idx="2">
+            <a:schemeClr val="accent1">
+              <a:shade val="50000"/>
+            </a:schemeClr>
+          </a:lnRef>
+          <a:fillRef idx="1">
+            <a:schemeClr val="accent1"/>
+          </a:fillRef>
+          <a:effectRef idx="0">
+            <a:schemeClr val="accent1"/>
+          </a:effectRef>
+          <a:fontRef idx="minor">
+            <a:schemeClr val="lt1"/>
+          </a:fontRef>
+        </p:style>
+        <p:txBody>
+          <a:bodyPr rtlCol="0" anchor="ctr"/>
+          <a:lstStyle/>
+          <a:p>
+            <a:pPr algn="ctr"/>
+            <a:endParaRPr lang="en-US"/>
+          </a:p>
+        </p:txBody>
+      </p:sp>
+      <p:sp>
+        <p:nvSpPr>
+          <p:cNvPr id="11" name="Rectangle: Rounded Corners 10">
+            <a:extLst>
+              <a:ext uri="{FF2B5EF4-FFF2-40B4-BE49-F238E27FC236}">
+                <a16:creationId xmlns:a16="http://schemas.microsoft.com/office/drawing/2014/main" id="{7D18EA8A-3ABB-447F-B013-7761FDA1087B}"/>
+              </a:ext>
+            </a:extLst>
+          </p:cNvPr>
+          <p:cNvSpPr/>
+          <p:nvPr/>
+        </p:nvSpPr>
+        <p:spPr>
+          <a:xfrm>
+            <a:off x="3769842" y="2632710"/>
+            <a:ext cx="1912620" cy="1409700"/>
+          </a:xfrm>
+          <a:prstGeom prst="roundRect">
+            <a:avLst/>
+          </a:prstGeom>
+        </p:spPr>
+        <p:style>
+          <a:lnRef idx="2">
+            <a:schemeClr val="accent1">
+              <a:shade val="50000"/>
+            </a:schemeClr>
+          </a:lnRef>
+          <a:fillRef idx="1">
+            <a:schemeClr val="accent1"/>
+          </a:fillRef>
+          <a:effectRef idx="0">
+            <a:schemeClr val="accent1"/>
+          </a:effectRef>
+          <a:fontRef idx="minor">
+            <a:schemeClr val="lt1"/>
+          </a:fontRef>
+        </p:style>
+        <p:txBody>
+          <a:bodyPr rtlCol="0" anchor="ctr"/>
+          <a:lstStyle/>
+          <a:p>
+            <a:pPr algn="ctr"/>
+            <a:endParaRPr lang="en-US"/>
+          </a:p>
+        </p:txBody>
+      </p:sp>
+      <p:sp>
+        <p:nvSpPr>
+          <p:cNvPr id="7" name="Oval 6">
+            <a:extLst>
+              <a:ext uri="{FF2B5EF4-FFF2-40B4-BE49-F238E27FC236}">
+                <a16:creationId xmlns:a16="http://schemas.microsoft.com/office/drawing/2014/main" id="{A3FCF7CC-42BA-4620-A1C9-AA99911E3D17}"/>
+              </a:ext>
+            </a:extLst>
+          </p:cNvPr>
+          <p:cNvSpPr/>
+          <p:nvPr/>
+        </p:nvSpPr>
+        <p:spPr>
+          <a:xfrm>
+            <a:off x="4869180" y="1866900"/>
+            <a:ext cx="1627936" cy="1562100"/>
+          </a:xfrm>
+          <a:prstGeom prst="ellipse">
+            <a:avLst/>
+          </a:prstGeom>
+        </p:spPr>
+        <p:style>
+          <a:lnRef idx="2">
+            <a:schemeClr val="accent1">
+              <a:shade val="50000"/>
+            </a:schemeClr>
+          </a:lnRef>
+          <a:fillRef idx="1">
+            <a:schemeClr val="accent1"/>
+          </a:fillRef>
+          <a:effectRef idx="0">
+            <a:schemeClr val="accent1"/>
+          </a:effectRef>
+          <a:fontRef idx="minor">
+            <a:schemeClr val="lt1"/>
+          </a:fontRef>
+        </p:style>
+        <p:txBody>
+          <a:bodyPr rtlCol="0" anchor="ctr"/>
+          <a:lstStyle/>
+          <a:p>
+            <a:pPr algn="ctr"/>
+            <a:endParaRPr lang="en-US"/>
+          </a:p>
+        </p:txBody>
+      </p:sp>
+    </p:spTree>
+    <p:extLst>
+      <p:ext uri="{BB962C8B-B14F-4D97-AF65-F5344CB8AC3E}">
+        <p14:creationId xmlns:p14="http://schemas.microsoft.com/office/powerpoint/2010/main" val="1055120470"/>
+      </p:ext>
+    </p:extLst>
+  </p:cSld>
+  <p:clrMapOvr>
+    <a:masterClrMapping/>
+  </p:clrMapOvr>
+</p:sld>
+</file>
+
+<file path=ppt/slides/slide5.xml><?xml version="1.0" encoding="utf-8"?>
+<p:sld xmlns:a="http://schemas.openxmlformats.org/drawingml/2006/main" xmlns:r="http://schemas.openxmlformats.org/officeDocument/2006/relationships" xmlns:p="http://schemas.openxmlformats.org/presentationml/2006/main">
+  <p:cSld>
+    <p:spTree>
+      <p:nvGrpSpPr>
+        <p:cNvPr id="1" name=""/>
+        <p:cNvGrpSpPr/>
+        <p:nvPr/>
+      </p:nvGrpSpPr>
+      <p:grpSpPr>
+        <a:xfrm>
+          <a:off x="0" y="0"/>
+          <a:ext cx="0" cy="0"/>
+          <a:chOff x="0" y="0"/>
+          <a:chExt cx="0" cy="0"/>
+        </a:xfrm>
+      </p:grpSpPr>
+      <p:sp>
+        <p:nvSpPr>
+          <p:cNvPr id="3" name="Slide Number Placeholder 2">
+            <a:extLst>
+              <a:ext uri="{FF2B5EF4-FFF2-40B4-BE49-F238E27FC236}">
+                <a16:creationId xmlns:a16="http://schemas.microsoft.com/office/drawing/2014/main" id="{449377D7-CC7C-47CD-B8BE-F55004CAC5C8}"/>
+              </a:ext>
+            </a:extLst>
+          </p:cNvPr>
+          <p:cNvSpPr>
+            <a:spLocks noGrp="1"/>
+          </p:cNvSpPr>
+          <p:nvPr>
+            <p:ph type="sldNum" sz="quarter" idx="12"/>
+          </p:nvPr>
+        </p:nvSpPr>
+        <p:spPr/>
+        <p:txBody>
+          <a:bodyPr/>
+          <a:lstStyle/>
+          <a:p>
+            <a:fld id="{9EC71654-96A5-4280-94F3-931C61A9F92C}" type="slidenum">
+              <a:rPr lang="en-US" noProof="0" smtClean="0"/>
+              <a:pPr/>
+              <a:t>5</a:t>
+            </a:fld>
+            <a:endParaRPr lang="en-US" noProof="0" dirty="0"/>
+          </a:p>
+        </p:txBody>
+      </p:sp>
+    </p:spTree>
+    <p:extLst>
+      <p:ext uri="{BB962C8B-B14F-4D97-AF65-F5344CB8AC3E}">
+        <p14:creationId xmlns:p14="http://schemas.microsoft.com/office/powerpoint/2010/main" val="4251280809"/>
+      </p:ext>
+    </p:extLst>
+  </p:cSld>
+  <p:clrMapOvr>
+    <a:masterClrMapping/>
+  </p:clrMapOvr>
+</p:sld>
+</file>
+
+<file path=ppt/slides/slide6.xml><?xml version="1.0" encoding="utf-8"?>
+<p:sld xmlns:a="http://schemas.openxmlformats.org/drawingml/2006/main" xmlns:r="http://schemas.openxmlformats.org/officeDocument/2006/relationships" xmlns:p="http://schemas.openxmlformats.org/presentationml/2006/main">
+  <p:cSld>
+    <p:spTree>
+      <p:nvGrpSpPr>
+        <p:cNvPr id="1" name=""/>
+        <p:cNvGrpSpPr/>
+        <p:nvPr/>
+      </p:nvGrpSpPr>
+      <p:grpSpPr>
+        <a:xfrm>
+          <a:off x="0" y="0"/>
+          <a:ext cx="0" cy="0"/>
+          <a:chOff x="0" y="0"/>
+          <a:chExt cx="0" cy="0"/>
+        </a:xfrm>
+      </p:grpSpPr>
+      <p:sp>
+        <p:nvSpPr>
+          <p:cNvPr id="3" name="Slide Number Placeholder 2">
+            <a:extLst>
+              <a:ext uri="{FF2B5EF4-FFF2-40B4-BE49-F238E27FC236}">
+                <a16:creationId xmlns:a16="http://schemas.microsoft.com/office/drawing/2014/main" id="{449377D7-CC7C-47CD-B8BE-F55004CAC5C8}"/>
+              </a:ext>
+            </a:extLst>
+          </p:cNvPr>
+          <p:cNvSpPr>
+            <a:spLocks noGrp="1"/>
+          </p:cNvSpPr>
+          <p:nvPr>
+            <p:ph type="sldNum" sz="quarter" idx="12"/>
+          </p:nvPr>
+        </p:nvSpPr>
+        <p:spPr/>
+        <p:txBody>
+          <a:bodyPr/>
+          <a:lstStyle/>
+          <a:p>
+            <a:fld id="{9EC71654-96A5-4280-94F3-931C61A9F92C}" type="slidenum">
+              <a:rPr lang="en-US" noProof="0" smtClean="0"/>
+              <a:pPr/>
+              <a:t>6</a:t>
+            </a:fld>
+            <a:endParaRPr lang="en-US" noProof="0" dirty="0"/>
+          </a:p>
+        </p:txBody>
+      </p:sp>
+    </p:spTree>
+    <p:extLst>
+      <p:ext uri="{BB962C8B-B14F-4D97-AF65-F5344CB8AC3E}">
+        <p14:creationId xmlns:p14="http://schemas.microsoft.com/office/powerpoint/2010/main" val="2009340712"/>
+      </p:ext>
+    </p:extLst>
+  </p:cSld>
+  <p:clrMapOvr>
+    <a:masterClrMapping/>
+  </p:clrMapOvr>
+</p:sld>
+</file>
+
+<file path=ppt/slides/slide7.xml><?xml version="1.0" encoding="utf-8"?>
+<p:sld xmlns:a="http://schemas.openxmlformats.org/drawingml/2006/main" xmlns:r="http://schemas.openxmlformats.org/officeDocument/2006/relationships" xmlns:p="http://schemas.openxmlformats.org/presentationml/2006/main">
+  <p:cSld>
+    <p:spTree>
+      <p:nvGrpSpPr>
+        <p:cNvPr id="1" name=""/>
+        <p:cNvGrpSpPr/>
+        <p:nvPr/>
+      </p:nvGrpSpPr>
+      <p:grpSpPr>
+        <a:xfrm>
+          <a:off x="0" y="0"/>
+          <a:ext cx="0" cy="0"/>
+          <a:chOff x="0" y="0"/>
+          <a:chExt cx="0" cy="0"/>
+        </a:xfrm>
+      </p:grpSpPr>
+      <p:sp>
+        <p:nvSpPr>
+          <p:cNvPr id="3" name="Slide Number Placeholder 2">
+            <a:extLst>
+              <a:ext uri="{FF2B5EF4-FFF2-40B4-BE49-F238E27FC236}">
+                <a16:creationId xmlns:a16="http://schemas.microsoft.com/office/drawing/2014/main" id="{449377D7-CC7C-47CD-B8BE-F55004CAC5C8}"/>
+              </a:ext>
+            </a:extLst>
+          </p:cNvPr>
+          <p:cNvSpPr>
+            <a:spLocks noGrp="1"/>
+          </p:cNvSpPr>
+          <p:nvPr>
+            <p:ph type="sldNum" sz="quarter" idx="12"/>
+          </p:nvPr>
+        </p:nvSpPr>
+        <p:spPr/>
+        <p:txBody>
+          <a:bodyPr/>
+          <a:lstStyle/>
+          <a:p>
+            <a:fld id="{9EC71654-96A5-4280-94F3-931C61A9F92C}" type="slidenum">
+              <a:rPr lang="en-US" noProof="0" smtClean="0"/>
+              <a:pPr/>
+              <a:t>7</a:t>
+            </a:fld>
+            <a:endParaRPr lang="en-US" noProof="0" dirty="0"/>
+          </a:p>
+        </p:txBody>
+      </p:sp>
+    </p:spTree>
+    <p:extLst>
+      <p:ext uri="{BB962C8B-B14F-4D97-AF65-F5344CB8AC3E}">
+        <p14:creationId xmlns:p14="http://schemas.microsoft.com/office/powerpoint/2010/main" val="3116939456"/>
+      </p:ext>
+    </p:extLst>
+  </p:cSld>
+  <p:clrMapOvr>
+    <a:masterClrMapping/>
+  </p:clrMapOvr>
+</p:sld>
+</file>
+
+<file path=ppt/slides/slide8.xml><?xml version="1.0" encoding="utf-8"?>
+<p:sld xmlns:a="http://schemas.openxmlformats.org/drawingml/2006/main" xmlns:r="http://schemas.openxmlformats.org/officeDocument/2006/relationships" xmlns:p="http://schemas.openxmlformats.org/presentationml/2006/main">
+  <p:cSld>
+    <p:spTree>
+      <p:nvGrpSpPr>
+        <p:cNvPr id="1" name=""/>
+        <p:cNvGrpSpPr/>
+        <p:nvPr/>
+      </p:nvGrpSpPr>
+      <p:grpSpPr>
+        <a:xfrm>
+          <a:off x="0" y="0"/>
+          <a:ext cx="0" cy="0"/>
+          <a:chOff x="0" y="0"/>
+          <a:chExt cx="0" cy="0"/>
+        </a:xfrm>
+      </p:grpSpPr>
+      <p:sp>
+        <p:nvSpPr>
+          <p:cNvPr id="3" name="Slide Number Placeholder 2">
+            <a:extLst>
+              <a:ext uri="{FF2B5EF4-FFF2-40B4-BE49-F238E27FC236}">
+                <a16:creationId xmlns:a16="http://schemas.microsoft.com/office/drawing/2014/main" id="{449377D7-CC7C-47CD-B8BE-F55004CAC5C8}"/>
+              </a:ext>
+            </a:extLst>
+          </p:cNvPr>
+          <p:cNvSpPr>
+            <a:spLocks noGrp="1"/>
+          </p:cNvSpPr>
+          <p:nvPr>
+            <p:ph type="sldNum" sz="quarter" idx="12"/>
+          </p:nvPr>
+        </p:nvSpPr>
+        <p:spPr/>
+        <p:txBody>
+          <a:bodyPr/>
+          <a:lstStyle/>
+          <a:p>
+            <a:fld id="{9EC71654-96A5-4280-94F3-931C61A9F92C}" type="slidenum">
+              <a:rPr lang="en-US" noProof="0" smtClean="0"/>
+              <a:pPr/>
+              <a:t>8</a:t>
+            </a:fld>
+            <a:endParaRPr lang="en-US" noProof="0" dirty="0"/>
+          </a:p>
+        </p:txBody>
+      </p:sp>
+    </p:spTree>
+    <p:extLst>
+      <p:ext uri="{BB962C8B-B14F-4D97-AF65-F5344CB8AC3E}">
+        <p14:creationId xmlns:p14="http://schemas.microsoft.com/office/powerpoint/2010/main" val="2318062382"/>
+      </p:ext>
+    </p:extLst>
+  </p:cSld>
+  <p:clrMapOvr>
+    <a:masterClrMapping/>
+  </p:clrMapOvr>
+</p:sld>
+</file>
+
+<file path=ppt/slides/slide9.xml><?xml version="1.0" encoding="utf-8"?>
+<p:sld xmlns:a="http://schemas.openxmlformats.org/drawingml/2006/main" xmlns:r="http://schemas.openxmlformats.org/officeDocument/2006/relationships" xmlns:p="http://schemas.openxmlformats.org/presentationml/2006/main">
+  <p:cSld>
+    <p:spTree>
+      <p:nvGrpSpPr>
+        <p:cNvPr id="1" name=""/>
+        <p:cNvGrpSpPr/>
+        <p:nvPr/>
+      </p:nvGrpSpPr>
+      <p:grpSpPr>
+        <a:xfrm>
+          <a:off x="0" y="0"/>
+          <a:ext cx="0" cy="0"/>
+          <a:chOff x="0" y="0"/>
+          <a:chExt cx="0" cy="0"/>
+        </a:xfrm>
+      </p:grpSpPr>
+      <p:sp>
+        <p:nvSpPr>
+          <p:cNvPr id="3" name="Slide Number Placeholder 2">
+            <a:extLst>
+              <a:ext uri="{FF2B5EF4-FFF2-40B4-BE49-F238E27FC236}">
+                <a16:creationId xmlns:a16="http://schemas.microsoft.com/office/drawing/2014/main" id="{449377D7-CC7C-47CD-B8BE-F55004CAC5C8}"/>
+              </a:ext>
+            </a:extLst>
+          </p:cNvPr>
+          <p:cNvSpPr>
+            <a:spLocks noGrp="1"/>
+          </p:cNvSpPr>
+          <p:nvPr>
+            <p:ph type="sldNum" sz="quarter" idx="12"/>
+          </p:nvPr>
+        </p:nvSpPr>
+        <p:spPr/>
+        <p:txBody>
+          <a:bodyPr/>
+          <a:lstStyle/>
+          <a:p>
+            <a:fld id="{9EC71654-96A5-4280-94F3-931C61A9F92C}" type="slidenum">
+              <a:rPr lang="en-US" noProof="0" smtClean="0"/>
+              <a:pPr/>
+              <a:t>9</a:t>
+            </a:fld>
+            <a:endParaRPr lang="en-US" noProof="0" dirty="0"/>
+          </a:p>
+        </p:txBody>
+      </p:sp>
+    </p:spTree>
+    <p:extLst>
+      <p:ext uri="{BB962C8B-B14F-4D97-AF65-F5344CB8AC3E}">
+        <p14:creationId xmlns:p14="http://schemas.microsoft.com/office/powerpoint/2010/main" val="3549769317"/>
       </p:ext>
     </p:extLst>
   </p:cSld>
@@ -19917,20 +20737,20 @@
 </file>
 
 <file path=customXml/item1.xml><?xml version="1.0" encoding="utf-8"?>
-<p:properties xmlns:p="http://schemas.microsoft.com/office/2006/metadata/properties" xmlns:xsi="http://www.w3.org/2001/XMLSchema-instance" xmlns:pc="http://schemas.microsoft.com/office/infopath/2007/PartnerControls">
-  <documentManagement>
-    <MediaServiceKeyPoints xmlns="71af3243-3dd4-4a8d-8c0d-dd76da1f02a5" xsi:nil="true"/>
-  </documentManagement>
-</p:properties>
-</file>
-
-<file path=customXml/item2.xml><?xml version="1.0" encoding="utf-8"?>
 <?mso-contentType ?>
 <FormTemplates xmlns="http://schemas.microsoft.com/sharepoint/v3/contenttype/forms">
   <Display>DocumentLibraryForm</Display>
   <Edit>DocumentLibraryForm</Edit>
   <New>DocumentLibraryForm</New>
 </FormTemplates>
+</file>
+
+<file path=customXml/item2.xml><?xml version="1.0" encoding="utf-8"?>
+<p:properties xmlns:p="http://schemas.microsoft.com/office/2006/metadata/properties" xmlns:xsi="http://www.w3.org/2001/XMLSchema-instance" xmlns:pc="http://schemas.microsoft.com/office/infopath/2007/PartnerControls">
+  <documentManagement>
+    <MediaServiceKeyPoints xmlns="71af3243-3dd4-4a8d-8c0d-dd76da1f02a5" xsi:nil="true"/>
+  </documentManagement>
+</p:properties>
 </file>
 
 <file path=customXml/item3.xml><?xml version="1.0" encoding="utf-8"?>
@@ -20145,19 +20965,19 @@
 </file>
 
 <file path=customXml/itemProps1.xml><?xml version="1.0" encoding="utf-8"?>
+<ds:datastoreItem xmlns:ds="http://schemas.openxmlformats.org/officeDocument/2006/customXml" ds:itemID="{B0C07E3D-60A7-4F4E-8208-D9CCD01982CB}">
+  <ds:schemaRefs>
+    <ds:schemaRef ds:uri="http://schemas.microsoft.com/sharepoint/v3/contenttype/forms"/>
+  </ds:schemaRefs>
+</ds:datastoreItem>
+</file>
+
+<file path=customXml/itemProps2.xml><?xml version="1.0" encoding="utf-8"?>
 <ds:datastoreItem xmlns:ds="http://schemas.openxmlformats.org/officeDocument/2006/customXml" ds:itemID="{CEA9B47F-3DD8-4645-81DC-B88780643C07}">
   <ds:schemaRefs>
     <ds:schemaRef ds:uri="http://schemas.microsoft.com/office/2006/metadata/properties"/>
     <ds:schemaRef ds:uri="http://schemas.microsoft.com/office/infopath/2007/PartnerControls"/>
     <ds:schemaRef ds:uri="71af3243-3dd4-4a8d-8c0d-dd76da1f02a5"/>
-  </ds:schemaRefs>
-</ds:datastoreItem>
-</file>
-
-<file path=customXml/itemProps2.xml><?xml version="1.0" encoding="utf-8"?>
-<ds:datastoreItem xmlns:ds="http://schemas.openxmlformats.org/officeDocument/2006/customXml" ds:itemID="{B0C07E3D-60A7-4F4E-8208-D9CCD01982CB}">
-  <ds:schemaRefs>
-    <ds:schemaRef ds:uri="http://schemas.microsoft.com/sharepoint/v3/contenttype/forms"/>
   </ds:schemaRefs>
 </ds:datastoreItem>
 </file>

</xml_diff>

<commit_message>
delete action for accounts, bills and turnovers.
</commit_message>
<xml_diff>
--- a/Billing app.pptx
+++ b/Billing app.pptx
@@ -185,7 +185,7 @@
     </p:extLst>
   </p:cm>
   <p:cm authorId="1" dt="2021-08-19T12:31:44.166" idx="4">
-    <p:pos x="5759" y="1751"/>
+    <p:pos x="6645" y="1192"/>
     <p:text>حساب ها(کارت های بانکی) و موجودی کنونی.</p:text>
     <p:extLst>
       <p:ext uri="{C676402C-5697-4E1C-873F-D02D1690AC5C}">
@@ -194,7 +194,7 @@
     </p:extLst>
   </p:cm>
   <p:cm authorId="1" dt="2021-08-19T12:35:29.018" idx="5">
-    <p:pos x="5633" y="1283"/>
+    <p:pos x="6566" y="1725"/>
     <p:text>نام - نام خانوادگی - شماره تلفن -ایمیل</p:text>
     <p:extLst>
       <p:ext uri="{C676402C-5697-4E1C-873F-D02D1690AC5C}">
@@ -203,7 +203,7 @@
     </p:extLst>
   </p:cm>
   <p:cm authorId="1" dt="2021-08-19T12:42:23.840" idx="7">
-    <p:pos x="5757" y="2313"/>
+    <p:pos x="6607" y="2272"/>
     <p:text>تغییرتنظیمات برنامه - ریست کردن برنامه - تغییر تم برنامه</p:text>
     <p:extLst>
       <p:ext uri="{C676402C-5697-4E1C-873F-D02D1690AC5C}">
@@ -212,7 +212,7 @@
     </p:extLst>
   </p:cm>
   <p:cm authorId="1" dt="2021-08-19T12:45:32.517" idx="8">
-    <p:pos x="6251" y="2790"/>
+    <p:pos x="6601" y="2766"/>
     <p:text>ارتباط با ما</p:text>
     <p:extLst>
       <p:ext uri="{C676402C-5697-4E1C-873F-D02D1690AC5C}">
@@ -17383,7 +17383,7 @@
         </p:nvSpPr>
         <p:spPr>
           <a:xfrm>
-            <a:off x="8446647" y="2796720"/>
+            <a:off x="9162918" y="2796719"/>
             <a:ext cx="518469" cy="235672"/>
           </a:xfrm>
           <a:prstGeom prst="roundRect">
@@ -17596,9 +17596,9 @@
           <p:nvPr/>
         </p:nvCxnSpPr>
         <p:spPr>
-          <a:xfrm>
-            <a:off x="6541571" y="2914556"/>
-            <a:ext cx="1905076" cy="0"/>
+          <a:xfrm flipV="1">
+            <a:off x="6541571" y="2914555"/>
+            <a:ext cx="2621347" cy="1"/>
           </a:xfrm>
           <a:prstGeom prst="straightConnector1">
             <a:avLst/>
@@ -17679,7 +17679,7 @@
         </p:nvSpPr>
         <p:spPr>
           <a:xfrm>
-            <a:off x="9404328" y="2796720"/>
+            <a:off x="9884849" y="1905164"/>
             <a:ext cx="518469" cy="235672"/>
           </a:xfrm>
           <a:prstGeom prst="roundRect">
@@ -17723,221 +17723,24 @@
       </p:sp>
       <p:cxnSp>
         <p:nvCxnSpPr>
-          <p:cNvPr id="26" name="Straight Arrow Connector 25">
-            <a:extLst>
-              <a:ext uri="{FF2B5EF4-FFF2-40B4-BE49-F238E27FC236}">
-                <a16:creationId xmlns:a16="http://schemas.microsoft.com/office/drawing/2014/main" id="{1618B140-5420-4719-95F6-9ED82BB20AFF}"/>
+          <p:cNvPr id="40" name="Connector: Elbow 39">
+            <a:extLst>
+              <a:ext uri="{FF2B5EF4-FFF2-40B4-BE49-F238E27FC236}">
+                <a16:creationId xmlns:a16="http://schemas.microsoft.com/office/drawing/2014/main" id="{5F70E0F6-FFE7-443C-8B36-417B7B7B435E}"/>
               </a:ext>
             </a:extLst>
           </p:cNvPr>
           <p:cNvCxnSpPr>
             <a:cxnSpLocks/>
-            <a:stCxn id="5" idx="3"/>
-            <a:endCxn id="18" idx="1"/>
+            <a:stCxn id="6" idx="1"/>
+            <a:endCxn id="94" idx="0"/>
           </p:cNvCxnSpPr>
           <p:nvPr/>
         </p:nvCxnSpPr>
         <p:spPr>
-          <a:xfrm>
-            <a:off x="8965116" y="2914556"/>
-            <a:ext cx="439212" cy="0"/>
-          </a:xfrm>
-          <a:prstGeom prst="straightConnector1">
-            <a:avLst/>
-          </a:prstGeom>
-          <a:ln>
-            <a:tailEnd type="triangle"/>
-          </a:ln>
-        </p:spPr>
-        <p:style>
-          <a:lnRef idx="1">
-            <a:schemeClr val="accent1"/>
-          </a:lnRef>
-          <a:fillRef idx="0">
-            <a:schemeClr val="accent1"/>
-          </a:fillRef>
-          <a:effectRef idx="0">
-            <a:schemeClr val="accent1"/>
-          </a:effectRef>
-          <a:fontRef idx="minor">
-            <a:schemeClr val="tx1"/>
-          </a:fontRef>
-        </p:style>
-      </p:cxnSp>
-      <p:sp>
-        <p:nvSpPr>
-          <p:cNvPr id="30" name="Rectangle: Rounded Corners 29">
-            <a:extLst>
-              <a:ext uri="{FF2B5EF4-FFF2-40B4-BE49-F238E27FC236}">
-                <a16:creationId xmlns:a16="http://schemas.microsoft.com/office/drawing/2014/main" id="{18CEFF02-A6B8-4734-BA09-7A53E9C2ACD7}"/>
-              </a:ext>
-            </a:extLst>
-          </p:cNvPr>
-          <p:cNvSpPr/>
-          <p:nvPr/>
-        </p:nvSpPr>
-        <p:spPr>
-          <a:xfrm>
-            <a:off x="6023102" y="4276829"/>
-            <a:ext cx="518469" cy="235672"/>
-          </a:xfrm>
-          <a:prstGeom prst="roundRect">
-            <a:avLst/>
-          </a:prstGeom>
-        </p:spPr>
-        <p:style>
-          <a:lnRef idx="2">
-            <a:schemeClr val="accent1">
-              <a:shade val="50000"/>
-            </a:schemeClr>
-          </a:lnRef>
-          <a:fillRef idx="1">
-            <a:schemeClr val="accent1"/>
-          </a:fillRef>
-          <a:effectRef idx="0">
-            <a:schemeClr val="accent1"/>
-          </a:effectRef>
-          <a:fontRef idx="minor">
-            <a:schemeClr val="lt1"/>
-          </a:fontRef>
-        </p:style>
-        <p:txBody>
-          <a:bodyPr rtlCol="0" anchor="ctr"/>
-          <a:lstStyle/>
-          <a:p>
-            <a:pPr algn="ctr"/>
-            <a:r>
-              <a:rPr lang="en-US" sz="600" dirty="0">
-                <a:latin typeface="Dubai" panose="020B0503030403030204" pitchFamily="34" charset="-78"/>
-                <a:cs typeface="Dubai" panose="020B0503030403030204" pitchFamily="34" charset="-78"/>
-              </a:rPr>
-              <a:t>Bills</a:t>
-            </a:r>
-            <a:endParaRPr lang="en-US" sz="3200" dirty="0">
-              <a:latin typeface="Dubai" panose="020B0503030403030204" pitchFamily="34" charset="-78"/>
-              <a:cs typeface="Dubai" panose="020B0503030403030204" pitchFamily="34" charset="-78"/>
-            </a:endParaRPr>
-          </a:p>
-        </p:txBody>
-      </p:sp>
-      <p:cxnSp>
-        <p:nvCxnSpPr>
-          <p:cNvPr id="31" name="Straight Arrow Connector 30">
-            <a:extLst>
-              <a:ext uri="{FF2B5EF4-FFF2-40B4-BE49-F238E27FC236}">
-                <a16:creationId xmlns:a16="http://schemas.microsoft.com/office/drawing/2014/main" id="{622EB767-826C-4A0F-B15D-059176100102}"/>
-              </a:ext>
-            </a:extLst>
-          </p:cNvPr>
-          <p:cNvCxnSpPr>
-            <a:cxnSpLocks/>
-            <a:stCxn id="6" idx="2"/>
-            <a:endCxn id="30" idx="0"/>
-          </p:cNvCxnSpPr>
-          <p:nvPr/>
-        </p:nvCxnSpPr>
-        <p:spPr>
-          <a:xfrm>
-            <a:off x="6282336" y="4098995"/>
-            <a:ext cx="1" cy="177834"/>
-          </a:xfrm>
-          <a:prstGeom prst="straightConnector1">
-            <a:avLst/>
-          </a:prstGeom>
-          <a:ln>
-            <a:tailEnd type="triangle"/>
-          </a:ln>
-        </p:spPr>
-        <p:style>
-          <a:lnRef idx="1">
-            <a:schemeClr val="accent1"/>
-          </a:lnRef>
-          <a:fillRef idx="0">
-            <a:schemeClr val="accent1"/>
-          </a:fillRef>
-          <a:effectRef idx="0">
-            <a:schemeClr val="accent1"/>
-          </a:effectRef>
-          <a:fontRef idx="minor">
-            <a:schemeClr val="tx1"/>
-          </a:fontRef>
-        </p:style>
-      </p:cxnSp>
-      <p:sp>
-        <p:nvSpPr>
-          <p:cNvPr id="35" name="Rectangle: Rounded Corners 34">
-            <a:extLst>
-              <a:ext uri="{FF2B5EF4-FFF2-40B4-BE49-F238E27FC236}">
-                <a16:creationId xmlns:a16="http://schemas.microsoft.com/office/drawing/2014/main" id="{E249F5C9-9F0D-4B67-83C0-3EFC77211F46}"/>
-              </a:ext>
-            </a:extLst>
-          </p:cNvPr>
-          <p:cNvSpPr/>
-          <p:nvPr/>
-        </p:nvSpPr>
-        <p:spPr>
-          <a:xfrm>
-            <a:off x="4914392" y="4276829"/>
-            <a:ext cx="518469" cy="235672"/>
-          </a:xfrm>
-          <a:prstGeom prst="roundRect">
-            <a:avLst/>
-          </a:prstGeom>
-        </p:spPr>
-        <p:style>
-          <a:lnRef idx="2">
-            <a:schemeClr val="accent1">
-              <a:shade val="50000"/>
-            </a:schemeClr>
-          </a:lnRef>
-          <a:fillRef idx="1">
-            <a:schemeClr val="accent1"/>
-          </a:fillRef>
-          <a:effectRef idx="0">
-            <a:schemeClr val="accent1"/>
-          </a:effectRef>
-          <a:fontRef idx="minor">
-            <a:schemeClr val="lt1"/>
-          </a:fontRef>
-        </p:style>
-        <p:txBody>
-          <a:bodyPr rtlCol="0" anchor="ctr"/>
-          <a:lstStyle/>
-          <a:p>
-            <a:pPr algn="ctr"/>
-            <a:r>
-              <a:rPr lang="en-US" sz="600" dirty="0">
-                <a:latin typeface="Dubai" panose="020B0503030403030204" pitchFamily="34" charset="-78"/>
-                <a:cs typeface="Dubai" panose="020B0503030403030204" pitchFamily="34" charset="-78"/>
-              </a:rPr>
-              <a:t>Incomes</a:t>
-            </a:r>
-            <a:endParaRPr lang="en-US" sz="3200" dirty="0">
-              <a:latin typeface="Dubai" panose="020B0503030403030204" pitchFamily="34" charset="-78"/>
-              <a:cs typeface="Dubai" panose="020B0503030403030204" pitchFamily="34" charset="-78"/>
-            </a:endParaRPr>
-          </a:p>
-        </p:txBody>
-      </p:sp>
-      <p:cxnSp>
-        <p:nvCxnSpPr>
-          <p:cNvPr id="40" name="Connector: Elbow 39">
-            <a:extLst>
-              <a:ext uri="{FF2B5EF4-FFF2-40B4-BE49-F238E27FC236}">
-                <a16:creationId xmlns:a16="http://schemas.microsoft.com/office/drawing/2014/main" id="{5F70E0F6-FFE7-443C-8B36-417B7B7B435E}"/>
-              </a:ext>
-            </a:extLst>
-          </p:cNvPr>
-          <p:cNvCxnSpPr>
-            <a:stCxn id="6" idx="1"/>
-            <a:endCxn id="35" idx="0"/>
-          </p:cNvCxnSpPr>
-          <p:nvPr/>
-        </p:nvCxnSpPr>
-        <p:spPr>
           <a:xfrm rot="10800000" flipV="1">
-            <a:off x="5173627" y="3981159"/>
-            <a:ext cx="849474" cy="295670"/>
+            <a:off x="3428125" y="3981159"/>
+            <a:ext cx="2594977" cy="287838"/>
           </a:xfrm>
           <a:prstGeom prst="bentConnector2">
             <a:avLst/>
@@ -17973,14 +17776,14 @@
           <p:cNvCxnSpPr>
             <a:cxnSpLocks/>
             <a:stCxn id="6" idx="3"/>
-            <a:endCxn id="44" idx="0"/>
+            <a:endCxn id="128" idx="0"/>
           </p:cNvCxnSpPr>
           <p:nvPr/>
         </p:nvCxnSpPr>
         <p:spPr>
           <a:xfrm>
             <a:off x="6541570" y="3981159"/>
-            <a:ext cx="849477" cy="295670"/>
+            <a:ext cx="1306800" cy="311369"/>
           </a:xfrm>
           <a:prstGeom prst="bentConnector2">
             <a:avLst/>
@@ -18006,10 +17809,10 @@
       </p:cxnSp>
       <p:sp>
         <p:nvSpPr>
-          <p:cNvPr id="44" name="Rectangle: Rounded Corners 43">
-            <a:extLst>
-              <a:ext uri="{FF2B5EF4-FFF2-40B4-BE49-F238E27FC236}">
-                <a16:creationId xmlns:a16="http://schemas.microsoft.com/office/drawing/2014/main" id="{0A640D2B-63F4-4D11-9C2F-D3C1198A70F1}"/>
+          <p:cNvPr id="46" name="Rectangle: Rounded Corners 45">
+            <a:extLst>
+              <a:ext uri="{FF2B5EF4-FFF2-40B4-BE49-F238E27FC236}">
+                <a16:creationId xmlns:a16="http://schemas.microsoft.com/office/drawing/2014/main" id="{A2E91EEF-FC8E-43F3-B4C0-164D7255912D}"/>
               </a:ext>
             </a:extLst>
           </p:cNvPr>
@@ -18018,63 +17821,7 @@
         </p:nvSpPr>
         <p:spPr>
           <a:xfrm>
-            <a:off x="7131812" y="4276829"/>
-            <a:ext cx="518469" cy="235672"/>
-          </a:xfrm>
-          <a:prstGeom prst="roundRect">
-            <a:avLst/>
-          </a:prstGeom>
-        </p:spPr>
-        <p:style>
-          <a:lnRef idx="2">
-            <a:schemeClr val="accent1">
-              <a:shade val="50000"/>
-            </a:schemeClr>
-          </a:lnRef>
-          <a:fillRef idx="1">
-            <a:schemeClr val="accent1"/>
-          </a:fillRef>
-          <a:effectRef idx="0">
-            <a:schemeClr val="accent1"/>
-          </a:effectRef>
-          <a:fontRef idx="minor">
-            <a:schemeClr val="lt1"/>
-          </a:fontRef>
-        </p:style>
-        <p:txBody>
-          <a:bodyPr rtlCol="0" anchor="ctr"/>
-          <a:lstStyle/>
-          <a:p>
-            <a:pPr algn="ctr"/>
-            <a:r>
-              <a:rPr lang="en-US" sz="600" dirty="0">
-                <a:latin typeface="Dubai" panose="020B0503030403030204" pitchFamily="34" charset="-78"/>
-                <a:cs typeface="Dubai" panose="020B0503030403030204" pitchFamily="34" charset="-78"/>
-              </a:rPr>
-              <a:t>Costs</a:t>
-            </a:r>
-            <a:endParaRPr lang="en-US" sz="3200" dirty="0">
-              <a:latin typeface="Dubai" panose="020B0503030403030204" pitchFamily="34" charset="-78"/>
-              <a:cs typeface="Dubai" panose="020B0503030403030204" pitchFamily="34" charset="-78"/>
-            </a:endParaRPr>
-          </a:p>
-        </p:txBody>
-      </p:sp>
-      <p:sp>
-        <p:nvSpPr>
-          <p:cNvPr id="46" name="Rectangle: Rounded Corners 45">
-            <a:extLst>
-              <a:ext uri="{FF2B5EF4-FFF2-40B4-BE49-F238E27FC236}">
-                <a16:creationId xmlns:a16="http://schemas.microsoft.com/office/drawing/2014/main" id="{A2E91EEF-FC8E-43F3-B4C0-164D7255912D}"/>
-              </a:ext>
-            </a:extLst>
-          </p:cNvPr>
-          <p:cNvSpPr/>
-          <p:nvPr/>
-        </p:nvSpPr>
-        <p:spPr>
-          <a:xfrm>
-            <a:off x="9404327" y="1921598"/>
+            <a:off x="9884849" y="2797299"/>
             <a:ext cx="518469" cy="235672"/>
           </a:xfrm>
           <a:prstGeom prst="roundRect">
@@ -18128,14 +17875,14 @@
           <p:cNvCxnSpPr>
             <a:cxnSpLocks/>
             <a:stCxn id="5" idx="0"/>
-            <a:endCxn id="46" idx="1"/>
+            <a:endCxn id="18" idx="1"/>
           </p:cNvCxnSpPr>
           <p:nvPr/>
         </p:nvCxnSpPr>
         <p:spPr>
           <a:xfrm rot="5400000" flipH="1" flipV="1">
-            <a:off x="8676461" y="2068855"/>
-            <a:ext cx="757286" cy="698445"/>
+            <a:off x="9266642" y="2178512"/>
+            <a:ext cx="773719" cy="462696"/>
           </a:xfrm>
           <a:prstGeom prst="bentConnector2">
             <a:avLst/>
@@ -18173,7 +17920,7 @@
         </p:nvSpPr>
         <p:spPr>
           <a:xfrm>
-            <a:off x="9404327" y="3671842"/>
+            <a:off x="9884852" y="3655412"/>
             <a:ext cx="518469" cy="235672"/>
           </a:xfrm>
           <a:prstGeom prst="roundRect">
@@ -18233,8 +17980,8 @@
         </p:nvCxnSpPr>
         <p:spPr>
           <a:xfrm rot="16200000" flipH="1">
-            <a:off x="8676461" y="3061812"/>
-            <a:ext cx="757286" cy="698445"/>
+            <a:off x="9283074" y="3171469"/>
+            <a:ext cx="740857" cy="462699"/>
           </a:xfrm>
           <a:prstGeom prst="bentConnector2">
             <a:avLst/>
@@ -18272,7 +18019,7 @@
         </p:nvSpPr>
         <p:spPr>
           <a:xfrm>
-            <a:off x="9404326" y="4429128"/>
+            <a:off x="9884851" y="4412698"/>
             <a:ext cx="518469" cy="235672"/>
           </a:xfrm>
           <a:prstGeom prst="roundRect">
@@ -18332,8 +18079,8 @@
         </p:nvCxnSpPr>
         <p:spPr>
           <a:xfrm rot="16200000" flipH="1">
-            <a:off x="8297818" y="3440456"/>
-            <a:ext cx="1514572" cy="698444"/>
+            <a:off x="8904431" y="3550113"/>
+            <a:ext cx="1498143" cy="462698"/>
           </a:xfrm>
           <a:prstGeom prst="bentConnector2">
             <a:avLst/>
@@ -18371,7 +18118,7 @@
         </p:nvSpPr>
         <p:spPr>
           <a:xfrm>
-            <a:off x="3805682" y="4276829"/>
+            <a:off x="961854" y="4270731"/>
             <a:ext cx="518469" cy="235672"/>
           </a:xfrm>
           <a:prstGeom prst="roundRect">
@@ -18431,8 +18178,8 @@
         </p:nvCxnSpPr>
         <p:spPr>
           <a:xfrm rot="10800000" flipV="1">
-            <a:off x="4064917" y="3981159"/>
-            <a:ext cx="1958184" cy="295670"/>
+            <a:off x="1221089" y="3981159"/>
+            <a:ext cx="4802012" cy="289572"/>
           </a:xfrm>
           <a:prstGeom prst="bentConnector2">
             <a:avLst/>
@@ -18623,8 +18370,8 @@
         </p:nvSpPr>
         <p:spPr>
           <a:xfrm>
-            <a:off x="3640179" y="4813960"/>
-            <a:ext cx="849476" cy="235667"/>
+            <a:off x="157602" y="5059081"/>
+            <a:ext cx="424737" cy="176256"/>
           </a:xfrm>
           <a:prstGeom prst="roundRect">
             <a:avLst/>
@@ -18656,7 +18403,7 @@
                 <a:latin typeface="Dubai" panose="020B0503030403030204" pitchFamily="34" charset="-78"/>
                 <a:cs typeface="Dubai" panose="020B0503030403030204" pitchFamily="34" charset="-78"/>
               </a:rPr>
-              <a:t> custom CRUD list</a:t>
+              <a:t>create</a:t>
             </a:r>
             <a:endParaRPr lang="en-US" sz="3200" dirty="0">
               <a:latin typeface="Dubai" panose="020B0503030403030204" pitchFamily="34" charset="-78"/>
@@ -18667,10 +18414,10 @@
       </p:sp>
       <p:sp>
         <p:nvSpPr>
-          <p:cNvPr id="33" name="Rectangle: Rounded Corners 32">
-            <a:extLst>
-              <a:ext uri="{FF2B5EF4-FFF2-40B4-BE49-F238E27FC236}">
-                <a16:creationId xmlns:a16="http://schemas.microsoft.com/office/drawing/2014/main" id="{3B7DD860-9337-4BA3-97D0-4323C8835EA0}"/>
+          <p:cNvPr id="38" name="Rectangle: Rounded Corners 37">
+            <a:extLst>
+              <a:ext uri="{FF2B5EF4-FFF2-40B4-BE49-F238E27FC236}">
+                <a16:creationId xmlns:a16="http://schemas.microsoft.com/office/drawing/2014/main" id="{818109E8-B309-4FAE-9548-EC8FE39C456C}"/>
               </a:ext>
             </a:extLst>
           </p:cNvPr>
@@ -18679,347 +18426,7 @@
         </p:nvSpPr>
         <p:spPr>
           <a:xfrm>
-            <a:off x="4748890" y="4813960"/>
-            <a:ext cx="849476" cy="235667"/>
-          </a:xfrm>
-          <a:prstGeom prst="roundRect">
-            <a:avLst/>
-          </a:prstGeom>
-        </p:spPr>
-        <p:style>
-          <a:lnRef idx="2">
-            <a:schemeClr val="accent1">
-              <a:shade val="50000"/>
-            </a:schemeClr>
-          </a:lnRef>
-          <a:fillRef idx="1">
-            <a:schemeClr val="accent1"/>
-          </a:fillRef>
-          <a:effectRef idx="0">
-            <a:schemeClr val="accent1"/>
-          </a:effectRef>
-          <a:fontRef idx="minor">
-            <a:schemeClr val="lt1"/>
-          </a:fontRef>
-        </p:style>
-        <p:txBody>
-          <a:bodyPr rtlCol="0" anchor="ctr"/>
-          <a:lstStyle/>
-          <a:p>
-            <a:pPr algn="ctr"/>
-            <a:r>
-              <a:rPr lang="en-US" sz="600" dirty="0">
-                <a:latin typeface="Dubai" panose="020B0503030403030204" pitchFamily="34" charset="-78"/>
-                <a:cs typeface="Dubai" panose="020B0503030403030204" pitchFamily="34" charset="-78"/>
-              </a:rPr>
-              <a:t> custom CRUD list</a:t>
-            </a:r>
-            <a:endParaRPr lang="en-US" sz="3200" dirty="0">
-              <a:latin typeface="Dubai" panose="020B0503030403030204" pitchFamily="34" charset="-78"/>
-              <a:cs typeface="Dubai" panose="020B0503030403030204" pitchFamily="34" charset="-78"/>
-            </a:endParaRPr>
-          </a:p>
-        </p:txBody>
-      </p:sp>
-      <p:sp>
-        <p:nvSpPr>
-          <p:cNvPr id="34" name="Rectangle: Rounded Corners 33">
-            <a:extLst>
-              <a:ext uri="{FF2B5EF4-FFF2-40B4-BE49-F238E27FC236}">
-                <a16:creationId xmlns:a16="http://schemas.microsoft.com/office/drawing/2014/main" id="{35F63D83-BCA5-4B75-B620-C8BE44D6242A}"/>
-              </a:ext>
-            </a:extLst>
-          </p:cNvPr>
-          <p:cNvSpPr/>
-          <p:nvPr/>
-        </p:nvSpPr>
-        <p:spPr>
-          <a:xfrm>
-            <a:off x="5857599" y="4813960"/>
-            <a:ext cx="849476" cy="235667"/>
-          </a:xfrm>
-          <a:prstGeom prst="roundRect">
-            <a:avLst/>
-          </a:prstGeom>
-        </p:spPr>
-        <p:style>
-          <a:lnRef idx="2">
-            <a:schemeClr val="accent1">
-              <a:shade val="50000"/>
-            </a:schemeClr>
-          </a:lnRef>
-          <a:fillRef idx="1">
-            <a:schemeClr val="accent1"/>
-          </a:fillRef>
-          <a:effectRef idx="0">
-            <a:schemeClr val="accent1"/>
-          </a:effectRef>
-          <a:fontRef idx="minor">
-            <a:schemeClr val="lt1"/>
-          </a:fontRef>
-        </p:style>
-        <p:txBody>
-          <a:bodyPr rtlCol="0" anchor="ctr"/>
-          <a:lstStyle/>
-          <a:p>
-            <a:pPr algn="ctr"/>
-            <a:r>
-              <a:rPr lang="en-US" sz="600" dirty="0">
-                <a:latin typeface="Dubai" panose="020B0503030403030204" pitchFamily="34" charset="-78"/>
-                <a:cs typeface="Dubai" panose="020B0503030403030204" pitchFamily="34" charset="-78"/>
-              </a:rPr>
-              <a:t> custom CRUD list</a:t>
-            </a:r>
-            <a:endParaRPr lang="en-US" sz="3200" dirty="0">
-              <a:latin typeface="Dubai" panose="020B0503030403030204" pitchFamily="34" charset="-78"/>
-              <a:cs typeface="Dubai" panose="020B0503030403030204" pitchFamily="34" charset="-78"/>
-            </a:endParaRPr>
-          </a:p>
-        </p:txBody>
-      </p:sp>
-      <p:sp>
-        <p:nvSpPr>
-          <p:cNvPr id="36" name="Rectangle: Rounded Corners 35">
-            <a:extLst>
-              <a:ext uri="{FF2B5EF4-FFF2-40B4-BE49-F238E27FC236}">
-                <a16:creationId xmlns:a16="http://schemas.microsoft.com/office/drawing/2014/main" id="{09107A86-6662-4573-9C4E-519BE8FC6879}"/>
-              </a:ext>
-            </a:extLst>
-          </p:cNvPr>
-          <p:cNvSpPr/>
-          <p:nvPr/>
-        </p:nvSpPr>
-        <p:spPr>
-          <a:xfrm>
-            <a:off x="6966308" y="4813960"/>
-            <a:ext cx="849476" cy="235667"/>
-          </a:xfrm>
-          <a:prstGeom prst="roundRect">
-            <a:avLst/>
-          </a:prstGeom>
-        </p:spPr>
-        <p:style>
-          <a:lnRef idx="2">
-            <a:schemeClr val="accent1">
-              <a:shade val="50000"/>
-            </a:schemeClr>
-          </a:lnRef>
-          <a:fillRef idx="1">
-            <a:schemeClr val="accent1"/>
-          </a:fillRef>
-          <a:effectRef idx="0">
-            <a:schemeClr val="accent1"/>
-          </a:effectRef>
-          <a:fontRef idx="minor">
-            <a:schemeClr val="lt1"/>
-          </a:fontRef>
-        </p:style>
-        <p:txBody>
-          <a:bodyPr rtlCol="0" anchor="ctr"/>
-          <a:lstStyle/>
-          <a:p>
-            <a:pPr algn="ctr"/>
-            <a:r>
-              <a:rPr lang="en-US" sz="600" dirty="0">
-                <a:latin typeface="Dubai" panose="020B0503030403030204" pitchFamily="34" charset="-78"/>
-                <a:cs typeface="Dubai" panose="020B0503030403030204" pitchFamily="34" charset="-78"/>
-              </a:rPr>
-              <a:t> custom CRUD list</a:t>
-            </a:r>
-            <a:endParaRPr lang="en-US" sz="3200" dirty="0">
-              <a:latin typeface="Dubai" panose="020B0503030403030204" pitchFamily="34" charset="-78"/>
-              <a:cs typeface="Dubai" panose="020B0503030403030204" pitchFamily="34" charset="-78"/>
-            </a:endParaRPr>
-          </a:p>
-        </p:txBody>
-      </p:sp>
-      <p:cxnSp>
-        <p:nvCxnSpPr>
-          <p:cNvPr id="12" name="Straight Arrow Connector 11">
-            <a:extLst>
-              <a:ext uri="{FF2B5EF4-FFF2-40B4-BE49-F238E27FC236}">
-                <a16:creationId xmlns:a16="http://schemas.microsoft.com/office/drawing/2014/main" id="{990A8555-026A-4E5F-8CA5-B8E71FFA6BEA}"/>
-              </a:ext>
-            </a:extLst>
-          </p:cNvPr>
-          <p:cNvCxnSpPr>
-            <a:cxnSpLocks/>
-            <a:stCxn id="65" idx="2"/>
-            <a:endCxn id="32" idx="0"/>
-          </p:cNvCxnSpPr>
-          <p:nvPr/>
-        </p:nvCxnSpPr>
-        <p:spPr>
-          <a:xfrm>
-            <a:off x="4064917" y="4512501"/>
-            <a:ext cx="0" cy="301459"/>
-          </a:xfrm>
-          <a:prstGeom prst="straightConnector1">
-            <a:avLst/>
-          </a:prstGeom>
-          <a:ln>
-            <a:tailEnd type="triangle"/>
-          </a:ln>
-        </p:spPr>
-        <p:style>
-          <a:lnRef idx="1">
-            <a:schemeClr val="accent1"/>
-          </a:lnRef>
-          <a:fillRef idx="0">
-            <a:schemeClr val="accent1"/>
-          </a:fillRef>
-          <a:effectRef idx="0">
-            <a:schemeClr val="accent1"/>
-          </a:effectRef>
-          <a:fontRef idx="minor">
-            <a:schemeClr val="tx1"/>
-          </a:fontRef>
-        </p:style>
-      </p:cxnSp>
-      <p:cxnSp>
-        <p:nvCxnSpPr>
-          <p:cNvPr id="37" name="Straight Arrow Connector 36">
-            <a:extLst>
-              <a:ext uri="{FF2B5EF4-FFF2-40B4-BE49-F238E27FC236}">
-                <a16:creationId xmlns:a16="http://schemas.microsoft.com/office/drawing/2014/main" id="{B2C18AD9-F2F0-400E-916D-943504EA35EF}"/>
-              </a:ext>
-            </a:extLst>
-          </p:cNvPr>
-          <p:cNvCxnSpPr>
-            <a:cxnSpLocks/>
-            <a:stCxn id="35" idx="2"/>
-            <a:endCxn id="33" idx="0"/>
-          </p:cNvCxnSpPr>
-          <p:nvPr/>
-        </p:nvCxnSpPr>
-        <p:spPr>
-          <a:xfrm>
-            <a:off x="5173627" y="4512501"/>
-            <a:ext cx="1" cy="301459"/>
-          </a:xfrm>
-          <a:prstGeom prst="straightConnector1">
-            <a:avLst/>
-          </a:prstGeom>
-          <a:ln>
-            <a:tailEnd type="triangle"/>
-          </a:ln>
-        </p:spPr>
-        <p:style>
-          <a:lnRef idx="1">
-            <a:schemeClr val="accent1"/>
-          </a:lnRef>
-          <a:fillRef idx="0">
-            <a:schemeClr val="accent1"/>
-          </a:fillRef>
-          <a:effectRef idx="0">
-            <a:schemeClr val="accent1"/>
-          </a:effectRef>
-          <a:fontRef idx="minor">
-            <a:schemeClr val="tx1"/>
-          </a:fontRef>
-        </p:style>
-      </p:cxnSp>
-      <p:cxnSp>
-        <p:nvCxnSpPr>
-          <p:cNvPr id="42" name="Straight Arrow Connector 41">
-            <a:extLst>
-              <a:ext uri="{FF2B5EF4-FFF2-40B4-BE49-F238E27FC236}">
-                <a16:creationId xmlns:a16="http://schemas.microsoft.com/office/drawing/2014/main" id="{19D678CE-D73B-4C45-8FB9-8B27C6A14D7E}"/>
-              </a:ext>
-            </a:extLst>
-          </p:cNvPr>
-          <p:cNvCxnSpPr>
-            <a:cxnSpLocks/>
-            <a:stCxn id="30" idx="2"/>
-            <a:endCxn id="34" idx="0"/>
-          </p:cNvCxnSpPr>
-          <p:nvPr/>
-        </p:nvCxnSpPr>
-        <p:spPr>
-          <a:xfrm>
-            <a:off x="6282337" y="4512501"/>
-            <a:ext cx="0" cy="301459"/>
-          </a:xfrm>
-          <a:prstGeom prst="straightConnector1">
-            <a:avLst/>
-          </a:prstGeom>
-          <a:ln>
-            <a:tailEnd type="triangle"/>
-          </a:ln>
-        </p:spPr>
-        <p:style>
-          <a:lnRef idx="1">
-            <a:schemeClr val="accent1"/>
-          </a:lnRef>
-          <a:fillRef idx="0">
-            <a:schemeClr val="accent1"/>
-          </a:fillRef>
-          <a:effectRef idx="0">
-            <a:schemeClr val="accent1"/>
-          </a:effectRef>
-          <a:fontRef idx="minor">
-            <a:schemeClr val="tx1"/>
-          </a:fontRef>
-        </p:style>
-      </p:cxnSp>
-      <p:cxnSp>
-        <p:nvCxnSpPr>
-          <p:cNvPr id="43" name="Straight Arrow Connector 42">
-            <a:extLst>
-              <a:ext uri="{FF2B5EF4-FFF2-40B4-BE49-F238E27FC236}">
-                <a16:creationId xmlns:a16="http://schemas.microsoft.com/office/drawing/2014/main" id="{F3B7CA3C-6D71-4992-B8CF-941D0ECBEEBE}"/>
-              </a:ext>
-            </a:extLst>
-          </p:cNvPr>
-          <p:cNvCxnSpPr>
-            <a:cxnSpLocks/>
-            <a:stCxn id="44" idx="2"/>
-            <a:endCxn id="36" idx="0"/>
-          </p:cNvCxnSpPr>
-          <p:nvPr/>
-        </p:nvCxnSpPr>
-        <p:spPr>
-          <a:xfrm flipH="1">
-            <a:off x="7391046" y="4512501"/>
-            <a:ext cx="1" cy="301459"/>
-          </a:xfrm>
-          <a:prstGeom prst="straightConnector1">
-            <a:avLst/>
-          </a:prstGeom>
-          <a:ln>
-            <a:tailEnd type="triangle"/>
-          </a:ln>
-        </p:spPr>
-        <p:style>
-          <a:lnRef idx="1">
-            <a:schemeClr val="accent1"/>
-          </a:lnRef>
-          <a:fillRef idx="0">
-            <a:schemeClr val="accent1"/>
-          </a:fillRef>
-          <a:effectRef idx="0">
-            <a:schemeClr val="accent1"/>
-          </a:effectRef>
-          <a:fontRef idx="minor">
-            <a:schemeClr val="tx1"/>
-          </a:fontRef>
-        </p:style>
-      </p:cxnSp>
-      <p:sp>
-        <p:nvSpPr>
-          <p:cNvPr id="38" name="Rectangle: Rounded Corners 37">
-            <a:extLst>
-              <a:ext uri="{FF2B5EF4-FFF2-40B4-BE49-F238E27FC236}">
-                <a16:creationId xmlns:a16="http://schemas.microsoft.com/office/drawing/2014/main" id="{818109E8-B309-4FAE-9548-EC8FE39C456C}"/>
-              </a:ext>
-            </a:extLst>
-          </p:cNvPr>
-          <p:cNvSpPr/>
-          <p:nvPr/>
-        </p:nvSpPr>
-        <p:spPr>
-          <a:xfrm>
-            <a:off x="9404325" y="5243169"/>
+            <a:off x="9884850" y="5226739"/>
             <a:ext cx="518469" cy="235672"/>
           </a:xfrm>
           <a:prstGeom prst="roundRect">
@@ -19089,8 +18496,8 @@
         </p:nvCxnSpPr>
         <p:spPr>
           <a:xfrm rot="16200000" flipH="1">
-            <a:off x="7890797" y="3847476"/>
-            <a:ext cx="2328613" cy="698443"/>
+            <a:off x="8497409" y="3957134"/>
+            <a:ext cx="2312184" cy="462697"/>
           </a:xfrm>
           <a:prstGeom prst="bentConnector2">
             <a:avLst/>
@@ -19114,6 +18521,3052 @@
           </a:fontRef>
         </p:style>
       </p:cxnSp>
+      <p:cxnSp>
+        <p:nvCxnSpPr>
+          <p:cNvPr id="48" name="Straight Arrow Connector 47">
+            <a:extLst>
+              <a:ext uri="{FF2B5EF4-FFF2-40B4-BE49-F238E27FC236}">
+                <a16:creationId xmlns:a16="http://schemas.microsoft.com/office/drawing/2014/main" id="{B24F7463-7FA6-4AE0-9485-253474A7474C}"/>
+              </a:ext>
+            </a:extLst>
+          </p:cNvPr>
+          <p:cNvCxnSpPr>
+            <a:cxnSpLocks/>
+            <a:stCxn id="4" idx="3"/>
+            <a:endCxn id="50" idx="1"/>
+          </p:cNvCxnSpPr>
+          <p:nvPr/>
+        </p:nvCxnSpPr>
+        <p:spPr>
+          <a:xfrm>
+            <a:off x="6541571" y="2914556"/>
+            <a:ext cx="3343281" cy="858692"/>
+          </a:xfrm>
+          <a:prstGeom prst="straightConnector1">
+            <a:avLst/>
+          </a:prstGeom>
+          <a:ln>
+            <a:tailEnd type="triangle"/>
+          </a:ln>
+        </p:spPr>
+        <p:style>
+          <a:lnRef idx="1">
+            <a:schemeClr val="accent1"/>
+          </a:lnRef>
+          <a:fillRef idx="0">
+            <a:schemeClr val="accent1"/>
+          </a:fillRef>
+          <a:effectRef idx="0">
+            <a:schemeClr val="accent1"/>
+          </a:effectRef>
+          <a:fontRef idx="minor">
+            <a:schemeClr val="tx1"/>
+          </a:fontRef>
+        </p:style>
+      </p:cxnSp>
+      <p:cxnSp>
+        <p:nvCxnSpPr>
+          <p:cNvPr id="52" name="Straight Arrow Connector 51">
+            <a:extLst>
+              <a:ext uri="{FF2B5EF4-FFF2-40B4-BE49-F238E27FC236}">
+                <a16:creationId xmlns:a16="http://schemas.microsoft.com/office/drawing/2014/main" id="{E1BE5876-EF03-428E-B83C-B23A8C2EA582}"/>
+              </a:ext>
+            </a:extLst>
+          </p:cNvPr>
+          <p:cNvCxnSpPr>
+            <a:cxnSpLocks/>
+            <a:stCxn id="4" idx="3"/>
+            <a:endCxn id="18" idx="1"/>
+          </p:cNvCxnSpPr>
+          <p:nvPr/>
+        </p:nvCxnSpPr>
+        <p:spPr>
+          <a:xfrm flipV="1">
+            <a:off x="6541571" y="2023000"/>
+            <a:ext cx="3343278" cy="891556"/>
+          </a:xfrm>
+          <a:prstGeom prst="straightConnector1">
+            <a:avLst/>
+          </a:prstGeom>
+          <a:ln>
+            <a:tailEnd type="triangle"/>
+          </a:ln>
+        </p:spPr>
+        <p:style>
+          <a:lnRef idx="1">
+            <a:schemeClr val="accent1"/>
+          </a:lnRef>
+          <a:fillRef idx="0">
+            <a:schemeClr val="accent1"/>
+          </a:fillRef>
+          <a:effectRef idx="0">
+            <a:schemeClr val="accent1"/>
+          </a:effectRef>
+          <a:fontRef idx="minor">
+            <a:schemeClr val="tx1"/>
+          </a:fontRef>
+        </p:style>
+      </p:cxnSp>
+      <p:sp>
+        <p:nvSpPr>
+          <p:cNvPr id="56" name="Star: 5 Points 55">
+            <a:extLst>
+              <a:ext uri="{FF2B5EF4-FFF2-40B4-BE49-F238E27FC236}">
+                <a16:creationId xmlns:a16="http://schemas.microsoft.com/office/drawing/2014/main" id="{75B4D567-BCC8-4DC6-81E6-561F3FB93421}"/>
+              </a:ext>
+            </a:extLst>
+          </p:cNvPr>
+          <p:cNvSpPr/>
+          <p:nvPr/>
+        </p:nvSpPr>
+        <p:spPr>
+          <a:xfrm>
+            <a:off x="537422" y="410519"/>
+            <a:ext cx="240127" cy="237401"/>
+          </a:xfrm>
+          <a:prstGeom prst="star5">
+            <a:avLst/>
+          </a:prstGeom>
+          <a:solidFill>
+            <a:srgbClr val="FF0000"/>
+          </a:solidFill>
+        </p:spPr>
+        <p:style>
+          <a:lnRef idx="0">
+            <a:schemeClr val="accent6"/>
+          </a:lnRef>
+          <a:fillRef idx="3">
+            <a:schemeClr val="accent6"/>
+          </a:fillRef>
+          <a:effectRef idx="3">
+            <a:schemeClr val="accent6"/>
+          </a:effectRef>
+          <a:fontRef idx="minor">
+            <a:schemeClr val="lt1"/>
+          </a:fontRef>
+        </p:style>
+        <p:txBody>
+          <a:bodyPr rtlCol="0" anchor="ctr"/>
+          <a:lstStyle/>
+          <a:p>
+            <a:pPr algn="ctr"/>
+            <a:endParaRPr lang="en-US"/>
+          </a:p>
+        </p:txBody>
+      </p:sp>
+      <p:sp>
+        <p:nvSpPr>
+          <p:cNvPr id="25" name="TextBox 24">
+            <a:extLst>
+              <a:ext uri="{FF2B5EF4-FFF2-40B4-BE49-F238E27FC236}">
+                <a16:creationId xmlns:a16="http://schemas.microsoft.com/office/drawing/2014/main" id="{ACAFF55C-75CC-469F-8E17-A4D0462BA494}"/>
+              </a:ext>
+            </a:extLst>
+          </p:cNvPr>
+          <p:cNvSpPr txBox="1"/>
+          <p:nvPr/>
+        </p:nvSpPr>
+        <p:spPr>
+          <a:xfrm>
+            <a:off x="754997" y="164652"/>
+            <a:ext cx="670560" cy="276999"/>
+          </a:xfrm>
+          <a:prstGeom prst="rect">
+            <a:avLst/>
+          </a:prstGeom>
+          <a:noFill/>
+        </p:spPr>
+        <p:txBody>
+          <a:bodyPr wrap="square" rtlCol="0">
+            <a:spAutoFit/>
+          </a:bodyPr>
+          <a:lstStyle/>
+          <a:p>
+            <a:r>
+              <a:rPr lang="en-US" sz="1200" dirty="0">
+                <a:latin typeface="Segoe Print" panose="02000600000000000000" pitchFamily="2" charset="0"/>
+              </a:rPr>
+              <a:t>done</a:t>
+            </a:r>
+          </a:p>
+        </p:txBody>
+      </p:sp>
+      <p:sp>
+        <p:nvSpPr>
+          <p:cNvPr id="57" name="Star: 5 Points 56">
+            <a:extLst>
+              <a:ext uri="{FF2B5EF4-FFF2-40B4-BE49-F238E27FC236}">
+                <a16:creationId xmlns:a16="http://schemas.microsoft.com/office/drawing/2014/main" id="{D74F1433-7784-43EF-9E78-15C389789C05}"/>
+              </a:ext>
+            </a:extLst>
+          </p:cNvPr>
+          <p:cNvSpPr/>
+          <p:nvPr/>
+        </p:nvSpPr>
+        <p:spPr>
+          <a:xfrm>
+            <a:off x="537422" y="150197"/>
+            <a:ext cx="240127" cy="237401"/>
+          </a:xfrm>
+          <a:prstGeom prst="star5">
+            <a:avLst/>
+          </a:prstGeom>
+          <a:solidFill>
+            <a:srgbClr val="00B050"/>
+          </a:solidFill>
+        </p:spPr>
+        <p:style>
+          <a:lnRef idx="0">
+            <a:schemeClr val="accent6"/>
+          </a:lnRef>
+          <a:fillRef idx="3">
+            <a:schemeClr val="accent6"/>
+          </a:fillRef>
+          <a:effectRef idx="3">
+            <a:schemeClr val="accent6"/>
+          </a:effectRef>
+          <a:fontRef idx="minor">
+            <a:schemeClr val="lt1"/>
+          </a:fontRef>
+        </p:style>
+        <p:txBody>
+          <a:bodyPr rtlCol="0" anchor="ctr"/>
+          <a:lstStyle/>
+          <a:p>
+            <a:pPr algn="ctr"/>
+            <a:endParaRPr lang="en-US"/>
+          </a:p>
+        </p:txBody>
+      </p:sp>
+      <p:sp>
+        <p:nvSpPr>
+          <p:cNvPr id="58" name="TextBox 57">
+            <a:extLst>
+              <a:ext uri="{FF2B5EF4-FFF2-40B4-BE49-F238E27FC236}">
+                <a16:creationId xmlns:a16="http://schemas.microsoft.com/office/drawing/2014/main" id="{F734A601-FE2A-433E-B4B7-97D6D6CDC2F9}"/>
+              </a:ext>
+            </a:extLst>
+          </p:cNvPr>
+          <p:cNvSpPr txBox="1"/>
+          <p:nvPr/>
+        </p:nvSpPr>
+        <p:spPr>
+          <a:xfrm>
+            <a:off x="754996" y="433015"/>
+            <a:ext cx="959503" cy="276999"/>
+          </a:xfrm>
+          <a:prstGeom prst="rect">
+            <a:avLst/>
+          </a:prstGeom>
+          <a:noFill/>
+        </p:spPr>
+        <p:txBody>
+          <a:bodyPr wrap="square" rtlCol="0">
+            <a:spAutoFit/>
+          </a:bodyPr>
+          <a:lstStyle/>
+          <a:p>
+            <a:r>
+              <a:rPr lang="en-US" sz="1200" dirty="0">
+                <a:latin typeface="Segoe Print" panose="02000600000000000000" pitchFamily="2" charset="0"/>
+              </a:rPr>
+              <a:t>Not done</a:t>
+            </a:r>
+          </a:p>
+        </p:txBody>
+      </p:sp>
+      <p:sp>
+        <p:nvSpPr>
+          <p:cNvPr id="64" name="Rectangle: Rounded Corners 63">
+            <a:extLst>
+              <a:ext uri="{FF2B5EF4-FFF2-40B4-BE49-F238E27FC236}">
+                <a16:creationId xmlns:a16="http://schemas.microsoft.com/office/drawing/2014/main" id="{05B39CDA-2F23-4D4F-9E1F-CD4D55D2E96E}"/>
+              </a:ext>
+            </a:extLst>
+          </p:cNvPr>
+          <p:cNvSpPr/>
+          <p:nvPr/>
+        </p:nvSpPr>
+        <p:spPr>
+          <a:xfrm>
+            <a:off x="709245" y="5059081"/>
+            <a:ext cx="424737" cy="176256"/>
+          </a:xfrm>
+          <a:prstGeom prst="roundRect">
+            <a:avLst/>
+          </a:prstGeom>
+        </p:spPr>
+        <p:style>
+          <a:lnRef idx="2">
+            <a:schemeClr val="accent1">
+              <a:shade val="50000"/>
+            </a:schemeClr>
+          </a:lnRef>
+          <a:fillRef idx="1">
+            <a:schemeClr val="accent1"/>
+          </a:fillRef>
+          <a:effectRef idx="0">
+            <a:schemeClr val="accent1"/>
+          </a:effectRef>
+          <a:fontRef idx="minor">
+            <a:schemeClr val="lt1"/>
+          </a:fontRef>
+        </p:style>
+        <p:txBody>
+          <a:bodyPr rtlCol="0" anchor="ctr"/>
+          <a:lstStyle/>
+          <a:p>
+            <a:pPr algn="ctr"/>
+            <a:r>
+              <a:rPr lang="en-US" sz="600" dirty="0">
+                <a:latin typeface="Dubai" panose="020B0503030403030204" pitchFamily="34" charset="-78"/>
+                <a:cs typeface="Dubai" panose="020B0503030403030204" pitchFamily="34" charset="-78"/>
+              </a:rPr>
+              <a:t>read</a:t>
+            </a:r>
+            <a:endParaRPr lang="en-US" sz="3200" dirty="0">
+              <a:latin typeface="Dubai" panose="020B0503030403030204" pitchFamily="34" charset="-78"/>
+              <a:cs typeface="Dubai" panose="020B0503030403030204" pitchFamily="34" charset="-78"/>
+            </a:endParaRPr>
+          </a:p>
+        </p:txBody>
+      </p:sp>
+      <p:sp>
+        <p:nvSpPr>
+          <p:cNvPr id="67" name="Rectangle: Rounded Corners 66">
+            <a:extLst>
+              <a:ext uri="{FF2B5EF4-FFF2-40B4-BE49-F238E27FC236}">
+                <a16:creationId xmlns:a16="http://schemas.microsoft.com/office/drawing/2014/main" id="{7332E4F1-CA90-45D9-938D-81543BA6479B}"/>
+              </a:ext>
+            </a:extLst>
+          </p:cNvPr>
+          <p:cNvSpPr/>
+          <p:nvPr/>
+        </p:nvSpPr>
+        <p:spPr>
+          <a:xfrm>
+            <a:off x="1819199" y="5059081"/>
+            <a:ext cx="424737" cy="176256"/>
+          </a:xfrm>
+          <a:prstGeom prst="roundRect">
+            <a:avLst/>
+          </a:prstGeom>
+        </p:spPr>
+        <p:style>
+          <a:lnRef idx="2">
+            <a:schemeClr val="accent1">
+              <a:shade val="50000"/>
+            </a:schemeClr>
+          </a:lnRef>
+          <a:fillRef idx="1">
+            <a:schemeClr val="accent1"/>
+          </a:fillRef>
+          <a:effectRef idx="0">
+            <a:schemeClr val="accent1"/>
+          </a:effectRef>
+          <a:fontRef idx="minor">
+            <a:schemeClr val="lt1"/>
+          </a:fontRef>
+        </p:style>
+        <p:txBody>
+          <a:bodyPr rtlCol="0" anchor="ctr"/>
+          <a:lstStyle/>
+          <a:p>
+            <a:pPr algn="ctr"/>
+            <a:r>
+              <a:rPr lang="en-US" sz="600" dirty="0">
+                <a:latin typeface="Dubai" panose="020B0503030403030204" pitchFamily="34" charset="-78"/>
+                <a:cs typeface="Dubai" panose="020B0503030403030204" pitchFamily="34" charset="-78"/>
+              </a:rPr>
+              <a:t>delete</a:t>
+            </a:r>
+            <a:endParaRPr lang="en-US" sz="3200" dirty="0">
+              <a:latin typeface="Dubai" panose="020B0503030403030204" pitchFamily="34" charset="-78"/>
+              <a:cs typeface="Dubai" panose="020B0503030403030204" pitchFamily="34" charset="-78"/>
+            </a:endParaRPr>
+          </a:p>
+        </p:txBody>
+      </p:sp>
+      <p:sp>
+        <p:nvSpPr>
+          <p:cNvPr id="68" name="Rectangle: Rounded Corners 67">
+            <a:extLst>
+              <a:ext uri="{FF2B5EF4-FFF2-40B4-BE49-F238E27FC236}">
+                <a16:creationId xmlns:a16="http://schemas.microsoft.com/office/drawing/2014/main" id="{844A75AD-3EA6-47C9-824A-7ED57EB557BD}"/>
+              </a:ext>
+            </a:extLst>
+          </p:cNvPr>
+          <p:cNvSpPr/>
+          <p:nvPr/>
+        </p:nvSpPr>
+        <p:spPr>
+          <a:xfrm>
+            <a:off x="1267556" y="5060815"/>
+            <a:ext cx="424737" cy="176256"/>
+          </a:xfrm>
+          <a:prstGeom prst="roundRect">
+            <a:avLst/>
+          </a:prstGeom>
+        </p:spPr>
+        <p:style>
+          <a:lnRef idx="2">
+            <a:schemeClr val="accent1">
+              <a:shade val="50000"/>
+            </a:schemeClr>
+          </a:lnRef>
+          <a:fillRef idx="1">
+            <a:schemeClr val="accent1"/>
+          </a:fillRef>
+          <a:effectRef idx="0">
+            <a:schemeClr val="accent1"/>
+          </a:effectRef>
+          <a:fontRef idx="minor">
+            <a:schemeClr val="lt1"/>
+          </a:fontRef>
+        </p:style>
+        <p:txBody>
+          <a:bodyPr rtlCol="0" anchor="ctr"/>
+          <a:lstStyle/>
+          <a:p>
+            <a:pPr algn="ctr"/>
+            <a:r>
+              <a:rPr lang="en-US" sz="600" dirty="0">
+                <a:latin typeface="Dubai" panose="020B0503030403030204" pitchFamily="34" charset="-78"/>
+                <a:cs typeface="Dubai" panose="020B0503030403030204" pitchFamily="34" charset="-78"/>
+              </a:rPr>
+              <a:t>update</a:t>
+            </a:r>
+            <a:endParaRPr lang="en-US" sz="3200" dirty="0">
+              <a:latin typeface="Dubai" panose="020B0503030403030204" pitchFamily="34" charset="-78"/>
+              <a:cs typeface="Dubai" panose="020B0503030403030204" pitchFamily="34" charset="-78"/>
+            </a:endParaRPr>
+          </a:p>
+        </p:txBody>
+      </p:sp>
+      <p:cxnSp>
+        <p:nvCxnSpPr>
+          <p:cNvPr id="69" name="Connector: Elbow 68">
+            <a:extLst>
+              <a:ext uri="{FF2B5EF4-FFF2-40B4-BE49-F238E27FC236}">
+                <a16:creationId xmlns:a16="http://schemas.microsoft.com/office/drawing/2014/main" id="{A1549E46-C70A-407E-97F9-679407C0A9BA}"/>
+              </a:ext>
+            </a:extLst>
+          </p:cNvPr>
+          <p:cNvCxnSpPr>
+            <a:cxnSpLocks/>
+            <a:stCxn id="65" idx="2"/>
+            <a:endCxn id="68" idx="0"/>
+          </p:cNvCxnSpPr>
+          <p:nvPr/>
+        </p:nvCxnSpPr>
+        <p:spPr>
+          <a:xfrm rot="16200000" flipH="1">
+            <a:off x="1073301" y="4654191"/>
+            <a:ext cx="554412" cy="258836"/>
+          </a:xfrm>
+          <a:prstGeom prst="bentConnector3">
+            <a:avLst>
+              <a:gd name="adj1" fmla="val 50000"/>
+            </a:avLst>
+          </a:prstGeom>
+          <a:ln>
+            <a:tailEnd type="triangle"/>
+          </a:ln>
+        </p:spPr>
+        <p:style>
+          <a:lnRef idx="1">
+            <a:schemeClr val="accent1"/>
+          </a:lnRef>
+          <a:fillRef idx="0">
+            <a:schemeClr val="accent1"/>
+          </a:fillRef>
+          <a:effectRef idx="0">
+            <a:schemeClr val="accent1"/>
+          </a:effectRef>
+          <a:fontRef idx="minor">
+            <a:schemeClr val="tx1"/>
+          </a:fontRef>
+        </p:style>
+      </p:cxnSp>
+      <p:cxnSp>
+        <p:nvCxnSpPr>
+          <p:cNvPr id="76" name="Connector: Elbow 75">
+            <a:extLst>
+              <a:ext uri="{FF2B5EF4-FFF2-40B4-BE49-F238E27FC236}">
+                <a16:creationId xmlns:a16="http://schemas.microsoft.com/office/drawing/2014/main" id="{549F436E-1C82-43DE-BAD4-B89C00C84869}"/>
+              </a:ext>
+            </a:extLst>
+          </p:cNvPr>
+          <p:cNvCxnSpPr>
+            <a:cxnSpLocks/>
+            <a:stCxn id="65" idx="3"/>
+            <a:endCxn id="67" idx="0"/>
+          </p:cNvCxnSpPr>
+          <p:nvPr/>
+        </p:nvCxnSpPr>
+        <p:spPr>
+          <a:xfrm>
+            <a:off x="1480323" y="4388567"/>
+            <a:ext cx="551245" cy="670514"/>
+          </a:xfrm>
+          <a:prstGeom prst="bentConnector2">
+            <a:avLst/>
+          </a:prstGeom>
+          <a:ln>
+            <a:tailEnd type="triangle"/>
+          </a:ln>
+        </p:spPr>
+        <p:style>
+          <a:lnRef idx="1">
+            <a:schemeClr val="accent1"/>
+          </a:lnRef>
+          <a:fillRef idx="0">
+            <a:schemeClr val="accent1"/>
+          </a:fillRef>
+          <a:effectRef idx="0">
+            <a:schemeClr val="accent1"/>
+          </a:effectRef>
+          <a:fontRef idx="minor">
+            <a:schemeClr val="tx1"/>
+          </a:fontRef>
+        </p:style>
+      </p:cxnSp>
+      <p:cxnSp>
+        <p:nvCxnSpPr>
+          <p:cNvPr id="81" name="Connector: Elbow 80">
+            <a:extLst>
+              <a:ext uri="{FF2B5EF4-FFF2-40B4-BE49-F238E27FC236}">
+                <a16:creationId xmlns:a16="http://schemas.microsoft.com/office/drawing/2014/main" id="{2ACCD93B-322B-4380-97F5-32D1E602A053}"/>
+              </a:ext>
+            </a:extLst>
+          </p:cNvPr>
+          <p:cNvCxnSpPr>
+            <a:cxnSpLocks/>
+            <a:stCxn id="65" idx="2"/>
+            <a:endCxn id="64" idx="0"/>
+          </p:cNvCxnSpPr>
+          <p:nvPr/>
+        </p:nvCxnSpPr>
+        <p:spPr>
+          <a:xfrm rot="5400000">
+            <a:off x="795013" y="4633005"/>
+            <a:ext cx="552678" cy="299475"/>
+          </a:xfrm>
+          <a:prstGeom prst="bentConnector3">
+            <a:avLst>
+              <a:gd name="adj1" fmla="val 50000"/>
+            </a:avLst>
+          </a:prstGeom>
+          <a:ln>
+            <a:tailEnd type="triangle"/>
+          </a:ln>
+        </p:spPr>
+        <p:style>
+          <a:lnRef idx="1">
+            <a:schemeClr val="accent1"/>
+          </a:lnRef>
+          <a:fillRef idx="0">
+            <a:schemeClr val="accent1"/>
+          </a:fillRef>
+          <a:effectRef idx="0">
+            <a:schemeClr val="accent1"/>
+          </a:effectRef>
+          <a:fontRef idx="minor">
+            <a:schemeClr val="tx1"/>
+          </a:fontRef>
+        </p:style>
+      </p:cxnSp>
+      <p:cxnSp>
+        <p:nvCxnSpPr>
+          <p:cNvPr id="82" name="Connector: Elbow 81">
+            <a:extLst>
+              <a:ext uri="{FF2B5EF4-FFF2-40B4-BE49-F238E27FC236}">
+                <a16:creationId xmlns:a16="http://schemas.microsoft.com/office/drawing/2014/main" id="{4F484B32-3BAB-43EB-8560-C86F6DB533A1}"/>
+              </a:ext>
+            </a:extLst>
+          </p:cNvPr>
+          <p:cNvCxnSpPr>
+            <a:cxnSpLocks/>
+            <a:stCxn id="65" idx="1"/>
+            <a:endCxn id="32" idx="0"/>
+          </p:cNvCxnSpPr>
+          <p:nvPr/>
+        </p:nvCxnSpPr>
+        <p:spPr>
+          <a:xfrm rot="10800000" flipV="1">
+            <a:off x="369972" y="4388567"/>
+            <a:ext cx="591883" cy="670514"/>
+          </a:xfrm>
+          <a:prstGeom prst="bentConnector2">
+            <a:avLst/>
+          </a:prstGeom>
+          <a:ln>
+            <a:tailEnd type="triangle"/>
+          </a:ln>
+        </p:spPr>
+        <p:style>
+          <a:lnRef idx="1">
+            <a:schemeClr val="accent1"/>
+          </a:lnRef>
+          <a:fillRef idx="0">
+            <a:schemeClr val="accent1"/>
+          </a:fillRef>
+          <a:effectRef idx="0">
+            <a:schemeClr val="accent1"/>
+          </a:effectRef>
+          <a:fontRef idx="minor">
+            <a:schemeClr val="tx1"/>
+          </a:fontRef>
+        </p:style>
+      </p:cxnSp>
+      <p:sp>
+        <p:nvSpPr>
+          <p:cNvPr id="94" name="Rectangle: Rounded Corners 93">
+            <a:extLst>
+              <a:ext uri="{FF2B5EF4-FFF2-40B4-BE49-F238E27FC236}">
+                <a16:creationId xmlns:a16="http://schemas.microsoft.com/office/drawing/2014/main" id="{F39355E0-9E70-4744-8F30-0A4ABD63AA31}"/>
+              </a:ext>
+            </a:extLst>
+          </p:cNvPr>
+          <p:cNvSpPr/>
+          <p:nvPr/>
+        </p:nvSpPr>
+        <p:spPr>
+          <a:xfrm>
+            <a:off x="3168889" y="4268997"/>
+            <a:ext cx="518469" cy="235672"/>
+          </a:xfrm>
+          <a:prstGeom prst="roundRect">
+            <a:avLst/>
+          </a:prstGeom>
+        </p:spPr>
+        <p:style>
+          <a:lnRef idx="2">
+            <a:schemeClr val="accent1">
+              <a:shade val="50000"/>
+            </a:schemeClr>
+          </a:lnRef>
+          <a:fillRef idx="1">
+            <a:schemeClr val="accent1"/>
+          </a:fillRef>
+          <a:effectRef idx="0">
+            <a:schemeClr val="accent1"/>
+          </a:effectRef>
+          <a:fontRef idx="minor">
+            <a:schemeClr val="lt1"/>
+          </a:fontRef>
+        </p:style>
+        <p:txBody>
+          <a:bodyPr rtlCol="0" anchor="ctr"/>
+          <a:lstStyle/>
+          <a:p>
+            <a:pPr algn="ctr"/>
+            <a:r>
+              <a:rPr lang="en-US" sz="600" dirty="0">
+                <a:latin typeface="Dubai" panose="020B0503030403030204" pitchFamily="34" charset="-78"/>
+                <a:cs typeface="Dubai" panose="020B0503030403030204" pitchFamily="34" charset="-78"/>
+              </a:rPr>
+              <a:t>Future Costs</a:t>
+            </a:r>
+            <a:endParaRPr lang="en-US" sz="3200" dirty="0">
+              <a:latin typeface="Dubai" panose="020B0503030403030204" pitchFamily="34" charset="-78"/>
+              <a:cs typeface="Dubai" panose="020B0503030403030204" pitchFamily="34" charset="-78"/>
+            </a:endParaRPr>
+          </a:p>
+        </p:txBody>
+      </p:sp>
+      <p:sp>
+        <p:nvSpPr>
+          <p:cNvPr id="95" name="Rectangle: Rounded Corners 94">
+            <a:extLst>
+              <a:ext uri="{FF2B5EF4-FFF2-40B4-BE49-F238E27FC236}">
+                <a16:creationId xmlns:a16="http://schemas.microsoft.com/office/drawing/2014/main" id="{B190D218-C218-42AF-BB97-2F13DE113044}"/>
+              </a:ext>
+            </a:extLst>
+          </p:cNvPr>
+          <p:cNvSpPr/>
+          <p:nvPr/>
+        </p:nvSpPr>
+        <p:spPr>
+          <a:xfrm>
+            <a:off x="2364637" y="5057347"/>
+            <a:ext cx="424737" cy="176256"/>
+          </a:xfrm>
+          <a:prstGeom prst="roundRect">
+            <a:avLst/>
+          </a:prstGeom>
+        </p:spPr>
+        <p:style>
+          <a:lnRef idx="2">
+            <a:schemeClr val="accent1">
+              <a:shade val="50000"/>
+            </a:schemeClr>
+          </a:lnRef>
+          <a:fillRef idx="1">
+            <a:schemeClr val="accent1"/>
+          </a:fillRef>
+          <a:effectRef idx="0">
+            <a:schemeClr val="accent1"/>
+          </a:effectRef>
+          <a:fontRef idx="minor">
+            <a:schemeClr val="lt1"/>
+          </a:fontRef>
+        </p:style>
+        <p:txBody>
+          <a:bodyPr rtlCol="0" anchor="ctr"/>
+          <a:lstStyle/>
+          <a:p>
+            <a:pPr algn="ctr"/>
+            <a:r>
+              <a:rPr lang="en-US" sz="600" dirty="0">
+                <a:latin typeface="Dubai" panose="020B0503030403030204" pitchFamily="34" charset="-78"/>
+                <a:cs typeface="Dubai" panose="020B0503030403030204" pitchFamily="34" charset="-78"/>
+              </a:rPr>
+              <a:t>create</a:t>
+            </a:r>
+            <a:endParaRPr lang="en-US" sz="3200" dirty="0">
+              <a:latin typeface="Dubai" panose="020B0503030403030204" pitchFamily="34" charset="-78"/>
+              <a:cs typeface="Dubai" panose="020B0503030403030204" pitchFamily="34" charset="-78"/>
+            </a:endParaRPr>
+          </a:p>
+        </p:txBody>
+      </p:sp>
+      <p:sp>
+        <p:nvSpPr>
+          <p:cNvPr id="96" name="Rectangle: Rounded Corners 95">
+            <a:extLst>
+              <a:ext uri="{FF2B5EF4-FFF2-40B4-BE49-F238E27FC236}">
+                <a16:creationId xmlns:a16="http://schemas.microsoft.com/office/drawing/2014/main" id="{1CB1A114-ED08-4065-9AA8-07BCC0D3B6DD}"/>
+              </a:ext>
+            </a:extLst>
+          </p:cNvPr>
+          <p:cNvSpPr/>
+          <p:nvPr/>
+        </p:nvSpPr>
+        <p:spPr>
+          <a:xfrm>
+            <a:off x="2916280" y="5057347"/>
+            <a:ext cx="424737" cy="176256"/>
+          </a:xfrm>
+          <a:prstGeom prst="roundRect">
+            <a:avLst/>
+          </a:prstGeom>
+        </p:spPr>
+        <p:style>
+          <a:lnRef idx="2">
+            <a:schemeClr val="accent1">
+              <a:shade val="50000"/>
+            </a:schemeClr>
+          </a:lnRef>
+          <a:fillRef idx="1">
+            <a:schemeClr val="accent1"/>
+          </a:fillRef>
+          <a:effectRef idx="0">
+            <a:schemeClr val="accent1"/>
+          </a:effectRef>
+          <a:fontRef idx="minor">
+            <a:schemeClr val="lt1"/>
+          </a:fontRef>
+        </p:style>
+        <p:txBody>
+          <a:bodyPr rtlCol="0" anchor="ctr"/>
+          <a:lstStyle/>
+          <a:p>
+            <a:pPr algn="ctr"/>
+            <a:r>
+              <a:rPr lang="en-US" sz="600" dirty="0">
+                <a:latin typeface="Dubai" panose="020B0503030403030204" pitchFamily="34" charset="-78"/>
+                <a:cs typeface="Dubai" panose="020B0503030403030204" pitchFamily="34" charset="-78"/>
+              </a:rPr>
+              <a:t>read</a:t>
+            </a:r>
+            <a:endParaRPr lang="en-US" sz="3200" dirty="0">
+              <a:latin typeface="Dubai" panose="020B0503030403030204" pitchFamily="34" charset="-78"/>
+              <a:cs typeface="Dubai" panose="020B0503030403030204" pitchFamily="34" charset="-78"/>
+            </a:endParaRPr>
+          </a:p>
+        </p:txBody>
+      </p:sp>
+      <p:sp>
+        <p:nvSpPr>
+          <p:cNvPr id="97" name="Rectangle: Rounded Corners 96">
+            <a:extLst>
+              <a:ext uri="{FF2B5EF4-FFF2-40B4-BE49-F238E27FC236}">
+                <a16:creationId xmlns:a16="http://schemas.microsoft.com/office/drawing/2014/main" id="{BEF99625-3A12-49CE-8C11-C54143FDEF5F}"/>
+              </a:ext>
+            </a:extLst>
+          </p:cNvPr>
+          <p:cNvSpPr/>
+          <p:nvPr/>
+        </p:nvSpPr>
+        <p:spPr>
+          <a:xfrm>
+            <a:off x="4030376" y="5059081"/>
+            <a:ext cx="424737" cy="176256"/>
+          </a:xfrm>
+          <a:prstGeom prst="roundRect">
+            <a:avLst/>
+          </a:prstGeom>
+        </p:spPr>
+        <p:style>
+          <a:lnRef idx="2">
+            <a:schemeClr val="accent1">
+              <a:shade val="50000"/>
+            </a:schemeClr>
+          </a:lnRef>
+          <a:fillRef idx="1">
+            <a:schemeClr val="accent1"/>
+          </a:fillRef>
+          <a:effectRef idx="0">
+            <a:schemeClr val="accent1"/>
+          </a:effectRef>
+          <a:fontRef idx="minor">
+            <a:schemeClr val="lt1"/>
+          </a:fontRef>
+        </p:style>
+        <p:txBody>
+          <a:bodyPr rtlCol="0" anchor="ctr"/>
+          <a:lstStyle/>
+          <a:p>
+            <a:pPr algn="ctr"/>
+            <a:r>
+              <a:rPr lang="en-US" sz="600" dirty="0">
+                <a:latin typeface="Dubai" panose="020B0503030403030204" pitchFamily="34" charset="-78"/>
+                <a:cs typeface="Dubai" panose="020B0503030403030204" pitchFamily="34" charset="-78"/>
+              </a:rPr>
+              <a:t>delete</a:t>
+            </a:r>
+            <a:endParaRPr lang="en-US" sz="3200" dirty="0">
+              <a:latin typeface="Dubai" panose="020B0503030403030204" pitchFamily="34" charset="-78"/>
+              <a:cs typeface="Dubai" panose="020B0503030403030204" pitchFamily="34" charset="-78"/>
+            </a:endParaRPr>
+          </a:p>
+        </p:txBody>
+      </p:sp>
+      <p:sp>
+        <p:nvSpPr>
+          <p:cNvPr id="98" name="Rectangle: Rounded Corners 97">
+            <a:extLst>
+              <a:ext uri="{FF2B5EF4-FFF2-40B4-BE49-F238E27FC236}">
+                <a16:creationId xmlns:a16="http://schemas.microsoft.com/office/drawing/2014/main" id="{C2EEE13E-B61C-4B8C-8D4B-4408A6BD8B33}"/>
+              </a:ext>
+            </a:extLst>
+          </p:cNvPr>
+          <p:cNvSpPr/>
+          <p:nvPr/>
+        </p:nvSpPr>
+        <p:spPr>
+          <a:xfrm>
+            <a:off x="3474591" y="5059081"/>
+            <a:ext cx="424737" cy="176256"/>
+          </a:xfrm>
+          <a:prstGeom prst="roundRect">
+            <a:avLst/>
+          </a:prstGeom>
+        </p:spPr>
+        <p:style>
+          <a:lnRef idx="2">
+            <a:schemeClr val="accent1">
+              <a:shade val="50000"/>
+            </a:schemeClr>
+          </a:lnRef>
+          <a:fillRef idx="1">
+            <a:schemeClr val="accent1"/>
+          </a:fillRef>
+          <a:effectRef idx="0">
+            <a:schemeClr val="accent1"/>
+          </a:effectRef>
+          <a:fontRef idx="minor">
+            <a:schemeClr val="lt1"/>
+          </a:fontRef>
+        </p:style>
+        <p:txBody>
+          <a:bodyPr rtlCol="0" anchor="ctr"/>
+          <a:lstStyle/>
+          <a:p>
+            <a:pPr algn="ctr"/>
+            <a:r>
+              <a:rPr lang="en-US" sz="600" dirty="0">
+                <a:latin typeface="Dubai" panose="020B0503030403030204" pitchFamily="34" charset="-78"/>
+                <a:cs typeface="Dubai" panose="020B0503030403030204" pitchFamily="34" charset="-78"/>
+              </a:rPr>
+              <a:t>update</a:t>
+            </a:r>
+            <a:endParaRPr lang="en-US" sz="3200" dirty="0">
+              <a:latin typeface="Dubai" panose="020B0503030403030204" pitchFamily="34" charset="-78"/>
+              <a:cs typeface="Dubai" panose="020B0503030403030204" pitchFamily="34" charset="-78"/>
+            </a:endParaRPr>
+          </a:p>
+        </p:txBody>
+      </p:sp>
+      <p:cxnSp>
+        <p:nvCxnSpPr>
+          <p:cNvPr id="99" name="Connector: Elbow 98">
+            <a:extLst>
+              <a:ext uri="{FF2B5EF4-FFF2-40B4-BE49-F238E27FC236}">
+                <a16:creationId xmlns:a16="http://schemas.microsoft.com/office/drawing/2014/main" id="{661B21F8-F4A0-421E-B500-524F58A88927}"/>
+              </a:ext>
+            </a:extLst>
+          </p:cNvPr>
+          <p:cNvCxnSpPr>
+            <a:cxnSpLocks/>
+            <a:stCxn id="94" idx="2"/>
+            <a:endCxn id="98" idx="0"/>
+          </p:cNvCxnSpPr>
+          <p:nvPr/>
+        </p:nvCxnSpPr>
+        <p:spPr>
+          <a:xfrm rot="16200000" flipH="1">
+            <a:off x="3280336" y="4652457"/>
+            <a:ext cx="554412" cy="258836"/>
+          </a:xfrm>
+          <a:prstGeom prst="bentConnector3">
+            <a:avLst>
+              <a:gd name="adj1" fmla="val 50000"/>
+            </a:avLst>
+          </a:prstGeom>
+          <a:ln>
+            <a:tailEnd type="triangle"/>
+          </a:ln>
+        </p:spPr>
+        <p:style>
+          <a:lnRef idx="1">
+            <a:schemeClr val="accent1"/>
+          </a:lnRef>
+          <a:fillRef idx="0">
+            <a:schemeClr val="accent1"/>
+          </a:fillRef>
+          <a:effectRef idx="0">
+            <a:schemeClr val="accent1"/>
+          </a:effectRef>
+          <a:fontRef idx="minor">
+            <a:schemeClr val="tx1"/>
+          </a:fontRef>
+        </p:style>
+      </p:cxnSp>
+      <p:cxnSp>
+        <p:nvCxnSpPr>
+          <p:cNvPr id="100" name="Connector: Elbow 99">
+            <a:extLst>
+              <a:ext uri="{FF2B5EF4-FFF2-40B4-BE49-F238E27FC236}">
+                <a16:creationId xmlns:a16="http://schemas.microsoft.com/office/drawing/2014/main" id="{089E01D3-1317-4DE1-ABED-9602262A16EA}"/>
+              </a:ext>
+            </a:extLst>
+          </p:cNvPr>
+          <p:cNvCxnSpPr>
+            <a:cxnSpLocks/>
+            <a:stCxn id="94" idx="3"/>
+            <a:endCxn id="97" idx="0"/>
+          </p:cNvCxnSpPr>
+          <p:nvPr/>
+        </p:nvCxnSpPr>
+        <p:spPr>
+          <a:xfrm>
+            <a:off x="3687358" y="4386833"/>
+            <a:ext cx="555387" cy="672248"/>
+          </a:xfrm>
+          <a:prstGeom prst="bentConnector2">
+            <a:avLst/>
+          </a:prstGeom>
+          <a:ln>
+            <a:tailEnd type="triangle"/>
+          </a:ln>
+        </p:spPr>
+        <p:style>
+          <a:lnRef idx="1">
+            <a:schemeClr val="accent1"/>
+          </a:lnRef>
+          <a:fillRef idx="0">
+            <a:schemeClr val="accent1"/>
+          </a:fillRef>
+          <a:effectRef idx="0">
+            <a:schemeClr val="accent1"/>
+          </a:effectRef>
+          <a:fontRef idx="minor">
+            <a:schemeClr val="tx1"/>
+          </a:fontRef>
+        </p:style>
+      </p:cxnSp>
+      <p:cxnSp>
+        <p:nvCxnSpPr>
+          <p:cNvPr id="101" name="Connector: Elbow 100">
+            <a:extLst>
+              <a:ext uri="{FF2B5EF4-FFF2-40B4-BE49-F238E27FC236}">
+                <a16:creationId xmlns:a16="http://schemas.microsoft.com/office/drawing/2014/main" id="{5D9677DB-CE56-43FA-BA93-6E03A2B9B65C}"/>
+              </a:ext>
+            </a:extLst>
+          </p:cNvPr>
+          <p:cNvCxnSpPr>
+            <a:cxnSpLocks/>
+            <a:stCxn id="94" idx="2"/>
+            <a:endCxn id="96" idx="0"/>
+          </p:cNvCxnSpPr>
+          <p:nvPr/>
+        </p:nvCxnSpPr>
+        <p:spPr>
+          <a:xfrm rot="5400000">
+            <a:off x="3002048" y="4631271"/>
+            <a:ext cx="552678" cy="299475"/>
+          </a:xfrm>
+          <a:prstGeom prst="bentConnector3">
+            <a:avLst>
+              <a:gd name="adj1" fmla="val 50000"/>
+            </a:avLst>
+          </a:prstGeom>
+          <a:ln>
+            <a:tailEnd type="triangle"/>
+          </a:ln>
+        </p:spPr>
+        <p:style>
+          <a:lnRef idx="1">
+            <a:schemeClr val="accent1"/>
+          </a:lnRef>
+          <a:fillRef idx="0">
+            <a:schemeClr val="accent1"/>
+          </a:fillRef>
+          <a:effectRef idx="0">
+            <a:schemeClr val="accent1"/>
+          </a:effectRef>
+          <a:fontRef idx="minor">
+            <a:schemeClr val="tx1"/>
+          </a:fontRef>
+        </p:style>
+      </p:cxnSp>
+      <p:cxnSp>
+        <p:nvCxnSpPr>
+          <p:cNvPr id="102" name="Connector: Elbow 101">
+            <a:extLst>
+              <a:ext uri="{FF2B5EF4-FFF2-40B4-BE49-F238E27FC236}">
+                <a16:creationId xmlns:a16="http://schemas.microsoft.com/office/drawing/2014/main" id="{1F00F251-984E-4A55-8D4E-2A35E7BF30B6}"/>
+              </a:ext>
+            </a:extLst>
+          </p:cNvPr>
+          <p:cNvCxnSpPr>
+            <a:cxnSpLocks/>
+            <a:stCxn id="94" idx="1"/>
+            <a:endCxn id="95" idx="0"/>
+          </p:cNvCxnSpPr>
+          <p:nvPr/>
+        </p:nvCxnSpPr>
+        <p:spPr>
+          <a:xfrm rot="10800000" flipV="1">
+            <a:off x="2577007" y="4386833"/>
+            <a:ext cx="591883" cy="670514"/>
+          </a:xfrm>
+          <a:prstGeom prst="bentConnector2">
+            <a:avLst/>
+          </a:prstGeom>
+          <a:ln>
+            <a:tailEnd type="triangle"/>
+          </a:ln>
+        </p:spPr>
+        <p:style>
+          <a:lnRef idx="1">
+            <a:schemeClr val="accent1"/>
+          </a:lnRef>
+          <a:fillRef idx="0">
+            <a:schemeClr val="accent1"/>
+          </a:fillRef>
+          <a:effectRef idx="0">
+            <a:schemeClr val="accent1"/>
+          </a:effectRef>
+          <a:fontRef idx="minor">
+            <a:schemeClr val="tx1"/>
+          </a:fontRef>
+        </p:style>
+      </p:cxnSp>
+      <p:sp>
+        <p:nvSpPr>
+          <p:cNvPr id="111" name="Rectangle: Rounded Corners 110">
+            <a:extLst>
+              <a:ext uri="{FF2B5EF4-FFF2-40B4-BE49-F238E27FC236}">
+                <a16:creationId xmlns:a16="http://schemas.microsoft.com/office/drawing/2014/main" id="{14888332-1F3A-4EE6-90E7-C1F01E45DA50}"/>
+              </a:ext>
+            </a:extLst>
+          </p:cNvPr>
+          <p:cNvSpPr/>
+          <p:nvPr/>
+        </p:nvSpPr>
+        <p:spPr>
+          <a:xfrm>
+            <a:off x="5379012" y="4268996"/>
+            <a:ext cx="518469" cy="235672"/>
+          </a:xfrm>
+          <a:prstGeom prst="roundRect">
+            <a:avLst/>
+          </a:prstGeom>
+        </p:spPr>
+        <p:style>
+          <a:lnRef idx="2">
+            <a:schemeClr val="accent1">
+              <a:shade val="50000"/>
+            </a:schemeClr>
+          </a:lnRef>
+          <a:fillRef idx="1">
+            <a:schemeClr val="accent1"/>
+          </a:fillRef>
+          <a:effectRef idx="0">
+            <a:schemeClr val="accent1"/>
+          </a:effectRef>
+          <a:fontRef idx="minor">
+            <a:schemeClr val="lt1"/>
+          </a:fontRef>
+        </p:style>
+        <p:txBody>
+          <a:bodyPr rtlCol="0" anchor="ctr"/>
+          <a:lstStyle/>
+          <a:p>
+            <a:pPr algn="ctr"/>
+            <a:r>
+              <a:rPr lang="en-US" sz="600" dirty="0">
+                <a:latin typeface="Dubai" panose="020B0503030403030204" pitchFamily="34" charset="-78"/>
+                <a:cs typeface="Dubai" panose="020B0503030403030204" pitchFamily="34" charset="-78"/>
+              </a:rPr>
+              <a:t>Future Costs</a:t>
+            </a:r>
+            <a:endParaRPr lang="en-US" sz="3200" dirty="0">
+              <a:latin typeface="Dubai" panose="020B0503030403030204" pitchFamily="34" charset="-78"/>
+              <a:cs typeface="Dubai" panose="020B0503030403030204" pitchFamily="34" charset="-78"/>
+            </a:endParaRPr>
+          </a:p>
+        </p:txBody>
+      </p:sp>
+      <p:sp>
+        <p:nvSpPr>
+          <p:cNvPr id="112" name="Rectangle: Rounded Corners 111">
+            <a:extLst>
+              <a:ext uri="{FF2B5EF4-FFF2-40B4-BE49-F238E27FC236}">
+                <a16:creationId xmlns:a16="http://schemas.microsoft.com/office/drawing/2014/main" id="{463C02A8-4015-4926-8891-09AF65800D71}"/>
+              </a:ext>
+            </a:extLst>
+          </p:cNvPr>
+          <p:cNvSpPr/>
+          <p:nvPr/>
+        </p:nvSpPr>
+        <p:spPr>
+          <a:xfrm>
+            <a:off x="4574760" y="5057346"/>
+            <a:ext cx="424737" cy="176256"/>
+          </a:xfrm>
+          <a:prstGeom prst="roundRect">
+            <a:avLst/>
+          </a:prstGeom>
+        </p:spPr>
+        <p:style>
+          <a:lnRef idx="2">
+            <a:schemeClr val="accent1">
+              <a:shade val="50000"/>
+            </a:schemeClr>
+          </a:lnRef>
+          <a:fillRef idx="1">
+            <a:schemeClr val="accent1"/>
+          </a:fillRef>
+          <a:effectRef idx="0">
+            <a:schemeClr val="accent1"/>
+          </a:effectRef>
+          <a:fontRef idx="minor">
+            <a:schemeClr val="lt1"/>
+          </a:fontRef>
+        </p:style>
+        <p:txBody>
+          <a:bodyPr rtlCol="0" anchor="ctr"/>
+          <a:lstStyle/>
+          <a:p>
+            <a:pPr algn="ctr"/>
+            <a:r>
+              <a:rPr lang="en-US" sz="600" dirty="0">
+                <a:latin typeface="Dubai" panose="020B0503030403030204" pitchFamily="34" charset="-78"/>
+                <a:cs typeface="Dubai" panose="020B0503030403030204" pitchFamily="34" charset="-78"/>
+              </a:rPr>
+              <a:t>create</a:t>
+            </a:r>
+            <a:endParaRPr lang="en-US" sz="3200" dirty="0">
+              <a:latin typeface="Dubai" panose="020B0503030403030204" pitchFamily="34" charset="-78"/>
+              <a:cs typeface="Dubai" panose="020B0503030403030204" pitchFamily="34" charset="-78"/>
+            </a:endParaRPr>
+          </a:p>
+        </p:txBody>
+      </p:sp>
+      <p:sp>
+        <p:nvSpPr>
+          <p:cNvPr id="113" name="Rectangle: Rounded Corners 112">
+            <a:extLst>
+              <a:ext uri="{FF2B5EF4-FFF2-40B4-BE49-F238E27FC236}">
+                <a16:creationId xmlns:a16="http://schemas.microsoft.com/office/drawing/2014/main" id="{79A13E15-6FA1-4F6D-8D2F-2DDE07188E05}"/>
+              </a:ext>
+            </a:extLst>
+          </p:cNvPr>
+          <p:cNvSpPr/>
+          <p:nvPr/>
+        </p:nvSpPr>
+        <p:spPr>
+          <a:xfrm>
+            <a:off x="5126403" y="5057346"/>
+            <a:ext cx="424737" cy="176256"/>
+          </a:xfrm>
+          <a:prstGeom prst="roundRect">
+            <a:avLst/>
+          </a:prstGeom>
+        </p:spPr>
+        <p:style>
+          <a:lnRef idx="2">
+            <a:schemeClr val="accent1">
+              <a:shade val="50000"/>
+            </a:schemeClr>
+          </a:lnRef>
+          <a:fillRef idx="1">
+            <a:schemeClr val="accent1"/>
+          </a:fillRef>
+          <a:effectRef idx="0">
+            <a:schemeClr val="accent1"/>
+          </a:effectRef>
+          <a:fontRef idx="minor">
+            <a:schemeClr val="lt1"/>
+          </a:fontRef>
+        </p:style>
+        <p:txBody>
+          <a:bodyPr rtlCol="0" anchor="ctr"/>
+          <a:lstStyle/>
+          <a:p>
+            <a:pPr algn="ctr"/>
+            <a:r>
+              <a:rPr lang="en-US" sz="600" dirty="0">
+                <a:latin typeface="Dubai" panose="020B0503030403030204" pitchFamily="34" charset="-78"/>
+                <a:cs typeface="Dubai" panose="020B0503030403030204" pitchFamily="34" charset="-78"/>
+              </a:rPr>
+              <a:t>read</a:t>
+            </a:r>
+            <a:endParaRPr lang="en-US" sz="3200" dirty="0">
+              <a:latin typeface="Dubai" panose="020B0503030403030204" pitchFamily="34" charset="-78"/>
+              <a:cs typeface="Dubai" panose="020B0503030403030204" pitchFamily="34" charset="-78"/>
+            </a:endParaRPr>
+          </a:p>
+        </p:txBody>
+      </p:sp>
+      <p:sp>
+        <p:nvSpPr>
+          <p:cNvPr id="114" name="Rectangle: Rounded Corners 113">
+            <a:extLst>
+              <a:ext uri="{FF2B5EF4-FFF2-40B4-BE49-F238E27FC236}">
+                <a16:creationId xmlns:a16="http://schemas.microsoft.com/office/drawing/2014/main" id="{AC7DD97F-DFFE-4738-B9EF-BC99B11AAC52}"/>
+              </a:ext>
+            </a:extLst>
+          </p:cNvPr>
+          <p:cNvSpPr/>
+          <p:nvPr/>
+        </p:nvSpPr>
+        <p:spPr>
+          <a:xfrm>
+            <a:off x="6240499" y="5059080"/>
+            <a:ext cx="424737" cy="176256"/>
+          </a:xfrm>
+          <a:prstGeom prst="roundRect">
+            <a:avLst/>
+          </a:prstGeom>
+        </p:spPr>
+        <p:style>
+          <a:lnRef idx="2">
+            <a:schemeClr val="accent1">
+              <a:shade val="50000"/>
+            </a:schemeClr>
+          </a:lnRef>
+          <a:fillRef idx="1">
+            <a:schemeClr val="accent1"/>
+          </a:fillRef>
+          <a:effectRef idx="0">
+            <a:schemeClr val="accent1"/>
+          </a:effectRef>
+          <a:fontRef idx="minor">
+            <a:schemeClr val="lt1"/>
+          </a:fontRef>
+        </p:style>
+        <p:txBody>
+          <a:bodyPr rtlCol="0" anchor="ctr"/>
+          <a:lstStyle/>
+          <a:p>
+            <a:pPr algn="ctr"/>
+            <a:r>
+              <a:rPr lang="en-US" sz="600" dirty="0">
+                <a:latin typeface="Dubai" panose="020B0503030403030204" pitchFamily="34" charset="-78"/>
+                <a:cs typeface="Dubai" panose="020B0503030403030204" pitchFamily="34" charset="-78"/>
+              </a:rPr>
+              <a:t>delete</a:t>
+            </a:r>
+            <a:endParaRPr lang="en-US" sz="3200" dirty="0">
+              <a:latin typeface="Dubai" panose="020B0503030403030204" pitchFamily="34" charset="-78"/>
+              <a:cs typeface="Dubai" panose="020B0503030403030204" pitchFamily="34" charset="-78"/>
+            </a:endParaRPr>
+          </a:p>
+        </p:txBody>
+      </p:sp>
+      <p:sp>
+        <p:nvSpPr>
+          <p:cNvPr id="115" name="Rectangle: Rounded Corners 114">
+            <a:extLst>
+              <a:ext uri="{FF2B5EF4-FFF2-40B4-BE49-F238E27FC236}">
+                <a16:creationId xmlns:a16="http://schemas.microsoft.com/office/drawing/2014/main" id="{D8784940-CC12-4CCB-97AB-78330849E0E3}"/>
+              </a:ext>
+            </a:extLst>
+          </p:cNvPr>
+          <p:cNvSpPr/>
+          <p:nvPr/>
+        </p:nvSpPr>
+        <p:spPr>
+          <a:xfrm>
+            <a:off x="5684714" y="5059080"/>
+            <a:ext cx="424737" cy="176256"/>
+          </a:xfrm>
+          <a:prstGeom prst="roundRect">
+            <a:avLst/>
+          </a:prstGeom>
+        </p:spPr>
+        <p:style>
+          <a:lnRef idx="2">
+            <a:schemeClr val="accent1">
+              <a:shade val="50000"/>
+            </a:schemeClr>
+          </a:lnRef>
+          <a:fillRef idx="1">
+            <a:schemeClr val="accent1"/>
+          </a:fillRef>
+          <a:effectRef idx="0">
+            <a:schemeClr val="accent1"/>
+          </a:effectRef>
+          <a:fontRef idx="minor">
+            <a:schemeClr val="lt1"/>
+          </a:fontRef>
+        </p:style>
+        <p:txBody>
+          <a:bodyPr rtlCol="0" anchor="ctr"/>
+          <a:lstStyle/>
+          <a:p>
+            <a:pPr algn="ctr"/>
+            <a:r>
+              <a:rPr lang="en-US" sz="600" dirty="0">
+                <a:latin typeface="Dubai" panose="020B0503030403030204" pitchFamily="34" charset="-78"/>
+                <a:cs typeface="Dubai" panose="020B0503030403030204" pitchFamily="34" charset="-78"/>
+              </a:rPr>
+              <a:t>update</a:t>
+            </a:r>
+            <a:endParaRPr lang="en-US" sz="3200" dirty="0">
+              <a:latin typeface="Dubai" panose="020B0503030403030204" pitchFamily="34" charset="-78"/>
+              <a:cs typeface="Dubai" panose="020B0503030403030204" pitchFamily="34" charset="-78"/>
+            </a:endParaRPr>
+          </a:p>
+        </p:txBody>
+      </p:sp>
+      <p:cxnSp>
+        <p:nvCxnSpPr>
+          <p:cNvPr id="116" name="Connector: Elbow 115">
+            <a:extLst>
+              <a:ext uri="{FF2B5EF4-FFF2-40B4-BE49-F238E27FC236}">
+                <a16:creationId xmlns:a16="http://schemas.microsoft.com/office/drawing/2014/main" id="{65B2846D-8B8E-45DF-9151-069539E4591C}"/>
+              </a:ext>
+            </a:extLst>
+          </p:cNvPr>
+          <p:cNvCxnSpPr>
+            <a:cxnSpLocks/>
+            <a:stCxn id="111" idx="2"/>
+            <a:endCxn id="115" idx="0"/>
+          </p:cNvCxnSpPr>
+          <p:nvPr/>
+        </p:nvCxnSpPr>
+        <p:spPr>
+          <a:xfrm rot="16200000" flipH="1">
+            <a:off x="5490459" y="4652456"/>
+            <a:ext cx="554412" cy="258836"/>
+          </a:xfrm>
+          <a:prstGeom prst="bentConnector3">
+            <a:avLst>
+              <a:gd name="adj1" fmla="val 50000"/>
+            </a:avLst>
+          </a:prstGeom>
+          <a:ln>
+            <a:tailEnd type="triangle"/>
+          </a:ln>
+        </p:spPr>
+        <p:style>
+          <a:lnRef idx="1">
+            <a:schemeClr val="accent1"/>
+          </a:lnRef>
+          <a:fillRef idx="0">
+            <a:schemeClr val="accent1"/>
+          </a:fillRef>
+          <a:effectRef idx="0">
+            <a:schemeClr val="accent1"/>
+          </a:effectRef>
+          <a:fontRef idx="minor">
+            <a:schemeClr val="tx1"/>
+          </a:fontRef>
+        </p:style>
+      </p:cxnSp>
+      <p:cxnSp>
+        <p:nvCxnSpPr>
+          <p:cNvPr id="117" name="Connector: Elbow 116">
+            <a:extLst>
+              <a:ext uri="{FF2B5EF4-FFF2-40B4-BE49-F238E27FC236}">
+                <a16:creationId xmlns:a16="http://schemas.microsoft.com/office/drawing/2014/main" id="{CA99E263-702C-46C4-BBAB-1E45C2A44F2B}"/>
+              </a:ext>
+            </a:extLst>
+          </p:cNvPr>
+          <p:cNvCxnSpPr>
+            <a:cxnSpLocks/>
+            <a:stCxn id="111" idx="3"/>
+            <a:endCxn id="114" idx="0"/>
+          </p:cNvCxnSpPr>
+          <p:nvPr/>
+        </p:nvCxnSpPr>
+        <p:spPr>
+          <a:xfrm>
+            <a:off x="5897481" y="4386832"/>
+            <a:ext cx="555387" cy="672248"/>
+          </a:xfrm>
+          <a:prstGeom prst="bentConnector2">
+            <a:avLst/>
+          </a:prstGeom>
+          <a:ln>
+            <a:tailEnd type="triangle"/>
+          </a:ln>
+        </p:spPr>
+        <p:style>
+          <a:lnRef idx="1">
+            <a:schemeClr val="accent1"/>
+          </a:lnRef>
+          <a:fillRef idx="0">
+            <a:schemeClr val="accent1"/>
+          </a:fillRef>
+          <a:effectRef idx="0">
+            <a:schemeClr val="accent1"/>
+          </a:effectRef>
+          <a:fontRef idx="minor">
+            <a:schemeClr val="tx1"/>
+          </a:fontRef>
+        </p:style>
+      </p:cxnSp>
+      <p:cxnSp>
+        <p:nvCxnSpPr>
+          <p:cNvPr id="118" name="Connector: Elbow 117">
+            <a:extLst>
+              <a:ext uri="{FF2B5EF4-FFF2-40B4-BE49-F238E27FC236}">
+                <a16:creationId xmlns:a16="http://schemas.microsoft.com/office/drawing/2014/main" id="{1D69B216-CBCC-4FB5-9283-8E299FD37C02}"/>
+              </a:ext>
+            </a:extLst>
+          </p:cNvPr>
+          <p:cNvCxnSpPr>
+            <a:cxnSpLocks/>
+            <a:stCxn id="111" idx="2"/>
+            <a:endCxn id="113" idx="0"/>
+          </p:cNvCxnSpPr>
+          <p:nvPr/>
+        </p:nvCxnSpPr>
+        <p:spPr>
+          <a:xfrm rot="5400000">
+            <a:off x="5212171" y="4631270"/>
+            <a:ext cx="552678" cy="299475"/>
+          </a:xfrm>
+          <a:prstGeom prst="bentConnector3">
+            <a:avLst>
+              <a:gd name="adj1" fmla="val 50000"/>
+            </a:avLst>
+          </a:prstGeom>
+          <a:ln>
+            <a:tailEnd type="triangle"/>
+          </a:ln>
+        </p:spPr>
+        <p:style>
+          <a:lnRef idx="1">
+            <a:schemeClr val="accent1"/>
+          </a:lnRef>
+          <a:fillRef idx="0">
+            <a:schemeClr val="accent1"/>
+          </a:fillRef>
+          <a:effectRef idx="0">
+            <a:schemeClr val="accent1"/>
+          </a:effectRef>
+          <a:fontRef idx="minor">
+            <a:schemeClr val="tx1"/>
+          </a:fontRef>
+        </p:style>
+      </p:cxnSp>
+      <p:cxnSp>
+        <p:nvCxnSpPr>
+          <p:cNvPr id="119" name="Connector: Elbow 118">
+            <a:extLst>
+              <a:ext uri="{FF2B5EF4-FFF2-40B4-BE49-F238E27FC236}">
+                <a16:creationId xmlns:a16="http://schemas.microsoft.com/office/drawing/2014/main" id="{92A51693-2AE1-4839-A60B-26182066922A}"/>
+              </a:ext>
+            </a:extLst>
+          </p:cNvPr>
+          <p:cNvCxnSpPr>
+            <a:cxnSpLocks/>
+            <a:stCxn id="111" idx="1"/>
+            <a:endCxn id="112" idx="0"/>
+          </p:cNvCxnSpPr>
+          <p:nvPr/>
+        </p:nvCxnSpPr>
+        <p:spPr>
+          <a:xfrm rot="10800000" flipV="1">
+            <a:off x="4787130" y="4386832"/>
+            <a:ext cx="591883" cy="670514"/>
+          </a:xfrm>
+          <a:prstGeom prst="bentConnector2">
+            <a:avLst/>
+          </a:prstGeom>
+          <a:ln>
+            <a:tailEnd type="triangle"/>
+          </a:ln>
+        </p:spPr>
+        <p:style>
+          <a:lnRef idx="1">
+            <a:schemeClr val="accent1"/>
+          </a:lnRef>
+          <a:fillRef idx="0">
+            <a:schemeClr val="accent1"/>
+          </a:fillRef>
+          <a:effectRef idx="0">
+            <a:schemeClr val="accent1"/>
+          </a:effectRef>
+          <a:fontRef idx="minor">
+            <a:schemeClr val="tx1"/>
+          </a:fontRef>
+        </p:style>
+      </p:cxnSp>
+      <p:cxnSp>
+        <p:nvCxnSpPr>
+          <p:cNvPr id="124" name="Connector: Elbow 123">
+            <a:extLst>
+              <a:ext uri="{FF2B5EF4-FFF2-40B4-BE49-F238E27FC236}">
+                <a16:creationId xmlns:a16="http://schemas.microsoft.com/office/drawing/2014/main" id="{8ACCC7F7-ACF9-4355-B148-4E8BA9F6EC1A}"/>
+              </a:ext>
+            </a:extLst>
+          </p:cNvPr>
+          <p:cNvCxnSpPr>
+            <a:cxnSpLocks/>
+            <a:endCxn id="111" idx="0"/>
+          </p:cNvCxnSpPr>
+          <p:nvPr/>
+        </p:nvCxnSpPr>
+        <p:spPr>
+          <a:xfrm rot="5400000">
+            <a:off x="5936566" y="3800677"/>
+            <a:ext cx="170001" cy="766637"/>
+          </a:xfrm>
+          <a:prstGeom prst="bentConnector3">
+            <a:avLst>
+              <a:gd name="adj1" fmla="val 50000"/>
+            </a:avLst>
+          </a:prstGeom>
+          <a:ln>
+            <a:tailEnd type="triangle"/>
+          </a:ln>
+        </p:spPr>
+        <p:style>
+          <a:lnRef idx="1">
+            <a:schemeClr val="accent1"/>
+          </a:lnRef>
+          <a:fillRef idx="0">
+            <a:schemeClr val="accent1"/>
+          </a:fillRef>
+          <a:effectRef idx="0">
+            <a:schemeClr val="accent1"/>
+          </a:effectRef>
+          <a:fontRef idx="minor">
+            <a:schemeClr val="tx1"/>
+          </a:fontRef>
+        </p:style>
+      </p:cxnSp>
+      <p:sp>
+        <p:nvSpPr>
+          <p:cNvPr id="128" name="Rectangle: Rounded Corners 127">
+            <a:extLst>
+              <a:ext uri="{FF2B5EF4-FFF2-40B4-BE49-F238E27FC236}">
+                <a16:creationId xmlns:a16="http://schemas.microsoft.com/office/drawing/2014/main" id="{C5DD849A-E3B4-44A8-967B-BA136B830C3E}"/>
+              </a:ext>
+            </a:extLst>
+          </p:cNvPr>
+          <p:cNvSpPr/>
+          <p:nvPr/>
+        </p:nvSpPr>
+        <p:spPr>
+          <a:xfrm>
+            <a:off x="7589135" y="4292528"/>
+            <a:ext cx="518469" cy="235672"/>
+          </a:xfrm>
+          <a:prstGeom prst="roundRect">
+            <a:avLst/>
+          </a:prstGeom>
+        </p:spPr>
+        <p:style>
+          <a:lnRef idx="2">
+            <a:schemeClr val="accent1">
+              <a:shade val="50000"/>
+            </a:schemeClr>
+          </a:lnRef>
+          <a:fillRef idx="1">
+            <a:schemeClr val="accent1"/>
+          </a:fillRef>
+          <a:effectRef idx="0">
+            <a:schemeClr val="accent1"/>
+          </a:effectRef>
+          <a:fontRef idx="minor">
+            <a:schemeClr val="lt1"/>
+          </a:fontRef>
+        </p:style>
+        <p:txBody>
+          <a:bodyPr rtlCol="0" anchor="ctr"/>
+          <a:lstStyle/>
+          <a:p>
+            <a:pPr algn="ctr"/>
+            <a:r>
+              <a:rPr lang="en-US" sz="600" dirty="0">
+                <a:latin typeface="Dubai" panose="020B0503030403030204" pitchFamily="34" charset="-78"/>
+                <a:cs typeface="Dubai" panose="020B0503030403030204" pitchFamily="34" charset="-78"/>
+              </a:rPr>
+              <a:t>Future Costs</a:t>
+            </a:r>
+            <a:endParaRPr lang="en-US" sz="3200" dirty="0">
+              <a:latin typeface="Dubai" panose="020B0503030403030204" pitchFamily="34" charset="-78"/>
+              <a:cs typeface="Dubai" panose="020B0503030403030204" pitchFamily="34" charset="-78"/>
+            </a:endParaRPr>
+          </a:p>
+        </p:txBody>
+      </p:sp>
+      <p:sp>
+        <p:nvSpPr>
+          <p:cNvPr id="129" name="Rectangle: Rounded Corners 128">
+            <a:extLst>
+              <a:ext uri="{FF2B5EF4-FFF2-40B4-BE49-F238E27FC236}">
+                <a16:creationId xmlns:a16="http://schemas.microsoft.com/office/drawing/2014/main" id="{4772E9B2-AE19-4512-B192-57319F093EE6}"/>
+              </a:ext>
+            </a:extLst>
+          </p:cNvPr>
+          <p:cNvSpPr/>
+          <p:nvPr/>
+        </p:nvSpPr>
+        <p:spPr>
+          <a:xfrm>
+            <a:off x="6784883" y="5080878"/>
+            <a:ext cx="424737" cy="176256"/>
+          </a:xfrm>
+          <a:prstGeom prst="roundRect">
+            <a:avLst/>
+          </a:prstGeom>
+        </p:spPr>
+        <p:style>
+          <a:lnRef idx="2">
+            <a:schemeClr val="accent1">
+              <a:shade val="50000"/>
+            </a:schemeClr>
+          </a:lnRef>
+          <a:fillRef idx="1">
+            <a:schemeClr val="accent1"/>
+          </a:fillRef>
+          <a:effectRef idx="0">
+            <a:schemeClr val="accent1"/>
+          </a:effectRef>
+          <a:fontRef idx="minor">
+            <a:schemeClr val="lt1"/>
+          </a:fontRef>
+        </p:style>
+        <p:txBody>
+          <a:bodyPr rtlCol="0" anchor="ctr"/>
+          <a:lstStyle/>
+          <a:p>
+            <a:pPr algn="ctr"/>
+            <a:r>
+              <a:rPr lang="en-US" sz="600" dirty="0">
+                <a:latin typeface="Dubai" panose="020B0503030403030204" pitchFamily="34" charset="-78"/>
+                <a:cs typeface="Dubai" panose="020B0503030403030204" pitchFamily="34" charset="-78"/>
+              </a:rPr>
+              <a:t>create</a:t>
+            </a:r>
+            <a:endParaRPr lang="en-US" sz="3200" dirty="0">
+              <a:latin typeface="Dubai" panose="020B0503030403030204" pitchFamily="34" charset="-78"/>
+              <a:cs typeface="Dubai" panose="020B0503030403030204" pitchFamily="34" charset="-78"/>
+            </a:endParaRPr>
+          </a:p>
+        </p:txBody>
+      </p:sp>
+      <p:sp>
+        <p:nvSpPr>
+          <p:cNvPr id="130" name="Rectangle: Rounded Corners 129">
+            <a:extLst>
+              <a:ext uri="{FF2B5EF4-FFF2-40B4-BE49-F238E27FC236}">
+                <a16:creationId xmlns:a16="http://schemas.microsoft.com/office/drawing/2014/main" id="{CF8DC8BF-7777-482D-9726-9A18196ECB69}"/>
+              </a:ext>
+            </a:extLst>
+          </p:cNvPr>
+          <p:cNvSpPr/>
+          <p:nvPr/>
+        </p:nvSpPr>
+        <p:spPr>
+          <a:xfrm>
+            <a:off x="7336526" y="5080878"/>
+            <a:ext cx="424737" cy="176256"/>
+          </a:xfrm>
+          <a:prstGeom prst="roundRect">
+            <a:avLst/>
+          </a:prstGeom>
+        </p:spPr>
+        <p:style>
+          <a:lnRef idx="2">
+            <a:schemeClr val="accent1">
+              <a:shade val="50000"/>
+            </a:schemeClr>
+          </a:lnRef>
+          <a:fillRef idx="1">
+            <a:schemeClr val="accent1"/>
+          </a:fillRef>
+          <a:effectRef idx="0">
+            <a:schemeClr val="accent1"/>
+          </a:effectRef>
+          <a:fontRef idx="minor">
+            <a:schemeClr val="lt1"/>
+          </a:fontRef>
+        </p:style>
+        <p:txBody>
+          <a:bodyPr rtlCol="0" anchor="ctr"/>
+          <a:lstStyle/>
+          <a:p>
+            <a:pPr algn="ctr"/>
+            <a:r>
+              <a:rPr lang="en-US" sz="600" dirty="0">
+                <a:latin typeface="Dubai" panose="020B0503030403030204" pitchFamily="34" charset="-78"/>
+                <a:cs typeface="Dubai" panose="020B0503030403030204" pitchFamily="34" charset="-78"/>
+              </a:rPr>
+              <a:t>read</a:t>
+            </a:r>
+            <a:endParaRPr lang="en-US" sz="3200" dirty="0">
+              <a:latin typeface="Dubai" panose="020B0503030403030204" pitchFamily="34" charset="-78"/>
+              <a:cs typeface="Dubai" panose="020B0503030403030204" pitchFamily="34" charset="-78"/>
+            </a:endParaRPr>
+          </a:p>
+        </p:txBody>
+      </p:sp>
+      <p:sp>
+        <p:nvSpPr>
+          <p:cNvPr id="131" name="Rectangle: Rounded Corners 130">
+            <a:extLst>
+              <a:ext uri="{FF2B5EF4-FFF2-40B4-BE49-F238E27FC236}">
+                <a16:creationId xmlns:a16="http://schemas.microsoft.com/office/drawing/2014/main" id="{C03BD5D4-5599-487D-880C-970E115CACB9}"/>
+              </a:ext>
+            </a:extLst>
+          </p:cNvPr>
+          <p:cNvSpPr/>
+          <p:nvPr/>
+        </p:nvSpPr>
+        <p:spPr>
+          <a:xfrm>
+            <a:off x="8450622" y="5082612"/>
+            <a:ext cx="424737" cy="176256"/>
+          </a:xfrm>
+          <a:prstGeom prst="roundRect">
+            <a:avLst/>
+          </a:prstGeom>
+        </p:spPr>
+        <p:style>
+          <a:lnRef idx="2">
+            <a:schemeClr val="accent1">
+              <a:shade val="50000"/>
+            </a:schemeClr>
+          </a:lnRef>
+          <a:fillRef idx="1">
+            <a:schemeClr val="accent1"/>
+          </a:fillRef>
+          <a:effectRef idx="0">
+            <a:schemeClr val="accent1"/>
+          </a:effectRef>
+          <a:fontRef idx="minor">
+            <a:schemeClr val="lt1"/>
+          </a:fontRef>
+        </p:style>
+        <p:txBody>
+          <a:bodyPr rtlCol="0" anchor="ctr"/>
+          <a:lstStyle/>
+          <a:p>
+            <a:pPr algn="ctr"/>
+            <a:r>
+              <a:rPr lang="en-US" sz="600" dirty="0">
+                <a:latin typeface="Dubai" panose="020B0503030403030204" pitchFamily="34" charset="-78"/>
+                <a:cs typeface="Dubai" panose="020B0503030403030204" pitchFamily="34" charset="-78"/>
+              </a:rPr>
+              <a:t>delete</a:t>
+            </a:r>
+            <a:endParaRPr lang="en-US" sz="3200" dirty="0">
+              <a:latin typeface="Dubai" panose="020B0503030403030204" pitchFamily="34" charset="-78"/>
+              <a:cs typeface="Dubai" panose="020B0503030403030204" pitchFamily="34" charset="-78"/>
+            </a:endParaRPr>
+          </a:p>
+        </p:txBody>
+      </p:sp>
+      <p:sp>
+        <p:nvSpPr>
+          <p:cNvPr id="132" name="Rectangle: Rounded Corners 131">
+            <a:extLst>
+              <a:ext uri="{FF2B5EF4-FFF2-40B4-BE49-F238E27FC236}">
+                <a16:creationId xmlns:a16="http://schemas.microsoft.com/office/drawing/2014/main" id="{4FA647F7-F364-4F90-BF58-2408212B5153}"/>
+              </a:ext>
+            </a:extLst>
+          </p:cNvPr>
+          <p:cNvSpPr/>
+          <p:nvPr/>
+        </p:nvSpPr>
+        <p:spPr>
+          <a:xfrm>
+            <a:off x="7894837" y="5082612"/>
+            <a:ext cx="424737" cy="176256"/>
+          </a:xfrm>
+          <a:prstGeom prst="roundRect">
+            <a:avLst/>
+          </a:prstGeom>
+        </p:spPr>
+        <p:style>
+          <a:lnRef idx="2">
+            <a:schemeClr val="accent1">
+              <a:shade val="50000"/>
+            </a:schemeClr>
+          </a:lnRef>
+          <a:fillRef idx="1">
+            <a:schemeClr val="accent1"/>
+          </a:fillRef>
+          <a:effectRef idx="0">
+            <a:schemeClr val="accent1"/>
+          </a:effectRef>
+          <a:fontRef idx="minor">
+            <a:schemeClr val="lt1"/>
+          </a:fontRef>
+        </p:style>
+        <p:txBody>
+          <a:bodyPr rtlCol="0" anchor="ctr"/>
+          <a:lstStyle/>
+          <a:p>
+            <a:pPr algn="ctr"/>
+            <a:r>
+              <a:rPr lang="en-US" sz="600" dirty="0">
+                <a:latin typeface="Dubai" panose="020B0503030403030204" pitchFamily="34" charset="-78"/>
+                <a:cs typeface="Dubai" panose="020B0503030403030204" pitchFamily="34" charset="-78"/>
+              </a:rPr>
+              <a:t>update</a:t>
+            </a:r>
+            <a:endParaRPr lang="en-US" sz="3200" dirty="0">
+              <a:latin typeface="Dubai" panose="020B0503030403030204" pitchFamily="34" charset="-78"/>
+              <a:cs typeface="Dubai" panose="020B0503030403030204" pitchFamily="34" charset="-78"/>
+            </a:endParaRPr>
+          </a:p>
+        </p:txBody>
+      </p:sp>
+      <p:cxnSp>
+        <p:nvCxnSpPr>
+          <p:cNvPr id="133" name="Connector: Elbow 132">
+            <a:extLst>
+              <a:ext uri="{FF2B5EF4-FFF2-40B4-BE49-F238E27FC236}">
+                <a16:creationId xmlns:a16="http://schemas.microsoft.com/office/drawing/2014/main" id="{200A2602-33AE-459A-954E-4067EE469103}"/>
+              </a:ext>
+            </a:extLst>
+          </p:cNvPr>
+          <p:cNvCxnSpPr>
+            <a:cxnSpLocks/>
+            <a:stCxn id="128" idx="2"/>
+            <a:endCxn id="132" idx="0"/>
+          </p:cNvCxnSpPr>
+          <p:nvPr/>
+        </p:nvCxnSpPr>
+        <p:spPr>
+          <a:xfrm rot="16200000" flipH="1">
+            <a:off x="7700582" y="4675988"/>
+            <a:ext cx="554412" cy="258836"/>
+          </a:xfrm>
+          <a:prstGeom prst="bentConnector3">
+            <a:avLst>
+              <a:gd name="adj1" fmla="val 50000"/>
+            </a:avLst>
+          </a:prstGeom>
+          <a:ln>
+            <a:tailEnd type="triangle"/>
+          </a:ln>
+        </p:spPr>
+        <p:style>
+          <a:lnRef idx="1">
+            <a:schemeClr val="accent1"/>
+          </a:lnRef>
+          <a:fillRef idx="0">
+            <a:schemeClr val="accent1"/>
+          </a:fillRef>
+          <a:effectRef idx="0">
+            <a:schemeClr val="accent1"/>
+          </a:effectRef>
+          <a:fontRef idx="minor">
+            <a:schemeClr val="tx1"/>
+          </a:fontRef>
+        </p:style>
+      </p:cxnSp>
+      <p:cxnSp>
+        <p:nvCxnSpPr>
+          <p:cNvPr id="134" name="Connector: Elbow 133">
+            <a:extLst>
+              <a:ext uri="{FF2B5EF4-FFF2-40B4-BE49-F238E27FC236}">
+                <a16:creationId xmlns:a16="http://schemas.microsoft.com/office/drawing/2014/main" id="{1F6E3D33-AD3D-42F9-9849-F4D28FE2D76B}"/>
+              </a:ext>
+            </a:extLst>
+          </p:cNvPr>
+          <p:cNvCxnSpPr>
+            <a:cxnSpLocks/>
+            <a:stCxn id="128" idx="3"/>
+            <a:endCxn id="131" idx="0"/>
+          </p:cNvCxnSpPr>
+          <p:nvPr/>
+        </p:nvCxnSpPr>
+        <p:spPr>
+          <a:xfrm>
+            <a:off x="8107604" y="4410364"/>
+            <a:ext cx="555387" cy="672248"/>
+          </a:xfrm>
+          <a:prstGeom prst="bentConnector2">
+            <a:avLst/>
+          </a:prstGeom>
+          <a:ln>
+            <a:tailEnd type="triangle"/>
+          </a:ln>
+        </p:spPr>
+        <p:style>
+          <a:lnRef idx="1">
+            <a:schemeClr val="accent1"/>
+          </a:lnRef>
+          <a:fillRef idx="0">
+            <a:schemeClr val="accent1"/>
+          </a:fillRef>
+          <a:effectRef idx="0">
+            <a:schemeClr val="accent1"/>
+          </a:effectRef>
+          <a:fontRef idx="minor">
+            <a:schemeClr val="tx1"/>
+          </a:fontRef>
+        </p:style>
+      </p:cxnSp>
+      <p:cxnSp>
+        <p:nvCxnSpPr>
+          <p:cNvPr id="135" name="Connector: Elbow 134">
+            <a:extLst>
+              <a:ext uri="{FF2B5EF4-FFF2-40B4-BE49-F238E27FC236}">
+                <a16:creationId xmlns:a16="http://schemas.microsoft.com/office/drawing/2014/main" id="{8DF16F1E-03DD-4139-8B28-8E90D36BC81E}"/>
+              </a:ext>
+            </a:extLst>
+          </p:cNvPr>
+          <p:cNvCxnSpPr>
+            <a:cxnSpLocks/>
+            <a:stCxn id="128" idx="2"/>
+            <a:endCxn id="130" idx="0"/>
+          </p:cNvCxnSpPr>
+          <p:nvPr/>
+        </p:nvCxnSpPr>
+        <p:spPr>
+          <a:xfrm rot="5400000">
+            <a:off x="7422294" y="4654802"/>
+            <a:ext cx="552678" cy="299475"/>
+          </a:xfrm>
+          <a:prstGeom prst="bentConnector3">
+            <a:avLst>
+              <a:gd name="adj1" fmla="val 50000"/>
+            </a:avLst>
+          </a:prstGeom>
+          <a:ln>
+            <a:tailEnd type="triangle"/>
+          </a:ln>
+        </p:spPr>
+        <p:style>
+          <a:lnRef idx="1">
+            <a:schemeClr val="accent1"/>
+          </a:lnRef>
+          <a:fillRef idx="0">
+            <a:schemeClr val="accent1"/>
+          </a:fillRef>
+          <a:effectRef idx="0">
+            <a:schemeClr val="accent1"/>
+          </a:effectRef>
+          <a:fontRef idx="minor">
+            <a:schemeClr val="tx1"/>
+          </a:fontRef>
+        </p:style>
+      </p:cxnSp>
+      <p:cxnSp>
+        <p:nvCxnSpPr>
+          <p:cNvPr id="136" name="Connector: Elbow 135">
+            <a:extLst>
+              <a:ext uri="{FF2B5EF4-FFF2-40B4-BE49-F238E27FC236}">
+                <a16:creationId xmlns:a16="http://schemas.microsoft.com/office/drawing/2014/main" id="{EF96CD51-7B9D-45BF-A3D2-8B1240849669}"/>
+              </a:ext>
+            </a:extLst>
+          </p:cNvPr>
+          <p:cNvCxnSpPr>
+            <a:cxnSpLocks/>
+            <a:stCxn id="128" idx="1"/>
+            <a:endCxn id="129" idx="0"/>
+          </p:cNvCxnSpPr>
+          <p:nvPr/>
+        </p:nvCxnSpPr>
+        <p:spPr>
+          <a:xfrm rot="10800000" flipV="1">
+            <a:off x="6997253" y="4410364"/>
+            <a:ext cx="591883" cy="670514"/>
+          </a:xfrm>
+          <a:prstGeom prst="bentConnector2">
+            <a:avLst/>
+          </a:prstGeom>
+          <a:ln>
+            <a:tailEnd type="triangle"/>
+          </a:ln>
+        </p:spPr>
+        <p:style>
+          <a:lnRef idx="1">
+            <a:schemeClr val="accent1"/>
+          </a:lnRef>
+          <a:fillRef idx="0">
+            <a:schemeClr val="accent1"/>
+          </a:fillRef>
+          <a:effectRef idx="0">
+            <a:schemeClr val="accent1"/>
+          </a:effectRef>
+          <a:fontRef idx="minor">
+            <a:schemeClr val="tx1"/>
+          </a:fontRef>
+        </p:style>
+      </p:cxnSp>
+      <p:cxnSp>
+        <p:nvCxnSpPr>
+          <p:cNvPr id="146" name="Connector: Elbow 145">
+            <a:extLst>
+              <a:ext uri="{FF2B5EF4-FFF2-40B4-BE49-F238E27FC236}">
+                <a16:creationId xmlns:a16="http://schemas.microsoft.com/office/drawing/2014/main" id="{CC290038-4F24-4F08-B9BC-3128D47A8F84}"/>
+              </a:ext>
+            </a:extLst>
+          </p:cNvPr>
+          <p:cNvCxnSpPr>
+            <a:cxnSpLocks/>
+            <a:stCxn id="5" idx="3"/>
+            <a:endCxn id="46" idx="1"/>
+          </p:cNvCxnSpPr>
+          <p:nvPr/>
+        </p:nvCxnSpPr>
+        <p:spPr>
+          <a:xfrm>
+            <a:off x="9681387" y="2914555"/>
+            <a:ext cx="203462" cy="580"/>
+          </a:xfrm>
+          <a:prstGeom prst="bentConnector3">
+            <a:avLst>
+              <a:gd name="adj1" fmla="val 50000"/>
+            </a:avLst>
+          </a:prstGeom>
+          <a:ln>
+            <a:tailEnd type="triangle"/>
+          </a:ln>
+        </p:spPr>
+        <p:style>
+          <a:lnRef idx="1">
+            <a:schemeClr val="accent1"/>
+          </a:lnRef>
+          <a:fillRef idx="0">
+            <a:schemeClr val="accent1"/>
+          </a:fillRef>
+          <a:effectRef idx="0">
+            <a:schemeClr val="accent1"/>
+          </a:effectRef>
+          <a:fontRef idx="minor">
+            <a:schemeClr val="tx1"/>
+          </a:fontRef>
+        </p:style>
+      </p:cxnSp>
+      <p:sp>
+        <p:nvSpPr>
+          <p:cNvPr id="156" name="Star: 5 Points 155">
+            <a:extLst>
+              <a:ext uri="{FF2B5EF4-FFF2-40B4-BE49-F238E27FC236}">
+                <a16:creationId xmlns:a16="http://schemas.microsoft.com/office/drawing/2014/main" id="{F8907793-F303-4809-B59C-243AB5759816}"/>
+              </a:ext>
+            </a:extLst>
+          </p:cNvPr>
+          <p:cNvSpPr/>
+          <p:nvPr/>
+        </p:nvSpPr>
+        <p:spPr>
+          <a:xfrm>
+            <a:off x="2676153" y="383694"/>
+            <a:ext cx="240127" cy="237401"/>
+          </a:xfrm>
+          <a:prstGeom prst="star5">
+            <a:avLst/>
+          </a:prstGeom>
+          <a:solidFill>
+            <a:srgbClr val="00B050"/>
+          </a:solidFill>
+        </p:spPr>
+        <p:style>
+          <a:lnRef idx="0">
+            <a:schemeClr val="accent6"/>
+          </a:lnRef>
+          <a:fillRef idx="3">
+            <a:schemeClr val="accent6"/>
+          </a:fillRef>
+          <a:effectRef idx="3">
+            <a:schemeClr val="accent6"/>
+          </a:effectRef>
+          <a:fontRef idx="minor">
+            <a:schemeClr val="lt1"/>
+          </a:fontRef>
+        </p:style>
+        <p:txBody>
+          <a:bodyPr rtlCol="0" anchor="ctr"/>
+          <a:lstStyle/>
+          <a:p>
+            <a:pPr algn="ctr"/>
+            <a:endParaRPr lang="en-US"/>
+          </a:p>
+        </p:txBody>
+      </p:sp>
+      <p:sp>
+        <p:nvSpPr>
+          <p:cNvPr id="157" name="Star: 5 Points 156">
+            <a:extLst>
+              <a:ext uri="{FF2B5EF4-FFF2-40B4-BE49-F238E27FC236}">
+                <a16:creationId xmlns:a16="http://schemas.microsoft.com/office/drawing/2014/main" id="{583B8A9A-ED88-4802-B0E4-55967C575EAF}"/>
+              </a:ext>
+            </a:extLst>
+          </p:cNvPr>
+          <p:cNvSpPr/>
+          <p:nvPr/>
+        </p:nvSpPr>
+        <p:spPr>
+          <a:xfrm>
+            <a:off x="2676153" y="688406"/>
+            <a:ext cx="240127" cy="237401"/>
+          </a:xfrm>
+          <a:prstGeom prst="star5">
+            <a:avLst/>
+          </a:prstGeom>
+          <a:solidFill>
+            <a:srgbClr val="FF0000"/>
+          </a:solidFill>
+        </p:spPr>
+        <p:style>
+          <a:lnRef idx="0">
+            <a:schemeClr val="accent6"/>
+          </a:lnRef>
+          <a:fillRef idx="3">
+            <a:schemeClr val="accent6"/>
+          </a:fillRef>
+          <a:effectRef idx="3">
+            <a:schemeClr val="accent6"/>
+          </a:effectRef>
+          <a:fontRef idx="minor">
+            <a:schemeClr val="lt1"/>
+          </a:fontRef>
+        </p:style>
+        <p:txBody>
+          <a:bodyPr rtlCol="0" anchor="ctr"/>
+          <a:lstStyle/>
+          <a:p>
+            <a:pPr algn="ctr"/>
+            <a:endParaRPr lang="en-US"/>
+          </a:p>
+        </p:txBody>
+      </p:sp>
+      <p:sp>
+        <p:nvSpPr>
+          <p:cNvPr id="158" name="Star: 5 Points 157">
+            <a:extLst>
+              <a:ext uri="{FF2B5EF4-FFF2-40B4-BE49-F238E27FC236}">
+                <a16:creationId xmlns:a16="http://schemas.microsoft.com/office/drawing/2014/main" id="{6475CC6A-0044-4B44-A893-D64BB3D3202B}"/>
+              </a:ext>
+            </a:extLst>
+          </p:cNvPr>
+          <p:cNvSpPr/>
+          <p:nvPr/>
+        </p:nvSpPr>
+        <p:spPr>
+          <a:xfrm>
+            <a:off x="2928762" y="690356"/>
+            <a:ext cx="240127" cy="237401"/>
+          </a:xfrm>
+          <a:prstGeom prst="star5">
+            <a:avLst/>
+          </a:prstGeom>
+          <a:solidFill>
+            <a:srgbClr val="FF0000"/>
+          </a:solidFill>
+        </p:spPr>
+        <p:style>
+          <a:lnRef idx="0">
+            <a:schemeClr val="accent6"/>
+          </a:lnRef>
+          <a:fillRef idx="3">
+            <a:schemeClr val="accent6"/>
+          </a:fillRef>
+          <a:effectRef idx="3">
+            <a:schemeClr val="accent6"/>
+          </a:effectRef>
+          <a:fontRef idx="minor">
+            <a:schemeClr val="lt1"/>
+          </a:fontRef>
+        </p:style>
+        <p:txBody>
+          <a:bodyPr rtlCol="0" anchor="ctr"/>
+          <a:lstStyle/>
+          <a:p>
+            <a:pPr algn="ctr"/>
+            <a:endParaRPr lang="en-US"/>
+          </a:p>
+        </p:txBody>
+      </p:sp>
+      <p:sp>
+        <p:nvSpPr>
+          <p:cNvPr id="159" name="Star: 5 Points 158">
+            <a:extLst>
+              <a:ext uri="{FF2B5EF4-FFF2-40B4-BE49-F238E27FC236}">
+                <a16:creationId xmlns:a16="http://schemas.microsoft.com/office/drawing/2014/main" id="{C364D6B2-0F70-47E9-9E86-EC6E99861A36}"/>
+              </a:ext>
+            </a:extLst>
+          </p:cNvPr>
+          <p:cNvSpPr/>
+          <p:nvPr/>
+        </p:nvSpPr>
+        <p:spPr>
+          <a:xfrm>
+            <a:off x="3181371" y="692306"/>
+            <a:ext cx="240127" cy="237401"/>
+          </a:xfrm>
+          <a:prstGeom prst="star5">
+            <a:avLst/>
+          </a:prstGeom>
+          <a:solidFill>
+            <a:srgbClr val="FF0000"/>
+          </a:solidFill>
+        </p:spPr>
+        <p:style>
+          <a:lnRef idx="0">
+            <a:schemeClr val="accent6"/>
+          </a:lnRef>
+          <a:fillRef idx="3">
+            <a:schemeClr val="accent6"/>
+          </a:fillRef>
+          <a:effectRef idx="3">
+            <a:schemeClr val="accent6"/>
+          </a:effectRef>
+          <a:fontRef idx="minor">
+            <a:schemeClr val="lt1"/>
+          </a:fontRef>
+        </p:style>
+        <p:txBody>
+          <a:bodyPr rtlCol="0" anchor="ctr"/>
+          <a:lstStyle/>
+          <a:p>
+            <a:pPr algn="ctr"/>
+            <a:endParaRPr lang="en-US"/>
+          </a:p>
+        </p:txBody>
+      </p:sp>
+      <p:sp>
+        <p:nvSpPr>
+          <p:cNvPr id="160" name="Star: 5 Points 159">
+            <a:extLst>
+              <a:ext uri="{FF2B5EF4-FFF2-40B4-BE49-F238E27FC236}">
+                <a16:creationId xmlns:a16="http://schemas.microsoft.com/office/drawing/2014/main" id="{5016D7D0-1891-4B90-B54C-9ABC59E35956}"/>
+              </a:ext>
+            </a:extLst>
+          </p:cNvPr>
+          <p:cNvSpPr/>
+          <p:nvPr/>
+        </p:nvSpPr>
+        <p:spPr>
+          <a:xfrm>
+            <a:off x="3433980" y="694256"/>
+            <a:ext cx="240127" cy="237401"/>
+          </a:xfrm>
+          <a:prstGeom prst="star5">
+            <a:avLst/>
+          </a:prstGeom>
+          <a:solidFill>
+            <a:srgbClr val="FF0000"/>
+          </a:solidFill>
+        </p:spPr>
+        <p:style>
+          <a:lnRef idx="0">
+            <a:schemeClr val="accent6"/>
+          </a:lnRef>
+          <a:fillRef idx="3">
+            <a:schemeClr val="accent6"/>
+          </a:fillRef>
+          <a:effectRef idx="3">
+            <a:schemeClr val="accent6"/>
+          </a:effectRef>
+          <a:fontRef idx="minor">
+            <a:schemeClr val="lt1"/>
+          </a:fontRef>
+        </p:style>
+        <p:txBody>
+          <a:bodyPr rtlCol="0" anchor="ctr"/>
+          <a:lstStyle/>
+          <a:p>
+            <a:pPr algn="ctr"/>
+            <a:endParaRPr lang="en-US"/>
+          </a:p>
+        </p:txBody>
+      </p:sp>
+      <p:sp>
+        <p:nvSpPr>
+          <p:cNvPr id="161" name="Star: 5 Points 160">
+            <a:extLst>
+              <a:ext uri="{FF2B5EF4-FFF2-40B4-BE49-F238E27FC236}">
+                <a16:creationId xmlns:a16="http://schemas.microsoft.com/office/drawing/2014/main" id="{1A4BB01B-1237-448E-9A8C-2B84D3DE9BDE}"/>
+              </a:ext>
+            </a:extLst>
+          </p:cNvPr>
+          <p:cNvSpPr/>
+          <p:nvPr/>
+        </p:nvSpPr>
+        <p:spPr>
+          <a:xfrm>
+            <a:off x="3686589" y="696206"/>
+            <a:ext cx="240127" cy="237401"/>
+          </a:xfrm>
+          <a:prstGeom prst="star5">
+            <a:avLst/>
+          </a:prstGeom>
+          <a:solidFill>
+            <a:srgbClr val="FF0000"/>
+          </a:solidFill>
+        </p:spPr>
+        <p:style>
+          <a:lnRef idx="0">
+            <a:schemeClr val="accent6"/>
+          </a:lnRef>
+          <a:fillRef idx="3">
+            <a:schemeClr val="accent6"/>
+          </a:fillRef>
+          <a:effectRef idx="3">
+            <a:schemeClr val="accent6"/>
+          </a:effectRef>
+          <a:fontRef idx="minor">
+            <a:schemeClr val="lt1"/>
+          </a:fontRef>
+        </p:style>
+        <p:txBody>
+          <a:bodyPr rtlCol="0" anchor="ctr"/>
+          <a:lstStyle/>
+          <a:p>
+            <a:pPr algn="ctr"/>
+            <a:endParaRPr lang="en-US"/>
+          </a:p>
+        </p:txBody>
+      </p:sp>
+      <p:sp>
+        <p:nvSpPr>
+          <p:cNvPr id="162" name="Star: 5 Points 161">
+            <a:extLst>
+              <a:ext uri="{FF2B5EF4-FFF2-40B4-BE49-F238E27FC236}">
+                <a16:creationId xmlns:a16="http://schemas.microsoft.com/office/drawing/2014/main" id="{D3E8A1E0-76AA-4F92-9A2E-1F52D21A7DE0}"/>
+              </a:ext>
+            </a:extLst>
+          </p:cNvPr>
+          <p:cNvSpPr/>
+          <p:nvPr/>
+        </p:nvSpPr>
+        <p:spPr>
+          <a:xfrm>
+            <a:off x="3939198" y="698156"/>
+            <a:ext cx="240127" cy="237401"/>
+          </a:xfrm>
+          <a:prstGeom prst="star5">
+            <a:avLst/>
+          </a:prstGeom>
+          <a:solidFill>
+            <a:srgbClr val="FF0000"/>
+          </a:solidFill>
+        </p:spPr>
+        <p:style>
+          <a:lnRef idx="0">
+            <a:schemeClr val="accent6"/>
+          </a:lnRef>
+          <a:fillRef idx="3">
+            <a:schemeClr val="accent6"/>
+          </a:fillRef>
+          <a:effectRef idx="3">
+            <a:schemeClr val="accent6"/>
+          </a:effectRef>
+          <a:fontRef idx="minor">
+            <a:schemeClr val="lt1"/>
+          </a:fontRef>
+        </p:style>
+        <p:txBody>
+          <a:bodyPr rtlCol="0" anchor="ctr"/>
+          <a:lstStyle/>
+          <a:p>
+            <a:pPr algn="ctr"/>
+            <a:endParaRPr lang="en-US"/>
+          </a:p>
+        </p:txBody>
+      </p:sp>
+      <p:sp>
+        <p:nvSpPr>
+          <p:cNvPr id="163" name="Star: 5 Points 162">
+            <a:extLst>
+              <a:ext uri="{FF2B5EF4-FFF2-40B4-BE49-F238E27FC236}">
+                <a16:creationId xmlns:a16="http://schemas.microsoft.com/office/drawing/2014/main" id="{5A8AA874-22A0-47E3-9231-EC2335AC5B56}"/>
+              </a:ext>
+            </a:extLst>
+          </p:cNvPr>
+          <p:cNvSpPr/>
+          <p:nvPr/>
+        </p:nvSpPr>
+        <p:spPr>
+          <a:xfrm>
+            <a:off x="4191807" y="700106"/>
+            <a:ext cx="240127" cy="237401"/>
+          </a:xfrm>
+          <a:prstGeom prst="star5">
+            <a:avLst/>
+          </a:prstGeom>
+          <a:solidFill>
+            <a:srgbClr val="FF0000"/>
+          </a:solidFill>
+        </p:spPr>
+        <p:style>
+          <a:lnRef idx="0">
+            <a:schemeClr val="accent6"/>
+          </a:lnRef>
+          <a:fillRef idx="3">
+            <a:schemeClr val="accent6"/>
+          </a:fillRef>
+          <a:effectRef idx="3">
+            <a:schemeClr val="accent6"/>
+          </a:effectRef>
+          <a:fontRef idx="minor">
+            <a:schemeClr val="lt1"/>
+          </a:fontRef>
+        </p:style>
+        <p:txBody>
+          <a:bodyPr rtlCol="0" anchor="ctr"/>
+          <a:lstStyle/>
+          <a:p>
+            <a:pPr algn="ctr"/>
+            <a:endParaRPr lang="en-US"/>
+          </a:p>
+        </p:txBody>
+      </p:sp>
+      <p:sp>
+        <p:nvSpPr>
+          <p:cNvPr id="164" name="Star: 5 Points 163">
+            <a:extLst>
+              <a:ext uri="{FF2B5EF4-FFF2-40B4-BE49-F238E27FC236}">
+                <a16:creationId xmlns:a16="http://schemas.microsoft.com/office/drawing/2014/main" id="{8F066CA2-9B88-4375-A8D8-801E5E56D198}"/>
+              </a:ext>
+            </a:extLst>
+          </p:cNvPr>
+          <p:cNvSpPr/>
+          <p:nvPr/>
+        </p:nvSpPr>
+        <p:spPr>
+          <a:xfrm>
+            <a:off x="4444416" y="702056"/>
+            <a:ext cx="240127" cy="237401"/>
+          </a:xfrm>
+          <a:prstGeom prst="star5">
+            <a:avLst/>
+          </a:prstGeom>
+          <a:solidFill>
+            <a:srgbClr val="FF0000"/>
+          </a:solidFill>
+        </p:spPr>
+        <p:style>
+          <a:lnRef idx="0">
+            <a:schemeClr val="accent6"/>
+          </a:lnRef>
+          <a:fillRef idx="3">
+            <a:schemeClr val="accent6"/>
+          </a:fillRef>
+          <a:effectRef idx="3">
+            <a:schemeClr val="accent6"/>
+          </a:effectRef>
+          <a:fontRef idx="minor">
+            <a:schemeClr val="lt1"/>
+          </a:fontRef>
+        </p:style>
+        <p:txBody>
+          <a:bodyPr rtlCol="0" anchor="ctr"/>
+          <a:lstStyle/>
+          <a:p>
+            <a:pPr algn="ctr"/>
+            <a:endParaRPr lang="en-US"/>
+          </a:p>
+        </p:txBody>
+      </p:sp>
+      <p:sp>
+        <p:nvSpPr>
+          <p:cNvPr id="165" name="Star: 5 Points 164">
+            <a:extLst>
+              <a:ext uri="{FF2B5EF4-FFF2-40B4-BE49-F238E27FC236}">
+                <a16:creationId xmlns:a16="http://schemas.microsoft.com/office/drawing/2014/main" id="{EE05EA2A-C0AD-48DB-9963-8B0BE84134F3}"/>
+              </a:ext>
+            </a:extLst>
+          </p:cNvPr>
+          <p:cNvSpPr/>
+          <p:nvPr/>
+        </p:nvSpPr>
+        <p:spPr>
+          <a:xfrm>
+            <a:off x="4697025" y="704006"/>
+            <a:ext cx="240127" cy="237401"/>
+          </a:xfrm>
+          <a:prstGeom prst="star5">
+            <a:avLst/>
+          </a:prstGeom>
+          <a:solidFill>
+            <a:srgbClr val="FF0000"/>
+          </a:solidFill>
+        </p:spPr>
+        <p:style>
+          <a:lnRef idx="0">
+            <a:schemeClr val="accent6"/>
+          </a:lnRef>
+          <a:fillRef idx="3">
+            <a:schemeClr val="accent6"/>
+          </a:fillRef>
+          <a:effectRef idx="3">
+            <a:schemeClr val="accent6"/>
+          </a:effectRef>
+          <a:fontRef idx="minor">
+            <a:schemeClr val="lt1"/>
+          </a:fontRef>
+        </p:style>
+        <p:txBody>
+          <a:bodyPr rtlCol="0" anchor="ctr"/>
+          <a:lstStyle/>
+          <a:p>
+            <a:pPr algn="ctr"/>
+            <a:endParaRPr lang="en-US"/>
+          </a:p>
+        </p:txBody>
+      </p:sp>
+      <p:sp>
+        <p:nvSpPr>
+          <p:cNvPr id="166" name="Star: 5 Points 165">
+            <a:extLst>
+              <a:ext uri="{FF2B5EF4-FFF2-40B4-BE49-F238E27FC236}">
+                <a16:creationId xmlns:a16="http://schemas.microsoft.com/office/drawing/2014/main" id="{F99F2342-B902-4E8B-A174-F91C8B13E8A9}"/>
+              </a:ext>
+            </a:extLst>
+          </p:cNvPr>
+          <p:cNvSpPr/>
+          <p:nvPr/>
+        </p:nvSpPr>
+        <p:spPr>
+          <a:xfrm>
+            <a:off x="4949634" y="705956"/>
+            <a:ext cx="240127" cy="237401"/>
+          </a:xfrm>
+          <a:prstGeom prst="star5">
+            <a:avLst/>
+          </a:prstGeom>
+          <a:solidFill>
+            <a:srgbClr val="FF0000"/>
+          </a:solidFill>
+        </p:spPr>
+        <p:style>
+          <a:lnRef idx="0">
+            <a:schemeClr val="accent6"/>
+          </a:lnRef>
+          <a:fillRef idx="3">
+            <a:schemeClr val="accent6"/>
+          </a:fillRef>
+          <a:effectRef idx="3">
+            <a:schemeClr val="accent6"/>
+          </a:effectRef>
+          <a:fontRef idx="minor">
+            <a:schemeClr val="lt1"/>
+          </a:fontRef>
+        </p:style>
+        <p:txBody>
+          <a:bodyPr rtlCol="0" anchor="ctr"/>
+          <a:lstStyle/>
+          <a:p>
+            <a:pPr algn="ctr"/>
+            <a:endParaRPr lang="en-US"/>
+          </a:p>
+        </p:txBody>
+      </p:sp>
+      <p:sp>
+        <p:nvSpPr>
+          <p:cNvPr id="167" name="Star: 5 Points 166">
+            <a:extLst>
+              <a:ext uri="{FF2B5EF4-FFF2-40B4-BE49-F238E27FC236}">
+                <a16:creationId xmlns:a16="http://schemas.microsoft.com/office/drawing/2014/main" id="{6F38E5BB-573D-498E-8EDE-BF94F0B5B0B8}"/>
+              </a:ext>
+            </a:extLst>
+          </p:cNvPr>
+          <p:cNvSpPr/>
+          <p:nvPr/>
+        </p:nvSpPr>
+        <p:spPr>
+          <a:xfrm>
+            <a:off x="5202243" y="707906"/>
+            <a:ext cx="240127" cy="237401"/>
+          </a:xfrm>
+          <a:prstGeom prst="star5">
+            <a:avLst/>
+          </a:prstGeom>
+          <a:solidFill>
+            <a:srgbClr val="FF0000"/>
+          </a:solidFill>
+        </p:spPr>
+        <p:style>
+          <a:lnRef idx="0">
+            <a:schemeClr val="accent6"/>
+          </a:lnRef>
+          <a:fillRef idx="3">
+            <a:schemeClr val="accent6"/>
+          </a:fillRef>
+          <a:effectRef idx="3">
+            <a:schemeClr val="accent6"/>
+          </a:effectRef>
+          <a:fontRef idx="minor">
+            <a:schemeClr val="lt1"/>
+          </a:fontRef>
+        </p:style>
+        <p:txBody>
+          <a:bodyPr rtlCol="0" anchor="ctr"/>
+          <a:lstStyle/>
+          <a:p>
+            <a:pPr algn="ctr"/>
+            <a:endParaRPr lang="en-US"/>
+          </a:p>
+        </p:txBody>
+      </p:sp>
+      <p:sp>
+        <p:nvSpPr>
+          <p:cNvPr id="168" name="Star: 5 Points 167">
+            <a:extLst>
+              <a:ext uri="{FF2B5EF4-FFF2-40B4-BE49-F238E27FC236}">
+                <a16:creationId xmlns:a16="http://schemas.microsoft.com/office/drawing/2014/main" id="{2C282A1F-4B9D-4ECD-ADC8-549EC692235C}"/>
+              </a:ext>
+            </a:extLst>
+          </p:cNvPr>
+          <p:cNvSpPr/>
+          <p:nvPr/>
+        </p:nvSpPr>
+        <p:spPr>
+          <a:xfrm>
+            <a:off x="5454852" y="709856"/>
+            <a:ext cx="240127" cy="237401"/>
+          </a:xfrm>
+          <a:prstGeom prst="star5">
+            <a:avLst/>
+          </a:prstGeom>
+          <a:solidFill>
+            <a:srgbClr val="FF0000"/>
+          </a:solidFill>
+        </p:spPr>
+        <p:style>
+          <a:lnRef idx="0">
+            <a:schemeClr val="accent6"/>
+          </a:lnRef>
+          <a:fillRef idx="3">
+            <a:schemeClr val="accent6"/>
+          </a:fillRef>
+          <a:effectRef idx="3">
+            <a:schemeClr val="accent6"/>
+          </a:effectRef>
+          <a:fontRef idx="minor">
+            <a:schemeClr val="lt1"/>
+          </a:fontRef>
+        </p:style>
+        <p:txBody>
+          <a:bodyPr rtlCol="0" anchor="ctr"/>
+          <a:lstStyle/>
+          <a:p>
+            <a:pPr algn="ctr"/>
+            <a:endParaRPr lang="en-US"/>
+          </a:p>
+        </p:txBody>
+      </p:sp>
+      <p:sp>
+        <p:nvSpPr>
+          <p:cNvPr id="169" name="Star: 5 Points 168">
+            <a:extLst>
+              <a:ext uri="{FF2B5EF4-FFF2-40B4-BE49-F238E27FC236}">
+                <a16:creationId xmlns:a16="http://schemas.microsoft.com/office/drawing/2014/main" id="{94D86F9F-9E79-4035-AD54-01BA6103631C}"/>
+              </a:ext>
+            </a:extLst>
+          </p:cNvPr>
+          <p:cNvSpPr/>
+          <p:nvPr/>
+        </p:nvSpPr>
+        <p:spPr>
+          <a:xfrm>
+            <a:off x="5707461" y="711806"/>
+            <a:ext cx="240127" cy="237401"/>
+          </a:xfrm>
+          <a:prstGeom prst="star5">
+            <a:avLst/>
+          </a:prstGeom>
+          <a:solidFill>
+            <a:srgbClr val="FF0000"/>
+          </a:solidFill>
+        </p:spPr>
+        <p:style>
+          <a:lnRef idx="0">
+            <a:schemeClr val="accent6"/>
+          </a:lnRef>
+          <a:fillRef idx="3">
+            <a:schemeClr val="accent6"/>
+          </a:fillRef>
+          <a:effectRef idx="3">
+            <a:schemeClr val="accent6"/>
+          </a:effectRef>
+          <a:fontRef idx="minor">
+            <a:schemeClr val="lt1"/>
+          </a:fontRef>
+        </p:style>
+        <p:txBody>
+          <a:bodyPr rtlCol="0" anchor="ctr"/>
+          <a:lstStyle/>
+          <a:p>
+            <a:pPr algn="ctr"/>
+            <a:endParaRPr lang="en-US"/>
+          </a:p>
+        </p:txBody>
+      </p:sp>
+      <p:sp>
+        <p:nvSpPr>
+          <p:cNvPr id="170" name="Star: 5 Points 169">
+            <a:extLst>
+              <a:ext uri="{FF2B5EF4-FFF2-40B4-BE49-F238E27FC236}">
+                <a16:creationId xmlns:a16="http://schemas.microsoft.com/office/drawing/2014/main" id="{B4B68FB9-A3EB-42E0-92F4-921A121B11A7}"/>
+              </a:ext>
+            </a:extLst>
+          </p:cNvPr>
+          <p:cNvSpPr/>
+          <p:nvPr/>
+        </p:nvSpPr>
+        <p:spPr>
+          <a:xfrm>
+            <a:off x="5960070" y="713756"/>
+            <a:ext cx="240127" cy="237401"/>
+          </a:xfrm>
+          <a:prstGeom prst="star5">
+            <a:avLst/>
+          </a:prstGeom>
+          <a:solidFill>
+            <a:srgbClr val="FF0000"/>
+          </a:solidFill>
+        </p:spPr>
+        <p:style>
+          <a:lnRef idx="0">
+            <a:schemeClr val="accent6"/>
+          </a:lnRef>
+          <a:fillRef idx="3">
+            <a:schemeClr val="accent6"/>
+          </a:fillRef>
+          <a:effectRef idx="3">
+            <a:schemeClr val="accent6"/>
+          </a:effectRef>
+          <a:fontRef idx="minor">
+            <a:schemeClr val="lt1"/>
+          </a:fontRef>
+        </p:style>
+        <p:txBody>
+          <a:bodyPr rtlCol="0" anchor="ctr"/>
+          <a:lstStyle/>
+          <a:p>
+            <a:pPr algn="ctr"/>
+            <a:endParaRPr lang="en-US"/>
+          </a:p>
+        </p:txBody>
+      </p:sp>
+      <p:sp>
+        <p:nvSpPr>
+          <p:cNvPr id="171" name="Star: 5 Points 170">
+            <a:extLst>
+              <a:ext uri="{FF2B5EF4-FFF2-40B4-BE49-F238E27FC236}">
+                <a16:creationId xmlns:a16="http://schemas.microsoft.com/office/drawing/2014/main" id="{4795F206-D8E5-4844-879F-B68BC78162B1}"/>
+              </a:ext>
+            </a:extLst>
+          </p:cNvPr>
+          <p:cNvSpPr/>
+          <p:nvPr/>
+        </p:nvSpPr>
+        <p:spPr>
+          <a:xfrm>
+            <a:off x="2916280" y="383693"/>
+            <a:ext cx="240127" cy="237401"/>
+          </a:xfrm>
+          <a:prstGeom prst="star5">
+            <a:avLst/>
+          </a:prstGeom>
+          <a:solidFill>
+            <a:srgbClr val="00B050"/>
+          </a:solidFill>
+        </p:spPr>
+        <p:style>
+          <a:lnRef idx="0">
+            <a:schemeClr val="accent6"/>
+          </a:lnRef>
+          <a:fillRef idx="3">
+            <a:schemeClr val="accent6"/>
+          </a:fillRef>
+          <a:effectRef idx="3">
+            <a:schemeClr val="accent6"/>
+          </a:effectRef>
+          <a:fontRef idx="minor">
+            <a:schemeClr val="lt1"/>
+          </a:fontRef>
+        </p:style>
+        <p:txBody>
+          <a:bodyPr rtlCol="0" anchor="ctr"/>
+          <a:lstStyle/>
+          <a:p>
+            <a:pPr algn="ctr"/>
+            <a:endParaRPr lang="en-US"/>
+          </a:p>
+        </p:txBody>
+      </p:sp>
+      <p:sp>
+        <p:nvSpPr>
+          <p:cNvPr id="172" name="Star: 5 Points 171">
+            <a:extLst>
+              <a:ext uri="{FF2B5EF4-FFF2-40B4-BE49-F238E27FC236}">
+                <a16:creationId xmlns:a16="http://schemas.microsoft.com/office/drawing/2014/main" id="{F5AD6D37-515B-4C7D-B546-101D0A1411D4}"/>
+              </a:ext>
+            </a:extLst>
+          </p:cNvPr>
+          <p:cNvSpPr/>
+          <p:nvPr/>
+        </p:nvSpPr>
+        <p:spPr>
+          <a:xfrm>
+            <a:off x="3659777" y="383692"/>
+            <a:ext cx="240127" cy="237401"/>
+          </a:xfrm>
+          <a:prstGeom prst="star5">
+            <a:avLst/>
+          </a:prstGeom>
+          <a:solidFill>
+            <a:srgbClr val="00B050"/>
+          </a:solidFill>
+        </p:spPr>
+        <p:style>
+          <a:lnRef idx="0">
+            <a:schemeClr val="accent6"/>
+          </a:lnRef>
+          <a:fillRef idx="3">
+            <a:schemeClr val="accent6"/>
+          </a:fillRef>
+          <a:effectRef idx="3">
+            <a:schemeClr val="accent6"/>
+          </a:effectRef>
+          <a:fontRef idx="minor">
+            <a:schemeClr val="lt1"/>
+          </a:fontRef>
+        </p:style>
+        <p:txBody>
+          <a:bodyPr rtlCol="0" anchor="ctr"/>
+          <a:lstStyle/>
+          <a:p>
+            <a:pPr algn="ctr"/>
+            <a:endParaRPr lang="en-US"/>
+          </a:p>
+        </p:txBody>
+      </p:sp>
+      <p:sp>
+        <p:nvSpPr>
+          <p:cNvPr id="173" name="Star: 5 Points 172">
+            <a:extLst>
+              <a:ext uri="{FF2B5EF4-FFF2-40B4-BE49-F238E27FC236}">
+                <a16:creationId xmlns:a16="http://schemas.microsoft.com/office/drawing/2014/main" id="{A6DF3005-3F31-4FAA-9506-096DA425161C}"/>
+              </a:ext>
+            </a:extLst>
+          </p:cNvPr>
+          <p:cNvSpPr/>
+          <p:nvPr/>
+        </p:nvSpPr>
+        <p:spPr>
+          <a:xfrm>
+            <a:off x="3167965" y="383692"/>
+            <a:ext cx="240127" cy="237401"/>
+          </a:xfrm>
+          <a:prstGeom prst="star5">
+            <a:avLst/>
+          </a:prstGeom>
+          <a:solidFill>
+            <a:srgbClr val="00B050"/>
+          </a:solidFill>
+        </p:spPr>
+        <p:style>
+          <a:lnRef idx="0">
+            <a:schemeClr val="accent6"/>
+          </a:lnRef>
+          <a:fillRef idx="3">
+            <a:schemeClr val="accent6"/>
+          </a:fillRef>
+          <a:effectRef idx="3">
+            <a:schemeClr val="accent6"/>
+          </a:effectRef>
+          <a:fontRef idx="minor">
+            <a:schemeClr val="lt1"/>
+          </a:fontRef>
+        </p:style>
+        <p:txBody>
+          <a:bodyPr rtlCol="0" anchor="ctr"/>
+          <a:lstStyle/>
+          <a:p>
+            <a:pPr algn="ctr"/>
+            <a:endParaRPr lang="en-US"/>
+          </a:p>
+        </p:txBody>
+      </p:sp>
+      <p:sp>
+        <p:nvSpPr>
+          <p:cNvPr id="174" name="Star: 5 Points 173">
+            <a:extLst>
+              <a:ext uri="{FF2B5EF4-FFF2-40B4-BE49-F238E27FC236}">
+                <a16:creationId xmlns:a16="http://schemas.microsoft.com/office/drawing/2014/main" id="{368C2486-56C3-4A0B-BA7C-2A116B0AA27A}"/>
+              </a:ext>
+            </a:extLst>
+          </p:cNvPr>
+          <p:cNvSpPr/>
+          <p:nvPr/>
+        </p:nvSpPr>
+        <p:spPr>
+          <a:xfrm>
+            <a:off x="3421498" y="383693"/>
+            <a:ext cx="240127" cy="237401"/>
+          </a:xfrm>
+          <a:prstGeom prst="star5">
+            <a:avLst/>
+          </a:prstGeom>
+          <a:solidFill>
+            <a:srgbClr val="00B050"/>
+          </a:solidFill>
+        </p:spPr>
+        <p:style>
+          <a:lnRef idx="0">
+            <a:schemeClr val="accent6"/>
+          </a:lnRef>
+          <a:fillRef idx="3">
+            <a:schemeClr val="accent6"/>
+          </a:fillRef>
+          <a:effectRef idx="3">
+            <a:schemeClr val="accent6"/>
+          </a:effectRef>
+          <a:fontRef idx="minor">
+            <a:schemeClr val="lt1"/>
+          </a:fontRef>
+        </p:style>
+        <p:txBody>
+          <a:bodyPr rtlCol="0" anchor="ctr"/>
+          <a:lstStyle/>
+          <a:p>
+            <a:pPr algn="ctr"/>
+            <a:endParaRPr lang="en-US"/>
+          </a:p>
+        </p:txBody>
+      </p:sp>
+      <p:sp>
+        <p:nvSpPr>
+          <p:cNvPr id="175" name="Star: 5 Points 174">
+            <a:extLst>
+              <a:ext uri="{FF2B5EF4-FFF2-40B4-BE49-F238E27FC236}">
+                <a16:creationId xmlns:a16="http://schemas.microsoft.com/office/drawing/2014/main" id="{782873AB-0A7D-4006-A15E-B0F9B356DFD5}"/>
+              </a:ext>
+            </a:extLst>
+          </p:cNvPr>
+          <p:cNvSpPr/>
+          <p:nvPr/>
+        </p:nvSpPr>
+        <p:spPr>
+          <a:xfrm>
+            <a:off x="3877934" y="383691"/>
+            <a:ext cx="240127" cy="237401"/>
+          </a:xfrm>
+          <a:prstGeom prst="star5">
+            <a:avLst/>
+          </a:prstGeom>
+          <a:solidFill>
+            <a:srgbClr val="00B050"/>
+          </a:solidFill>
+        </p:spPr>
+        <p:style>
+          <a:lnRef idx="0">
+            <a:schemeClr val="accent6"/>
+          </a:lnRef>
+          <a:fillRef idx="3">
+            <a:schemeClr val="accent6"/>
+          </a:fillRef>
+          <a:effectRef idx="3">
+            <a:schemeClr val="accent6"/>
+          </a:effectRef>
+          <a:fontRef idx="minor">
+            <a:schemeClr val="lt1"/>
+          </a:fontRef>
+        </p:style>
+        <p:txBody>
+          <a:bodyPr rtlCol="0" anchor="ctr"/>
+          <a:lstStyle/>
+          <a:p>
+            <a:pPr algn="ctr"/>
+            <a:endParaRPr lang="en-US"/>
+          </a:p>
+        </p:txBody>
+      </p:sp>
+      <p:sp>
+        <p:nvSpPr>
+          <p:cNvPr id="176" name="Star: 5 Points 175">
+            <a:extLst>
+              <a:ext uri="{FF2B5EF4-FFF2-40B4-BE49-F238E27FC236}">
+                <a16:creationId xmlns:a16="http://schemas.microsoft.com/office/drawing/2014/main" id="{5F230B37-A469-4748-BC76-478879E47D21}"/>
+              </a:ext>
+            </a:extLst>
+          </p:cNvPr>
+          <p:cNvSpPr/>
+          <p:nvPr/>
+        </p:nvSpPr>
+        <p:spPr>
+          <a:xfrm>
+            <a:off x="4122680" y="384953"/>
+            <a:ext cx="240127" cy="237401"/>
+          </a:xfrm>
+          <a:prstGeom prst="star5">
+            <a:avLst>
+              <a:gd name="adj" fmla="val 19098"/>
+              <a:gd name="hf" fmla="val 105146"/>
+              <a:gd name="vf" fmla="val 110557"/>
+            </a:avLst>
+          </a:prstGeom>
+          <a:solidFill>
+            <a:srgbClr val="00B050"/>
+          </a:solidFill>
+        </p:spPr>
+        <p:style>
+          <a:lnRef idx="0">
+            <a:schemeClr val="accent6"/>
+          </a:lnRef>
+          <a:fillRef idx="3">
+            <a:schemeClr val="accent6"/>
+          </a:fillRef>
+          <a:effectRef idx="3">
+            <a:schemeClr val="accent6"/>
+          </a:effectRef>
+          <a:fontRef idx="minor">
+            <a:schemeClr val="lt1"/>
+          </a:fontRef>
+        </p:style>
+        <p:txBody>
+          <a:bodyPr rtlCol="0" anchor="ctr"/>
+          <a:lstStyle/>
+          <a:p>
+            <a:pPr algn="ctr"/>
+            <a:endParaRPr lang="en-US"/>
+          </a:p>
+        </p:txBody>
+      </p:sp>
     </p:spTree>
     <p:extLst>
       <p:ext uri="{BB962C8B-B14F-4D97-AF65-F5344CB8AC3E}">
@@ -19171,283 +21624,6 @@
               <a:t>3</a:t>
             </a:fld>
             <a:endParaRPr lang="en-US" noProof="0" dirty="0"/>
-          </a:p>
-        </p:txBody>
-      </p:sp>
-      <p:sp>
-        <p:nvSpPr>
-          <p:cNvPr id="4" name="Rectangle: Rounded Corners 3">
-            <a:extLst>
-              <a:ext uri="{FF2B5EF4-FFF2-40B4-BE49-F238E27FC236}">
-                <a16:creationId xmlns:a16="http://schemas.microsoft.com/office/drawing/2014/main" id="{A153573A-89EA-4CA8-8301-8A25B1ED5373}"/>
-              </a:ext>
-            </a:extLst>
-          </p:cNvPr>
-          <p:cNvSpPr/>
-          <p:nvPr/>
-        </p:nvSpPr>
-        <p:spPr>
-          <a:xfrm>
-            <a:off x="3486912" y="1127760"/>
-            <a:ext cx="2609088" cy="963168"/>
-          </a:xfrm>
-          <a:prstGeom prst="roundRect">
-            <a:avLst/>
-          </a:prstGeom>
-        </p:spPr>
-        <p:style>
-          <a:lnRef idx="2">
-            <a:schemeClr val="accent1">
-              <a:shade val="50000"/>
-            </a:schemeClr>
-          </a:lnRef>
-          <a:fillRef idx="1">
-            <a:schemeClr val="accent1"/>
-          </a:fillRef>
-          <a:effectRef idx="0">
-            <a:schemeClr val="accent1"/>
-          </a:effectRef>
-          <a:fontRef idx="minor">
-            <a:schemeClr val="lt1"/>
-          </a:fontRef>
-        </p:style>
-        <p:txBody>
-          <a:bodyPr rtlCol="0" anchor="ctr"/>
-          <a:lstStyle/>
-          <a:p>
-            <a:pPr algn="ctr"/>
-            <a:r>
-              <a:rPr lang="en-US" dirty="0"/>
-              <a:t>Accounts</a:t>
-            </a:r>
-          </a:p>
-        </p:txBody>
-      </p:sp>
-      <p:sp>
-        <p:nvSpPr>
-          <p:cNvPr id="5" name="Rectangle: Rounded Corners 4">
-            <a:extLst>
-              <a:ext uri="{FF2B5EF4-FFF2-40B4-BE49-F238E27FC236}">
-                <a16:creationId xmlns:a16="http://schemas.microsoft.com/office/drawing/2014/main" id="{20DA4B88-0142-4DA4-9431-C06DB3DFE0FC}"/>
-              </a:ext>
-            </a:extLst>
-          </p:cNvPr>
-          <p:cNvSpPr/>
-          <p:nvPr/>
-        </p:nvSpPr>
-        <p:spPr>
-          <a:xfrm flipH="1">
-            <a:off x="3486912" y="2157984"/>
-            <a:ext cx="1274064" cy="2779776"/>
-          </a:xfrm>
-          <a:prstGeom prst="roundRect">
-            <a:avLst/>
-          </a:prstGeom>
-        </p:spPr>
-        <p:style>
-          <a:lnRef idx="2">
-            <a:schemeClr val="accent1">
-              <a:shade val="50000"/>
-            </a:schemeClr>
-          </a:lnRef>
-          <a:fillRef idx="1">
-            <a:schemeClr val="accent1"/>
-          </a:fillRef>
-          <a:effectRef idx="0">
-            <a:schemeClr val="accent1"/>
-          </a:effectRef>
-          <a:fontRef idx="minor">
-            <a:schemeClr val="lt1"/>
-          </a:fontRef>
-        </p:style>
-        <p:txBody>
-          <a:bodyPr rtlCol="0" anchor="ctr"/>
-          <a:lstStyle/>
-          <a:p>
-            <a:pPr algn="ctr"/>
-            <a:r>
-              <a:rPr lang="en-US" dirty="0"/>
-              <a:t>Reports</a:t>
-            </a:r>
-          </a:p>
-        </p:txBody>
-      </p:sp>
-      <p:sp>
-        <p:nvSpPr>
-          <p:cNvPr id="6" name="Rectangle: Rounded Corners 5">
-            <a:extLst>
-              <a:ext uri="{FF2B5EF4-FFF2-40B4-BE49-F238E27FC236}">
-                <a16:creationId xmlns:a16="http://schemas.microsoft.com/office/drawing/2014/main" id="{F25E91C4-5673-4E36-9CF7-D06E6B2F1D83}"/>
-              </a:ext>
-            </a:extLst>
-          </p:cNvPr>
-          <p:cNvSpPr/>
-          <p:nvPr/>
-        </p:nvSpPr>
-        <p:spPr>
-          <a:xfrm flipH="1">
-            <a:off x="4821936" y="2157984"/>
-            <a:ext cx="1274064" cy="1920240"/>
-          </a:xfrm>
-          <a:prstGeom prst="roundRect">
-            <a:avLst/>
-          </a:prstGeom>
-        </p:spPr>
-        <p:style>
-          <a:lnRef idx="2">
-            <a:schemeClr val="accent1">
-              <a:shade val="50000"/>
-            </a:schemeClr>
-          </a:lnRef>
-          <a:fillRef idx="1">
-            <a:schemeClr val="accent1"/>
-          </a:fillRef>
-          <a:effectRef idx="0">
-            <a:schemeClr val="accent1"/>
-          </a:effectRef>
-          <a:fontRef idx="minor">
-            <a:schemeClr val="lt1"/>
-          </a:fontRef>
-        </p:style>
-        <p:txBody>
-          <a:bodyPr rtlCol="0" anchor="ctr"/>
-          <a:lstStyle/>
-          <a:p>
-            <a:pPr algn="ctr"/>
-            <a:r>
-              <a:rPr lang="en-US" dirty="0"/>
-              <a:t>Costs</a:t>
-            </a:r>
-          </a:p>
-          <a:p>
-            <a:r>
-              <a:rPr lang="en-US" dirty="0">
-                <a:solidFill>
-                  <a:srgbClr val="E6B450"/>
-                </a:solidFill>
-                <a:latin typeface="Consolas" panose="020B0609020204030204" pitchFamily="49" charset="0"/>
-              </a:rPr>
-              <a:t>#00</a:t>
-            </a:r>
-            <a:r>
-              <a:rPr lang="en-US" b="0" dirty="0">
-                <a:solidFill>
-                  <a:srgbClr val="E6B450"/>
-                </a:solidFill>
-                <a:effectLst/>
-                <a:latin typeface="Consolas" panose="020B0609020204030204" pitchFamily="49" charset="0"/>
-              </a:rPr>
-              <a:t>FF1B5E20</a:t>
-            </a:r>
-            <a:endParaRPr lang="en-US" b="0" dirty="0">
-              <a:solidFill>
-                <a:srgbClr val="B3B1AD"/>
-              </a:solidFill>
-              <a:effectLst/>
-              <a:latin typeface="Consolas" panose="020B0609020204030204" pitchFamily="49" charset="0"/>
-            </a:endParaRPr>
-          </a:p>
-          <a:p>
-            <a:pPr algn="ctr"/>
-            <a:endParaRPr lang="en-US" dirty="0"/>
-          </a:p>
-        </p:txBody>
-      </p:sp>
-      <p:sp>
-        <p:nvSpPr>
-          <p:cNvPr id="7" name="Rectangle: Rounded Corners 6">
-            <a:extLst>
-              <a:ext uri="{FF2B5EF4-FFF2-40B4-BE49-F238E27FC236}">
-                <a16:creationId xmlns:a16="http://schemas.microsoft.com/office/drawing/2014/main" id="{91D33680-510C-4DD0-BB5A-69A8A077FB9B}"/>
-              </a:ext>
-            </a:extLst>
-          </p:cNvPr>
-          <p:cNvSpPr/>
-          <p:nvPr/>
-        </p:nvSpPr>
-        <p:spPr>
-          <a:xfrm flipH="1">
-            <a:off x="4821936" y="4145280"/>
-            <a:ext cx="2420112" cy="792480"/>
-          </a:xfrm>
-          <a:prstGeom prst="roundRect">
-            <a:avLst/>
-          </a:prstGeom>
-        </p:spPr>
-        <p:style>
-          <a:lnRef idx="2">
-            <a:schemeClr val="accent1">
-              <a:shade val="50000"/>
-            </a:schemeClr>
-          </a:lnRef>
-          <a:fillRef idx="1">
-            <a:schemeClr val="accent1"/>
-          </a:fillRef>
-          <a:effectRef idx="0">
-            <a:schemeClr val="accent1"/>
-          </a:effectRef>
-          <a:fontRef idx="minor">
-            <a:schemeClr val="lt1"/>
-          </a:fontRef>
-        </p:style>
-        <p:txBody>
-          <a:bodyPr rtlCol="0" anchor="ctr"/>
-          <a:lstStyle/>
-          <a:p>
-            <a:pPr algn="ctr"/>
-            <a:r>
-              <a:rPr lang="en-US" dirty="0"/>
-              <a:t>Incomes</a:t>
-            </a:r>
-          </a:p>
-        </p:txBody>
-      </p:sp>
-      <p:sp>
-        <p:nvSpPr>
-          <p:cNvPr id="8" name="Rectangle: Rounded Corners 7">
-            <a:extLst>
-              <a:ext uri="{FF2B5EF4-FFF2-40B4-BE49-F238E27FC236}">
-                <a16:creationId xmlns:a16="http://schemas.microsoft.com/office/drawing/2014/main" id="{65026D13-B4B3-4173-8501-2D7A2A6FDCF4}"/>
-              </a:ext>
-            </a:extLst>
-          </p:cNvPr>
-          <p:cNvSpPr/>
-          <p:nvPr/>
-        </p:nvSpPr>
-        <p:spPr>
-          <a:xfrm flipH="1">
-            <a:off x="6150864" y="1127760"/>
-            <a:ext cx="1091184" cy="2950464"/>
-          </a:xfrm>
-          <a:prstGeom prst="roundRect">
-            <a:avLst/>
-          </a:prstGeom>
-        </p:spPr>
-        <p:style>
-          <a:lnRef idx="2">
-            <a:schemeClr val="accent1">
-              <a:shade val="50000"/>
-            </a:schemeClr>
-          </a:lnRef>
-          <a:fillRef idx="1">
-            <a:schemeClr val="accent1"/>
-          </a:fillRef>
-          <a:effectRef idx="0">
-            <a:schemeClr val="accent1"/>
-          </a:effectRef>
-          <a:fontRef idx="minor">
-            <a:schemeClr val="lt1"/>
-          </a:fontRef>
-        </p:style>
-        <p:txBody>
-          <a:bodyPr rtlCol="0" anchor="ctr"/>
-          <a:lstStyle/>
-          <a:p>
-            <a:pPr algn="ctr"/>
-            <a:r>
-              <a:rPr lang="en-US" dirty="0"/>
-              <a:t>Bills</a:t>
-            </a:r>
           </a:p>
         </p:txBody>
       </p:sp>
@@ -20616,23 +22792,6 @@
 </file>
 
 <file path=customXml/item1.xml><?xml version="1.0" encoding="utf-8"?>
-<?mso-contentType ?>
-<FormTemplates xmlns="http://schemas.microsoft.com/sharepoint/v3/contenttype/forms">
-  <Display>DocumentLibraryForm</Display>
-  <Edit>DocumentLibraryForm</Edit>
-  <New>DocumentLibraryForm</New>
-</FormTemplates>
-</file>
-
-<file path=customXml/item2.xml><?xml version="1.0" encoding="utf-8"?>
-<p:properties xmlns:p="http://schemas.microsoft.com/office/2006/metadata/properties" xmlns:xsi="http://www.w3.org/2001/XMLSchema-instance" xmlns:pc="http://schemas.microsoft.com/office/infopath/2007/PartnerControls">
-  <documentManagement>
-    <MediaServiceKeyPoints xmlns="71af3243-3dd4-4a8d-8c0d-dd76da1f02a5" xsi:nil="true"/>
-  </documentManagement>
-</p:properties>
-</file>
-
-<file path=customXml/item3.xml><?xml version="1.0" encoding="utf-8"?>
 <ct:contentTypeSchema xmlns:ct="http://schemas.microsoft.com/office/2006/metadata/contentType" xmlns:ma="http://schemas.microsoft.com/office/2006/metadata/properties/metaAttributes" ct:_="" ma:_="" ma:contentTypeName="Document" ma:contentTypeID="0x01010079F111ED35F8CC479449609E8A0923A6" ma:contentTypeVersion="11" ma:contentTypeDescription="Create a new document." ma:contentTypeScope="" ma:versionID="9677210f24a1be23c92c90fd886aa0aa">
   <xsd:schema xmlns:xsd="http://www.w3.org/2001/XMLSchema" xmlns:xs="http://www.w3.org/2001/XMLSchema" xmlns:p="http://schemas.microsoft.com/office/2006/metadata/properties" xmlns:ns2="71af3243-3dd4-4a8d-8c0d-dd76da1f02a5" xmlns:ns3="16c05727-aa75-4e4a-9b5f-8a80a1165891" targetNamespace="http://schemas.microsoft.com/office/2006/metadata/properties" ma:root="true" ma:fieldsID="60e05723c5c1908df1a1a4ebf11d344e" ns2:_="" ns3:_="">
     <xsd:import namespace="71af3243-3dd4-4a8d-8c0d-dd76da1f02a5"/>
@@ -20843,25 +23002,24 @@
 </ct:contentTypeSchema>
 </file>
 
-<file path=customXml/itemProps1.xml><?xml version="1.0" encoding="utf-8"?>
-<ds:datastoreItem xmlns:ds="http://schemas.openxmlformats.org/officeDocument/2006/customXml" ds:itemID="{B0C07E3D-60A7-4F4E-8208-D9CCD01982CB}">
-  <ds:schemaRefs>
-    <ds:schemaRef ds:uri="http://schemas.microsoft.com/sharepoint/v3/contenttype/forms"/>
-  </ds:schemaRefs>
-</ds:datastoreItem>
+<file path=customXml/item2.xml><?xml version="1.0" encoding="utf-8"?>
+<p:properties xmlns:p="http://schemas.microsoft.com/office/2006/metadata/properties" xmlns:xsi="http://www.w3.org/2001/XMLSchema-instance" xmlns:pc="http://schemas.microsoft.com/office/infopath/2007/PartnerControls">
+  <documentManagement>
+    <MediaServiceKeyPoints xmlns="71af3243-3dd4-4a8d-8c0d-dd76da1f02a5" xsi:nil="true"/>
+  </documentManagement>
+</p:properties>
 </file>
 
-<file path=customXml/itemProps2.xml><?xml version="1.0" encoding="utf-8"?>
-<ds:datastoreItem xmlns:ds="http://schemas.openxmlformats.org/officeDocument/2006/customXml" ds:itemID="{CEA9B47F-3DD8-4645-81DC-B88780643C07}">
-  <ds:schemaRefs>
-    <ds:schemaRef ds:uri="http://schemas.microsoft.com/office/2006/metadata/properties"/>
-    <ds:schemaRef ds:uri="http://schemas.microsoft.com/office/infopath/2007/PartnerControls"/>
-    <ds:schemaRef ds:uri="71af3243-3dd4-4a8d-8c0d-dd76da1f02a5"/>
-  </ds:schemaRefs>
-</ds:datastoreItem>
+<file path=customXml/item3.xml><?xml version="1.0" encoding="utf-8"?>
+<?mso-contentType ?>
+<FormTemplates xmlns="http://schemas.microsoft.com/sharepoint/v3/contenttype/forms">
+  <Display>DocumentLibraryForm</Display>
+  <Edit>DocumentLibraryForm</Edit>
+  <New>DocumentLibraryForm</New>
+</FormTemplates>
 </file>
 
-<file path=customXml/itemProps3.xml><?xml version="1.0" encoding="utf-8"?>
+<file path=customXml/itemProps1.xml><?xml version="1.0" encoding="utf-8"?>
 <ds:datastoreItem xmlns:ds="http://schemas.openxmlformats.org/officeDocument/2006/customXml" ds:itemID="{631071E6-22AE-499A-B09C-BF21CF5F7483}">
   <ds:schemaRefs>
     <ds:schemaRef ds:uri="http://schemas.microsoft.com/office/2006/metadata/contentType"/>
@@ -20878,4 +23036,22 @@
     <ds:schemaRef ds:uri="http://schemas.microsoft.com/internal/obd"/>
   </ds:schemaRefs>
 </ds:datastoreItem>
+</file>
+
+<file path=customXml/itemProps2.xml><?xml version="1.0" encoding="utf-8"?>
+<ds:datastoreItem xmlns:ds="http://schemas.openxmlformats.org/officeDocument/2006/customXml" ds:itemID="{CEA9B47F-3DD8-4645-81DC-B88780643C07}">
+  <ds:schemaRefs>
+    <ds:schemaRef ds:uri="http://schemas.microsoft.com/office/2006/metadata/properties"/>
+    <ds:schemaRef ds:uri="http://schemas.microsoft.com/office/infopath/2007/PartnerControls"/>
+    <ds:schemaRef ds:uri="71af3243-3dd4-4a8d-8c0d-dd76da1f02a5"/>
+  </ds:schemaRefs>
+</ds:datastoreItem>
+</file>
+
+<file path=customXml/itemProps3.xml><?xml version="1.0" encoding="utf-8"?>
+<ds:datastoreItem xmlns:ds="http://schemas.openxmlformats.org/officeDocument/2006/customXml" ds:itemID="{B0C07E3D-60A7-4F4E-8208-D9CCD01982CB}">
+  <ds:schemaRefs>
+    <ds:schemaRef ds:uri="http://schemas.microsoft.com/sharepoint/v3/contenttype/forms"/>
+  </ds:schemaRefs>
+</ds:datastoreItem>
 </file>
</xml_diff>

<commit_message>
just creating and foldering detail view page.
</commit_message>
<xml_diff>
--- a/Billing app.pptx
+++ b/Billing app.pptx
@@ -155,101 +155,6 @@
 </p:cmAuthorLst>
 </file>
 
-<file path=ppt/comments/comment1.xml><?xml version="1.0" encoding="utf-8"?>
-<p:cmLst xmlns:a="http://schemas.openxmlformats.org/drawingml/2006/main" xmlns:r="http://schemas.openxmlformats.org/officeDocument/2006/relationships" xmlns:p="http://schemas.openxmlformats.org/presentationml/2006/main">
-  <p:cm authorId="1" dt="2021-08-19T12:28:30.261" idx="1">
-    <p:pos x="4819" y="2823"/>
-    <p:text>هزینه ی خریدها پس از خرید.</p:text>
-    <p:extLst>
-      <p:ext uri="{C676402C-5697-4E1C-873F-D02D1690AC5C}">
-        <p15:threadingInfo xmlns:p15="http://schemas.microsoft.com/office/powerpoint/2012/main" timeZoneBias="-270"/>
-      </p:ext>
-    </p:extLst>
-  </p:cm>
-  <p:cm authorId="1" dt="2021-08-19T12:29:16.424" idx="2">
-    <p:pos x="4115" y="2820"/>
-    <p:text>چک ها و بدهکاری های کنونی</p:text>
-    <p:extLst>
-      <p:ext uri="{C676402C-5697-4E1C-873F-D02D1690AC5C}">
-        <p15:threadingInfo xmlns:p15="http://schemas.microsoft.com/office/powerpoint/2012/main" timeZoneBias="-270"/>
-      </p:ext>
-    </p:extLst>
-  </p:cm>
-  <p:cm authorId="1" dt="2021-08-19T12:29:36.439" idx="3">
-    <p:pos x="3417" y="2837"/>
-    <p:text>درآمدها پس از دریافت</p:text>
-    <p:extLst>
-      <p:ext uri="{C676402C-5697-4E1C-873F-D02D1690AC5C}">
-        <p15:threadingInfo xmlns:p15="http://schemas.microsoft.com/office/powerpoint/2012/main" timeZoneBias="-270"/>
-      </p:ext>
-    </p:extLst>
-  </p:cm>
-  <p:cm authorId="1" dt="2021-08-19T12:31:44.166" idx="4">
-    <p:pos x="6645" y="1192"/>
-    <p:text>حساب ها(کارت های بانکی) و موجودی کنونی.</p:text>
-    <p:extLst>
-      <p:ext uri="{C676402C-5697-4E1C-873F-D02D1690AC5C}">
-        <p15:threadingInfo xmlns:p15="http://schemas.microsoft.com/office/powerpoint/2012/main" timeZoneBias="-270"/>
-      </p:ext>
-    </p:extLst>
-  </p:cm>
-  <p:cm authorId="1" dt="2021-08-19T12:35:29.018" idx="5">
-    <p:pos x="6566" y="1725"/>
-    <p:text>نام - نام خانوادگی - شماره تلفن -ایمیل</p:text>
-    <p:extLst>
-      <p:ext uri="{C676402C-5697-4E1C-873F-D02D1690AC5C}">
-        <p15:threadingInfo xmlns:p15="http://schemas.microsoft.com/office/powerpoint/2012/main" timeZoneBias="-270"/>
-      </p:ext>
-    </p:extLst>
-  </p:cm>
-  <p:cm authorId="1" dt="2021-08-19T12:42:23.840" idx="7">
-    <p:pos x="6607" y="2272"/>
-    <p:text>تغییرتنظیمات برنامه - ریست کردن برنامه - تغییر تم برنامه</p:text>
-    <p:extLst>
-      <p:ext uri="{C676402C-5697-4E1C-873F-D02D1690AC5C}">
-        <p15:threadingInfo xmlns:p15="http://schemas.microsoft.com/office/powerpoint/2012/main" timeZoneBias="-270"/>
-      </p:ext>
-    </p:extLst>
-  </p:cm>
-  <p:cm authorId="1" dt="2021-08-19T12:45:32.517" idx="8">
-    <p:pos x="6601" y="2766"/>
-    <p:text>ارتباط با ما</p:text>
-    <p:extLst>
-      <p:ext uri="{C676402C-5697-4E1C-873F-D02D1690AC5C}">
-        <p15:threadingInfo xmlns:p15="http://schemas.microsoft.com/office/powerpoint/2012/main" timeZoneBias="-270"/>
-      </p:ext>
-    </p:extLst>
-  </p:cm>
-  <p:cm authorId="1" dt="2021-08-19T12:49:00.662" idx="9">
-    <p:pos x="2724" y="2854"/>
-    <p:text>برنامه ی خرید های آینده (سبد خرید)</p:text>
-    <p:extLst>
-      <p:ext uri="{C676402C-5697-4E1C-873F-D02D1690AC5C}">
-        <p15:threadingInfo xmlns:p15="http://schemas.microsoft.com/office/powerpoint/2012/main" timeZoneBias="-270"/>
-      </p:ext>
-    </p:extLst>
-  </p:cm>
-  <p:cm authorId="1" dt="2021-08-19T12:58:09.806" idx="10">
-    <p:pos x="1931" y="1517"/>
-    <p:text>گزارش گیری با مدت زمان مشخص خروجی پی دی اف بعنوان اکشن.</p:text>
-    <p:extLst>
-      <p:ext uri="{C676402C-5697-4E1C-873F-D02D1690AC5C}">
-        <p15:threadingInfo xmlns:p15="http://schemas.microsoft.com/office/powerpoint/2012/main" timeZoneBias="-270"/>
-      </p:ext>
-    </p:extLst>
-  </p:cm>
-  <p:cm authorId="1" dt="2021-08-19T13:01:43.886" idx="11">
-    <p:pos x="1931" y="1886"/>
-    <p:text>دخل و خرج یک حساب ها با فیلتر</p:text>
-    <p:extLst>
-      <p:ext uri="{C676402C-5697-4E1C-873F-D02D1690AC5C}">
-        <p15:threadingInfo xmlns:p15="http://schemas.microsoft.com/office/powerpoint/2012/main" timeZoneBias="-270"/>
-      </p:ext>
-    </p:extLst>
-  </p:cm>
-</p:cmLst>
-</file>
-
 <file path=ppt/handoutMasters/handoutMaster1.xml><?xml version="1.0" encoding="utf-8"?>
 <p:handoutMaster xmlns:a="http://schemas.openxmlformats.org/drawingml/2006/main" xmlns:r="http://schemas.openxmlformats.org/officeDocument/2006/relationships" xmlns:p="http://schemas.openxmlformats.org/presentationml/2006/main">
   <p:cSld>
@@ -344,7 +249,7 @@
           <a:p>
             <a:fld id="{97AB3EA8-A58D-4C92-A3AB-D271CCC294C7}" type="datetimeFigureOut">
               <a:rPr lang="en-US" smtClean="0"/>
-              <a:t>8/27/2021</a:t>
+              <a:t>8/28/2021</a:t>
             </a:fld>
             <a:endParaRPr lang="en-US" dirty="0"/>
           </a:p>
@@ -521,7 +426,7 @@
           <a:p>
             <a:fld id="{0AEFB4FA-E877-413E-B608-88789D806C57}" type="datetimeFigureOut">
               <a:rPr lang="en-US" noProof="0" smtClean="0"/>
-              <a:t>8/27/2021</a:t>
+              <a:t>8/28/2021</a:t>
             </a:fld>
             <a:endParaRPr lang="en-US" noProof="0" dirty="0"/>
           </a:p>
@@ -16455,7 +16360,7 @@
           <a:p>
             <a:fld id="{D951F27F-98F9-A147-8986-34441C7B752D}" type="datetime1">
               <a:rPr lang="en-US" noProof="0" smtClean="0"/>
-              <a:t>8/27/2021</a:t>
+              <a:t>8/28/2021</a:t>
             </a:fld>
             <a:endParaRPr lang="en-US" noProof="0" dirty="0"/>
           </a:p>
@@ -17739,8 +17644,8 @@
         </p:nvCxnSpPr>
         <p:spPr>
           <a:xfrm rot="10800000" flipV="1">
-            <a:off x="3428125" y="3981159"/>
-            <a:ext cx="2594977" cy="287838"/>
+            <a:off x="5623923" y="3981158"/>
+            <a:ext cx="399179" cy="324013"/>
           </a:xfrm>
           <a:prstGeom prst="bentConnector2">
             <a:avLst/>
@@ -18118,7 +18023,7 @@
         </p:nvSpPr>
         <p:spPr>
           <a:xfrm>
-            <a:off x="961854" y="4270731"/>
+            <a:off x="3157652" y="4306906"/>
             <a:ext cx="518469" cy="235672"/>
           </a:xfrm>
           <a:prstGeom prst="roundRect">
@@ -18151,7 +18056,7 @@
                 <a:latin typeface="Dubai" panose="020B0503030403030204" pitchFamily="34" charset="-78"/>
                 <a:cs typeface="Dubai" panose="020B0503030403030204" pitchFamily="34" charset="-78"/>
               </a:rPr>
-              <a:t>Future Costs</a:t>
+              <a:t>Turnovers</a:t>
             </a:r>
             <a:endParaRPr lang="en-US" sz="3200" dirty="0">
               <a:latin typeface="Dubai" panose="020B0503030403030204" pitchFamily="34" charset="-78"/>
@@ -18178,8 +18083,8 @@
         </p:nvCxnSpPr>
         <p:spPr>
           <a:xfrm rot="10800000" flipV="1">
-            <a:off x="1221089" y="3981159"/>
-            <a:ext cx="4802012" cy="289572"/>
+            <a:off x="3416887" y="3981158"/>
+            <a:ext cx="2606214" cy="325747"/>
           </a:xfrm>
           <a:prstGeom prst="bentConnector2">
             <a:avLst/>
@@ -18370,7 +18275,7 @@
         </p:nvSpPr>
         <p:spPr>
           <a:xfrm>
-            <a:off x="157602" y="5059081"/>
+            <a:off x="2353400" y="5095256"/>
             <a:ext cx="424737" cy="176256"/>
           </a:xfrm>
           <a:prstGeom prst="roundRect">
@@ -18609,10 +18514,10 @@
       </p:cxnSp>
       <p:sp>
         <p:nvSpPr>
-          <p:cNvPr id="56" name="Star: 5 Points 55">
-            <a:extLst>
-              <a:ext uri="{FF2B5EF4-FFF2-40B4-BE49-F238E27FC236}">
-                <a16:creationId xmlns:a16="http://schemas.microsoft.com/office/drawing/2014/main" id="{75B4D567-BCC8-4DC6-81E6-561F3FB93421}"/>
+          <p:cNvPr id="64" name="Rectangle: Rounded Corners 63">
+            <a:extLst>
+              <a:ext uri="{FF2B5EF4-FFF2-40B4-BE49-F238E27FC236}">
+                <a16:creationId xmlns:a16="http://schemas.microsoft.com/office/drawing/2014/main" id="{05B39CDA-2F23-4D4F-9E1F-CD4D55D2E96E}"/>
               </a:ext>
             </a:extLst>
           </p:cNvPr>
@@ -18621,175 +18526,7 @@
         </p:nvSpPr>
         <p:spPr>
           <a:xfrm>
-            <a:off x="537422" y="410519"/>
-            <a:ext cx="240127" cy="237401"/>
-          </a:xfrm>
-          <a:prstGeom prst="star5">
-            <a:avLst/>
-          </a:prstGeom>
-          <a:solidFill>
-            <a:srgbClr val="FF0000"/>
-          </a:solidFill>
-        </p:spPr>
-        <p:style>
-          <a:lnRef idx="0">
-            <a:schemeClr val="accent6"/>
-          </a:lnRef>
-          <a:fillRef idx="3">
-            <a:schemeClr val="accent6"/>
-          </a:fillRef>
-          <a:effectRef idx="3">
-            <a:schemeClr val="accent6"/>
-          </a:effectRef>
-          <a:fontRef idx="minor">
-            <a:schemeClr val="lt1"/>
-          </a:fontRef>
-        </p:style>
-        <p:txBody>
-          <a:bodyPr rtlCol="0" anchor="ctr"/>
-          <a:lstStyle/>
-          <a:p>
-            <a:pPr algn="ctr"/>
-            <a:endParaRPr lang="en-US"/>
-          </a:p>
-        </p:txBody>
-      </p:sp>
-      <p:sp>
-        <p:nvSpPr>
-          <p:cNvPr id="25" name="TextBox 24">
-            <a:extLst>
-              <a:ext uri="{FF2B5EF4-FFF2-40B4-BE49-F238E27FC236}">
-                <a16:creationId xmlns:a16="http://schemas.microsoft.com/office/drawing/2014/main" id="{ACAFF55C-75CC-469F-8E17-A4D0462BA494}"/>
-              </a:ext>
-            </a:extLst>
-          </p:cNvPr>
-          <p:cNvSpPr txBox="1"/>
-          <p:nvPr/>
-        </p:nvSpPr>
-        <p:spPr>
-          <a:xfrm>
-            <a:off x="754997" y="164652"/>
-            <a:ext cx="670560" cy="276999"/>
-          </a:xfrm>
-          <a:prstGeom prst="rect">
-            <a:avLst/>
-          </a:prstGeom>
-          <a:noFill/>
-        </p:spPr>
-        <p:txBody>
-          <a:bodyPr wrap="square" rtlCol="0">
-            <a:spAutoFit/>
-          </a:bodyPr>
-          <a:lstStyle/>
-          <a:p>
-            <a:r>
-              <a:rPr lang="en-US" sz="1200" dirty="0">
-                <a:latin typeface="Segoe Print" panose="02000600000000000000" pitchFamily="2" charset="0"/>
-              </a:rPr>
-              <a:t>done</a:t>
-            </a:r>
-          </a:p>
-        </p:txBody>
-      </p:sp>
-      <p:sp>
-        <p:nvSpPr>
-          <p:cNvPr id="57" name="Star: 5 Points 56">
-            <a:extLst>
-              <a:ext uri="{FF2B5EF4-FFF2-40B4-BE49-F238E27FC236}">
-                <a16:creationId xmlns:a16="http://schemas.microsoft.com/office/drawing/2014/main" id="{D74F1433-7784-43EF-9E78-15C389789C05}"/>
-              </a:ext>
-            </a:extLst>
-          </p:cNvPr>
-          <p:cNvSpPr/>
-          <p:nvPr/>
-        </p:nvSpPr>
-        <p:spPr>
-          <a:xfrm>
-            <a:off x="537422" y="150197"/>
-            <a:ext cx="240127" cy="237401"/>
-          </a:xfrm>
-          <a:prstGeom prst="star5">
-            <a:avLst/>
-          </a:prstGeom>
-          <a:solidFill>
-            <a:srgbClr val="00B050"/>
-          </a:solidFill>
-        </p:spPr>
-        <p:style>
-          <a:lnRef idx="0">
-            <a:schemeClr val="accent6"/>
-          </a:lnRef>
-          <a:fillRef idx="3">
-            <a:schemeClr val="accent6"/>
-          </a:fillRef>
-          <a:effectRef idx="3">
-            <a:schemeClr val="accent6"/>
-          </a:effectRef>
-          <a:fontRef idx="minor">
-            <a:schemeClr val="lt1"/>
-          </a:fontRef>
-        </p:style>
-        <p:txBody>
-          <a:bodyPr rtlCol="0" anchor="ctr"/>
-          <a:lstStyle/>
-          <a:p>
-            <a:pPr algn="ctr"/>
-            <a:endParaRPr lang="en-US"/>
-          </a:p>
-        </p:txBody>
-      </p:sp>
-      <p:sp>
-        <p:nvSpPr>
-          <p:cNvPr id="58" name="TextBox 57">
-            <a:extLst>
-              <a:ext uri="{FF2B5EF4-FFF2-40B4-BE49-F238E27FC236}">
-                <a16:creationId xmlns:a16="http://schemas.microsoft.com/office/drawing/2014/main" id="{F734A601-FE2A-433E-B4B7-97D6D6CDC2F9}"/>
-              </a:ext>
-            </a:extLst>
-          </p:cNvPr>
-          <p:cNvSpPr txBox="1"/>
-          <p:nvPr/>
-        </p:nvSpPr>
-        <p:spPr>
-          <a:xfrm>
-            <a:off x="754996" y="433015"/>
-            <a:ext cx="959503" cy="276999"/>
-          </a:xfrm>
-          <a:prstGeom prst="rect">
-            <a:avLst/>
-          </a:prstGeom>
-          <a:noFill/>
-        </p:spPr>
-        <p:txBody>
-          <a:bodyPr wrap="square" rtlCol="0">
-            <a:spAutoFit/>
-          </a:bodyPr>
-          <a:lstStyle/>
-          <a:p>
-            <a:r>
-              <a:rPr lang="en-US" sz="1200" dirty="0">
-                <a:latin typeface="Segoe Print" panose="02000600000000000000" pitchFamily="2" charset="0"/>
-              </a:rPr>
-              <a:t>Not done</a:t>
-            </a:r>
-          </a:p>
-        </p:txBody>
-      </p:sp>
-      <p:sp>
-        <p:nvSpPr>
-          <p:cNvPr id="64" name="Rectangle: Rounded Corners 63">
-            <a:extLst>
-              <a:ext uri="{FF2B5EF4-FFF2-40B4-BE49-F238E27FC236}">
-                <a16:creationId xmlns:a16="http://schemas.microsoft.com/office/drawing/2014/main" id="{05B39CDA-2F23-4D4F-9E1F-CD4D55D2E96E}"/>
-              </a:ext>
-            </a:extLst>
-          </p:cNvPr>
-          <p:cNvSpPr/>
-          <p:nvPr/>
-        </p:nvSpPr>
-        <p:spPr>
-          <a:xfrm>
-            <a:off x="709245" y="5059081"/>
+            <a:off x="2905043" y="5095256"/>
             <a:ext cx="424737" cy="176256"/>
           </a:xfrm>
           <a:prstGeom prst="roundRect">
@@ -18845,7 +18582,7 @@
         </p:nvSpPr>
         <p:spPr>
           <a:xfrm>
-            <a:off x="1819199" y="5059081"/>
+            <a:off x="4014997" y="5095256"/>
             <a:ext cx="424737" cy="176256"/>
           </a:xfrm>
           <a:prstGeom prst="roundRect">
@@ -18901,7 +18638,7 @@
         </p:nvSpPr>
         <p:spPr>
           <a:xfrm>
-            <a:off x="1267556" y="5060815"/>
+            <a:off x="3463354" y="5096990"/>
             <a:ext cx="424737" cy="176256"/>
           </a:xfrm>
           <a:prstGeom prst="roundRect">
@@ -18961,7 +18698,7 @@
         </p:nvCxnSpPr>
         <p:spPr>
           <a:xfrm rot="16200000" flipH="1">
-            <a:off x="1073301" y="4654191"/>
+            <a:off x="3269099" y="4690366"/>
             <a:ext cx="554412" cy="258836"/>
           </a:xfrm>
           <a:prstGeom prst="bentConnector3">
@@ -19006,7 +18743,7 @@
         </p:nvCxnSpPr>
         <p:spPr>
           <a:xfrm>
-            <a:off x="1480323" y="4388567"/>
+            <a:off x="3676121" y="4424742"/>
             <a:ext cx="551245" cy="670514"/>
           </a:xfrm>
           <a:prstGeom prst="bentConnector2">
@@ -19049,7 +18786,7 @@
         </p:nvCxnSpPr>
         <p:spPr>
           <a:xfrm rot="5400000">
-            <a:off x="795013" y="4633005"/>
+            <a:off x="2990811" y="4669180"/>
             <a:ext cx="552678" cy="299475"/>
           </a:xfrm>
           <a:prstGeom prst="bentConnector3">
@@ -19094,7 +18831,7 @@
         </p:nvCxnSpPr>
         <p:spPr>
           <a:xfrm rot="10800000" flipV="1">
-            <a:off x="369972" y="4388567"/>
+            <a:off x="2565770" y="4424742"/>
             <a:ext cx="591883" cy="670514"/>
           </a:xfrm>
           <a:prstGeom prst="bentConnector2">
@@ -19133,7 +18870,7 @@
         </p:nvSpPr>
         <p:spPr>
           <a:xfrm>
-            <a:off x="3168889" y="4268997"/>
+            <a:off x="5364687" y="4305172"/>
             <a:ext cx="518469" cy="235672"/>
           </a:xfrm>
           <a:prstGeom prst="roundRect">
@@ -19166,7 +18903,7 @@
                 <a:latin typeface="Dubai" panose="020B0503030403030204" pitchFamily="34" charset="-78"/>
                 <a:cs typeface="Dubai" panose="020B0503030403030204" pitchFamily="34" charset="-78"/>
               </a:rPr>
-              <a:t>Future Costs</a:t>
+              <a:t>Accounts</a:t>
             </a:r>
             <a:endParaRPr lang="en-US" sz="3200" dirty="0">
               <a:latin typeface="Dubai" panose="020B0503030403030204" pitchFamily="34" charset="-78"/>
@@ -19189,7 +18926,7 @@
         </p:nvSpPr>
         <p:spPr>
           <a:xfrm>
-            <a:off x="2364637" y="5057347"/>
+            <a:off x="4560435" y="5093522"/>
             <a:ext cx="424737" cy="176256"/>
           </a:xfrm>
           <a:prstGeom prst="roundRect">
@@ -19245,7 +18982,7 @@
         </p:nvSpPr>
         <p:spPr>
           <a:xfrm>
-            <a:off x="2916280" y="5057347"/>
+            <a:off x="5112078" y="5093522"/>
             <a:ext cx="424737" cy="176256"/>
           </a:xfrm>
           <a:prstGeom prst="roundRect">
@@ -19301,7 +19038,7 @@
         </p:nvSpPr>
         <p:spPr>
           <a:xfrm>
-            <a:off x="4030376" y="5059081"/>
+            <a:off x="6226174" y="5095256"/>
             <a:ext cx="424737" cy="176256"/>
           </a:xfrm>
           <a:prstGeom prst="roundRect">
@@ -19357,7 +19094,7 @@
         </p:nvSpPr>
         <p:spPr>
           <a:xfrm>
-            <a:off x="3474591" y="5059081"/>
+            <a:off x="5670389" y="5095256"/>
             <a:ext cx="424737" cy="176256"/>
           </a:xfrm>
           <a:prstGeom prst="roundRect">
@@ -19417,7 +19154,7 @@
         </p:nvCxnSpPr>
         <p:spPr>
           <a:xfrm rot="16200000" flipH="1">
-            <a:off x="3280336" y="4652457"/>
+            <a:off x="5476134" y="4688632"/>
             <a:ext cx="554412" cy="258836"/>
           </a:xfrm>
           <a:prstGeom prst="bentConnector3">
@@ -19462,7 +19199,7 @@
         </p:nvCxnSpPr>
         <p:spPr>
           <a:xfrm>
-            <a:off x="3687358" y="4386833"/>
+            <a:off x="5883156" y="4423008"/>
             <a:ext cx="555387" cy="672248"/>
           </a:xfrm>
           <a:prstGeom prst="bentConnector2">
@@ -19505,7 +19242,7 @@
         </p:nvCxnSpPr>
         <p:spPr>
           <a:xfrm rot="5400000">
-            <a:off x="3002048" y="4631271"/>
+            <a:off x="5197846" y="4667446"/>
             <a:ext cx="552678" cy="299475"/>
           </a:xfrm>
           <a:prstGeom prst="bentConnector3">
@@ -19550,7 +19287,7 @@
         </p:nvCxnSpPr>
         <p:spPr>
           <a:xfrm rot="10800000" flipV="1">
-            <a:off x="2577007" y="4386833"/>
+            <a:off x="4772805" y="4423008"/>
             <a:ext cx="591883" cy="670514"/>
           </a:xfrm>
           <a:prstGeom prst="bentConnector2">
@@ -19577,10 +19314,10 @@
       </p:cxnSp>
       <p:sp>
         <p:nvSpPr>
-          <p:cNvPr id="111" name="Rectangle: Rounded Corners 110">
-            <a:extLst>
-              <a:ext uri="{FF2B5EF4-FFF2-40B4-BE49-F238E27FC236}">
-                <a16:creationId xmlns:a16="http://schemas.microsoft.com/office/drawing/2014/main" id="{14888332-1F3A-4EE6-90E7-C1F01E45DA50}"/>
+          <p:cNvPr id="128" name="Rectangle: Rounded Corners 127">
+            <a:extLst>
+              <a:ext uri="{FF2B5EF4-FFF2-40B4-BE49-F238E27FC236}">
+                <a16:creationId xmlns:a16="http://schemas.microsoft.com/office/drawing/2014/main" id="{C5DD849A-E3B4-44A8-967B-BA136B830C3E}"/>
               </a:ext>
             </a:extLst>
           </p:cNvPr>
@@ -19589,7 +19326,7 @@
         </p:nvSpPr>
         <p:spPr>
           <a:xfrm>
-            <a:off x="5379012" y="4268996"/>
+            <a:off x="7589135" y="4292528"/>
             <a:ext cx="518469" cy="235672"/>
           </a:xfrm>
           <a:prstGeom prst="roundRect">
@@ -19622,7 +19359,7 @@
                 <a:latin typeface="Dubai" panose="020B0503030403030204" pitchFamily="34" charset="-78"/>
                 <a:cs typeface="Dubai" panose="020B0503030403030204" pitchFamily="34" charset="-78"/>
               </a:rPr>
-              <a:t>Future Costs</a:t>
+              <a:t>Bills</a:t>
             </a:r>
             <a:endParaRPr lang="en-US" sz="3200" dirty="0">
               <a:latin typeface="Dubai" panose="020B0503030403030204" pitchFamily="34" charset="-78"/>
@@ -19633,10 +19370,10 @@
       </p:sp>
       <p:sp>
         <p:nvSpPr>
-          <p:cNvPr id="112" name="Rectangle: Rounded Corners 111">
-            <a:extLst>
-              <a:ext uri="{FF2B5EF4-FFF2-40B4-BE49-F238E27FC236}">
-                <a16:creationId xmlns:a16="http://schemas.microsoft.com/office/drawing/2014/main" id="{463C02A8-4015-4926-8891-09AF65800D71}"/>
+          <p:cNvPr id="129" name="Rectangle: Rounded Corners 128">
+            <a:extLst>
+              <a:ext uri="{FF2B5EF4-FFF2-40B4-BE49-F238E27FC236}">
+                <a16:creationId xmlns:a16="http://schemas.microsoft.com/office/drawing/2014/main" id="{4772E9B2-AE19-4512-B192-57319F093EE6}"/>
               </a:ext>
             </a:extLst>
           </p:cNvPr>
@@ -19645,7 +19382,7 @@
         </p:nvSpPr>
         <p:spPr>
           <a:xfrm>
-            <a:off x="4574760" y="5057346"/>
+            <a:off x="6784883" y="5080878"/>
             <a:ext cx="424737" cy="176256"/>
           </a:xfrm>
           <a:prstGeom prst="roundRect">
@@ -19689,10 +19426,10 @@
       </p:sp>
       <p:sp>
         <p:nvSpPr>
-          <p:cNvPr id="113" name="Rectangle: Rounded Corners 112">
-            <a:extLst>
-              <a:ext uri="{FF2B5EF4-FFF2-40B4-BE49-F238E27FC236}">
-                <a16:creationId xmlns:a16="http://schemas.microsoft.com/office/drawing/2014/main" id="{79A13E15-6FA1-4F6D-8D2F-2DDE07188E05}"/>
+          <p:cNvPr id="130" name="Rectangle: Rounded Corners 129">
+            <a:extLst>
+              <a:ext uri="{FF2B5EF4-FFF2-40B4-BE49-F238E27FC236}">
+                <a16:creationId xmlns:a16="http://schemas.microsoft.com/office/drawing/2014/main" id="{CF8DC8BF-7777-482D-9726-9A18196ECB69}"/>
               </a:ext>
             </a:extLst>
           </p:cNvPr>
@@ -19701,7 +19438,7 @@
         </p:nvSpPr>
         <p:spPr>
           <a:xfrm>
-            <a:off x="5126403" y="5057346"/>
+            <a:off x="7336526" y="5080878"/>
             <a:ext cx="424737" cy="176256"/>
           </a:xfrm>
           <a:prstGeom prst="roundRect">
@@ -19745,10 +19482,10 @@
       </p:sp>
       <p:sp>
         <p:nvSpPr>
-          <p:cNvPr id="114" name="Rectangle: Rounded Corners 113">
-            <a:extLst>
-              <a:ext uri="{FF2B5EF4-FFF2-40B4-BE49-F238E27FC236}">
-                <a16:creationId xmlns:a16="http://schemas.microsoft.com/office/drawing/2014/main" id="{AC7DD97F-DFFE-4738-B9EF-BC99B11AAC52}"/>
+          <p:cNvPr id="131" name="Rectangle: Rounded Corners 130">
+            <a:extLst>
+              <a:ext uri="{FF2B5EF4-FFF2-40B4-BE49-F238E27FC236}">
+                <a16:creationId xmlns:a16="http://schemas.microsoft.com/office/drawing/2014/main" id="{C03BD5D4-5599-487D-880C-970E115CACB9}"/>
               </a:ext>
             </a:extLst>
           </p:cNvPr>
@@ -19757,7 +19494,7 @@
         </p:nvSpPr>
         <p:spPr>
           <a:xfrm>
-            <a:off x="6240499" y="5059080"/>
+            <a:off x="8450622" y="5082612"/>
             <a:ext cx="424737" cy="176256"/>
           </a:xfrm>
           <a:prstGeom prst="roundRect">
@@ -19801,10 +19538,10 @@
       </p:sp>
       <p:sp>
         <p:nvSpPr>
-          <p:cNvPr id="115" name="Rectangle: Rounded Corners 114">
-            <a:extLst>
-              <a:ext uri="{FF2B5EF4-FFF2-40B4-BE49-F238E27FC236}">
-                <a16:creationId xmlns:a16="http://schemas.microsoft.com/office/drawing/2014/main" id="{D8784940-CC12-4CCB-97AB-78330849E0E3}"/>
+          <p:cNvPr id="132" name="Rectangle: Rounded Corners 131">
+            <a:extLst>
+              <a:ext uri="{FF2B5EF4-FFF2-40B4-BE49-F238E27FC236}">
+                <a16:creationId xmlns:a16="http://schemas.microsoft.com/office/drawing/2014/main" id="{4FA647F7-F364-4F90-BF58-2408212B5153}"/>
               </a:ext>
             </a:extLst>
           </p:cNvPr>
@@ -19813,7 +19550,7 @@
         </p:nvSpPr>
         <p:spPr>
           <a:xfrm>
-            <a:off x="5684714" y="5059080"/>
+            <a:off x="7894837" y="5082612"/>
             <a:ext cx="424737" cy="176256"/>
           </a:xfrm>
           <a:prstGeom prst="roundRect">
@@ -19857,506 +19594,6 @@
       </p:sp>
       <p:cxnSp>
         <p:nvCxnSpPr>
-          <p:cNvPr id="116" name="Connector: Elbow 115">
-            <a:extLst>
-              <a:ext uri="{FF2B5EF4-FFF2-40B4-BE49-F238E27FC236}">
-                <a16:creationId xmlns:a16="http://schemas.microsoft.com/office/drawing/2014/main" id="{65B2846D-8B8E-45DF-9151-069539E4591C}"/>
-              </a:ext>
-            </a:extLst>
-          </p:cNvPr>
-          <p:cNvCxnSpPr>
-            <a:cxnSpLocks/>
-            <a:stCxn id="111" idx="2"/>
-            <a:endCxn id="115" idx="0"/>
-          </p:cNvCxnSpPr>
-          <p:nvPr/>
-        </p:nvCxnSpPr>
-        <p:spPr>
-          <a:xfrm rot="16200000" flipH="1">
-            <a:off x="5490459" y="4652456"/>
-            <a:ext cx="554412" cy="258836"/>
-          </a:xfrm>
-          <a:prstGeom prst="bentConnector3">
-            <a:avLst>
-              <a:gd name="adj1" fmla="val 50000"/>
-            </a:avLst>
-          </a:prstGeom>
-          <a:ln>
-            <a:tailEnd type="triangle"/>
-          </a:ln>
-        </p:spPr>
-        <p:style>
-          <a:lnRef idx="1">
-            <a:schemeClr val="accent1"/>
-          </a:lnRef>
-          <a:fillRef idx="0">
-            <a:schemeClr val="accent1"/>
-          </a:fillRef>
-          <a:effectRef idx="0">
-            <a:schemeClr val="accent1"/>
-          </a:effectRef>
-          <a:fontRef idx="minor">
-            <a:schemeClr val="tx1"/>
-          </a:fontRef>
-        </p:style>
-      </p:cxnSp>
-      <p:cxnSp>
-        <p:nvCxnSpPr>
-          <p:cNvPr id="117" name="Connector: Elbow 116">
-            <a:extLst>
-              <a:ext uri="{FF2B5EF4-FFF2-40B4-BE49-F238E27FC236}">
-                <a16:creationId xmlns:a16="http://schemas.microsoft.com/office/drawing/2014/main" id="{CA99E263-702C-46C4-BBAB-1E45C2A44F2B}"/>
-              </a:ext>
-            </a:extLst>
-          </p:cNvPr>
-          <p:cNvCxnSpPr>
-            <a:cxnSpLocks/>
-            <a:stCxn id="111" idx="3"/>
-            <a:endCxn id="114" idx="0"/>
-          </p:cNvCxnSpPr>
-          <p:nvPr/>
-        </p:nvCxnSpPr>
-        <p:spPr>
-          <a:xfrm>
-            <a:off x="5897481" y="4386832"/>
-            <a:ext cx="555387" cy="672248"/>
-          </a:xfrm>
-          <a:prstGeom prst="bentConnector2">
-            <a:avLst/>
-          </a:prstGeom>
-          <a:ln>
-            <a:tailEnd type="triangle"/>
-          </a:ln>
-        </p:spPr>
-        <p:style>
-          <a:lnRef idx="1">
-            <a:schemeClr val="accent1"/>
-          </a:lnRef>
-          <a:fillRef idx="0">
-            <a:schemeClr val="accent1"/>
-          </a:fillRef>
-          <a:effectRef idx="0">
-            <a:schemeClr val="accent1"/>
-          </a:effectRef>
-          <a:fontRef idx="minor">
-            <a:schemeClr val="tx1"/>
-          </a:fontRef>
-        </p:style>
-      </p:cxnSp>
-      <p:cxnSp>
-        <p:nvCxnSpPr>
-          <p:cNvPr id="118" name="Connector: Elbow 117">
-            <a:extLst>
-              <a:ext uri="{FF2B5EF4-FFF2-40B4-BE49-F238E27FC236}">
-                <a16:creationId xmlns:a16="http://schemas.microsoft.com/office/drawing/2014/main" id="{1D69B216-CBCC-4FB5-9283-8E299FD37C02}"/>
-              </a:ext>
-            </a:extLst>
-          </p:cNvPr>
-          <p:cNvCxnSpPr>
-            <a:cxnSpLocks/>
-            <a:stCxn id="111" idx="2"/>
-            <a:endCxn id="113" idx="0"/>
-          </p:cNvCxnSpPr>
-          <p:nvPr/>
-        </p:nvCxnSpPr>
-        <p:spPr>
-          <a:xfrm rot="5400000">
-            <a:off x="5212171" y="4631270"/>
-            <a:ext cx="552678" cy="299475"/>
-          </a:xfrm>
-          <a:prstGeom prst="bentConnector3">
-            <a:avLst>
-              <a:gd name="adj1" fmla="val 50000"/>
-            </a:avLst>
-          </a:prstGeom>
-          <a:ln>
-            <a:tailEnd type="triangle"/>
-          </a:ln>
-        </p:spPr>
-        <p:style>
-          <a:lnRef idx="1">
-            <a:schemeClr val="accent1"/>
-          </a:lnRef>
-          <a:fillRef idx="0">
-            <a:schemeClr val="accent1"/>
-          </a:fillRef>
-          <a:effectRef idx="0">
-            <a:schemeClr val="accent1"/>
-          </a:effectRef>
-          <a:fontRef idx="minor">
-            <a:schemeClr val="tx1"/>
-          </a:fontRef>
-        </p:style>
-      </p:cxnSp>
-      <p:cxnSp>
-        <p:nvCxnSpPr>
-          <p:cNvPr id="119" name="Connector: Elbow 118">
-            <a:extLst>
-              <a:ext uri="{FF2B5EF4-FFF2-40B4-BE49-F238E27FC236}">
-                <a16:creationId xmlns:a16="http://schemas.microsoft.com/office/drawing/2014/main" id="{92A51693-2AE1-4839-A60B-26182066922A}"/>
-              </a:ext>
-            </a:extLst>
-          </p:cNvPr>
-          <p:cNvCxnSpPr>
-            <a:cxnSpLocks/>
-            <a:stCxn id="111" idx="1"/>
-            <a:endCxn id="112" idx="0"/>
-          </p:cNvCxnSpPr>
-          <p:nvPr/>
-        </p:nvCxnSpPr>
-        <p:spPr>
-          <a:xfrm rot="10800000" flipV="1">
-            <a:off x="4787130" y="4386832"/>
-            <a:ext cx="591883" cy="670514"/>
-          </a:xfrm>
-          <a:prstGeom prst="bentConnector2">
-            <a:avLst/>
-          </a:prstGeom>
-          <a:ln>
-            <a:tailEnd type="triangle"/>
-          </a:ln>
-        </p:spPr>
-        <p:style>
-          <a:lnRef idx="1">
-            <a:schemeClr val="accent1"/>
-          </a:lnRef>
-          <a:fillRef idx="0">
-            <a:schemeClr val="accent1"/>
-          </a:fillRef>
-          <a:effectRef idx="0">
-            <a:schemeClr val="accent1"/>
-          </a:effectRef>
-          <a:fontRef idx="minor">
-            <a:schemeClr val="tx1"/>
-          </a:fontRef>
-        </p:style>
-      </p:cxnSp>
-      <p:cxnSp>
-        <p:nvCxnSpPr>
-          <p:cNvPr id="124" name="Connector: Elbow 123">
-            <a:extLst>
-              <a:ext uri="{FF2B5EF4-FFF2-40B4-BE49-F238E27FC236}">
-                <a16:creationId xmlns:a16="http://schemas.microsoft.com/office/drawing/2014/main" id="{8ACCC7F7-ACF9-4355-B148-4E8BA9F6EC1A}"/>
-              </a:ext>
-            </a:extLst>
-          </p:cNvPr>
-          <p:cNvCxnSpPr>
-            <a:cxnSpLocks/>
-            <a:endCxn id="111" idx="0"/>
-          </p:cNvCxnSpPr>
-          <p:nvPr/>
-        </p:nvCxnSpPr>
-        <p:spPr>
-          <a:xfrm rot="5400000">
-            <a:off x="5936566" y="3800677"/>
-            <a:ext cx="170001" cy="766637"/>
-          </a:xfrm>
-          <a:prstGeom prst="bentConnector3">
-            <a:avLst>
-              <a:gd name="adj1" fmla="val 50000"/>
-            </a:avLst>
-          </a:prstGeom>
-          <a:ln>
-            <a:tailEnd type="triangle"/>
-          </a:ln>
-        </p:spPr>
-        <p:style>
-          <a:lnRef idx="1">
-            <a:schemeClr val="accent1"/>
-          </a:lnRef>
-          <a:fillRef idx="0">
-            <a:schemeClr val="accent1"/>
-          </a:fillRef>
-          <a:effectRef idx="0">
-            <a:schemeClr val="accent1"/>
-          </a:effectRef>
-          <a:fontRef idx="minor">
-            <a:schemeClr val="tx1"/>
-          </a:fontRef>
-        </p:style>
-      </p:cxnSp>
-      <p:sp>
-        <p:nvSpPr>
-          <p:cNvPr id="128" name="Rectangle: Rounded Corners 127">
-            <a:extLst>
-              <a:ext uri="{FF2B5EF4-FFF2-40B4-BE49-F238E27FC236}">
-                <a16:creationId xmlns:a16="http://schemas.microsoft.com/office/drawing/2014/main" id="{C5DD849A-E3B4-44A8-967B-BA136B830C3E}"/>
-              </a:ext>
-            </a:extLst>
-          </p:cNvPr>
-          <p:cNvSpPr/>
-          <p:nvPr/>
-        </p:nvSpPr>
-        <p:spPr>
-          <a:xfrm>
-            <a:off x="7589135" y="4292528"/>
-            <a:ext cx="518469" cy="235672"/>
-          </a:xfrm>
-          <a:prstGeom prst="roundRect">
-            <a:avLst/>
-          </a:prstGeom>
-        </p:spPr>
-        <p:style>
-          <a:lnRef idx="2">
-            <a:schemeClr val="accent1">
-              <a:shade val="50000"/>
-            </a:schemeClr>
-          </a:lnRef>
-          <a:fillRef idx="1">
-            <a:schemeClr val="accent1"/>
-          </a:fillRef>
-          <a:effectRef idx="0">
-            <a:schemeClr val="accent1"/>
-          </a:effectRef>
-          <a:fontRef idx="minor">
-            <a:schemeClr val="lt1"/>
-          </a:fontRef>
-        </p:style>
-        <p:txBody>
-          <a:bodyPr rtlCol="0" anchor="ctr"/>
-          <a:lstStyle/>
-          <a:p>
-            <a:pPr algn="ctr"/>
-            <a:r>
-              <a:rPr lang="en-US" sz="600" dirty="0">
-                <a:latin typeface="Dubai" panose="020B0503030403030204" pitchFamily="34" charset="-78"/>
-                <a:cs typeface="Dubai" panose="020B0503030403030204" pitchFamily="34" charset="-78"/>
-              </a:rPr>
-              <a:t>Future Costs</a:t>
-            </a:r>
-            <a:endParaRPr lang="en-US" sz="3200" dirty="0">
-              <a:latin typeface="Dubai" panose="020B0503030403030204" pitchFamily="34" charset="-78"/>
-              <a:cs typeface="Dubai" panose="020B0503030403030204" pitchFamily="34" charset="-78"/>
-            </a:endParaRPr>
-          </a:p>
-        </p:txBody>
-      </p:sp>
-      <p:sp>
-        <p:nvSpPr>
-          <p:cNvPr id="129" name="Rectangle: Rounded Corners 128">
-            <a:extLst>
-              <a:ext uri="{FF2B5EF4-FFF2-40B4-BE49-F238E27FC236}">
-                <a16:creationId xmlns:a16="http://schemas.microsoft.com/office/drawing/2014/main" id="{4772E9B2-AE19-4512-B192-57319F093EE6}"/>
-              </a:ext>
-            </a:extLst>
-          </p:cNvPr>
-          <p:cNvSpPr/>
-          <p:nvPr/>
-        </p:nvSpPr>
-        <p:spPr>
-          <a:xfrm>
-            <a:off x="6784883" y="5080878"/>
-            <a:ext cx="424737" cy="176256"/>
-          </a:xfrm>
-          <a:prstGeom prst="roundRect">
-            <a:avLst/>
-          </a:prstGeom>
-        </p:spPr>
-        <p:style>
-          <a:lnRef idx="2">
-            <a:schemeClr val="accent1">
-              <a:shade val="50000"/>
-            </a:schemeClr>
-          </a:lnRef>
-          <a:fillRef idx="1">
-            <a:schemeClr val="accent1"/>
-          </a:fillRef>
-          <a:effectRef idx="0">
-            <a:schemeClr val="accent1"/>
-          </a:effectRef>
-          <a:fontRef idx="minor">
-            <a:schemeClr val="lt1"/>
-          </a:fontRef>
-        </p:style>
-        <p:txBody>
-          <a:bodyPr rtlCol="0" anchor="ctr"/>
-          <a:lstStyle/>
-          <a:p>
-            <a:pPr algn="ctr"/>
-            <a:r>
-              <a:rPr lang="en-US" sz="600" dirty="0">
-                <a:latin typeface="Dubai" panose="020B0503030403030204" pitchFamily="34" charset="-78"/>
-                <a:cs typeface="Dubai" panose="020B0503030403030204" pitchFamily="34" charset="-78"/>
-              </a:rPr>
-              <a:t>create</a:t>
-            </a:r>
-            <a:endParaRPr lang="en-US" sz="3200" dirty="0">
-              <a:latin typeface="Dubai" panose="020B0503030403030204" pitchFamily="34" charset="-78"/>
-              <a:cs typeface="Dubai" panose="020B0503030403030204" pitchFamily="34" charset="-78"/>
-            </a:endParaRPr>
-          </a:p>
-        </p:txBody>
-      </p:sp>
-      <p:sp>
-        <p:nvSpPr>
-          <p:cNvPr id="130" name="Rectangle: Rounded Corners 129">
-            <a:extLst>
-              <a:ext uri="{FF2B5EF4-FFF2-40B4-BE49-F238E27FC236}">
-                <a16:creationId xmlns:a16="http://schemas.microsoft.com/office/drawing/2014/main" id="{CF8DC8BF-7777-482D-9726-9A18196ECB69}"/>
-              </a:ext>
-            </a:extLst>
-          </p:cNvPr>
-          <p:cNvSpPr/>
-          <p:nvPr/>
-        </p:nvSpPr>
-        <p:spPr>
-          <a:xfrm>
-            <a:off x="7336526" y="5080878"/>
-            <a:ext cx="424737" cy="176256"/>
-          </a:xfrm>
-          <a:prstGeom prst="roundRect">
-            <a:avLst/>
-          </a:prstGeom>
-        </p:spPr>
-        <p:style>
-          <a:lnRef idx="2">
-            <a:schemeClr val="accent1">
-              <a:shade val="50000"/>
-            </a:schemeClr>
-          </a:lnRef>
-          <a:fillRef idx="1">
-            <a:schemeClr val="accent1"/>
-          </a:fillRef>
-          <a:effectRef idx="0">
-            <a:schemeClr val="accent1"/>
-          </a:effectRef>
-          <a:fontRef idx="minor">
-            <a:schemeClr val="lt1"/>
-          </a:fontRef>
-        </p:style>
-        <p:txBody>
-          <a:bodyPr rtlCol="0" anchor="ctr"/>
-          <a:lstStyle/>
-          <a:p>
-            <a:pPr algn="ctr"/>
-            <a:r>
-              <a:rPr lang="en-US" sz="600" dirty="0">
-                <a:latin typeface="Dubai" panose="020B0503030403030204" pitchFamily="34" charset="-78"/>
-                <a:cs typeface="Dubai" panose="020B0503030403030204" pitchFamily="34" charset="-78"/>
-              </a:rPr>
-              <a:t>read</a:t>
-            </a:r>
-            <a:endParaRPr lang="en-US" sz="3200" dirty="0">
-              <a:latin typeface="Dubai" panose="020B0503030403030204" pitchFamily="34" charset="-78"/>
-              <a:cs typeface="Dubai" panose="020B0503030403030204" pitchFamily="34" charset="-78"/>
-            </a:endParaRPr>
-          </a:p>
-        </p:txBody>
-      </p:sp>
-      <p:sp>
-        <p:nvSpPr>
-          <p:cNvPr id="131" name="Rectangle: Rounded Corners 130">
-            <a:extLst>
-              <a:ext uri="{FF2B5EF4-FFF2-40B4-BE49-F238E27FC236}">
-                <a16:creationId xmlns:a16="http://schemas.microsoft.com/office/drawing/2014/main" id="{C03BD5D4-5599-487D-880C-970E115CACB9}"/>
-              </a:ext>
-            </a:extLst>
-          </p:cNvPr>
-          <p:cNvSpPr/>
-          <p:nvPr/>
-        </p:nvSpPr>
-        <p:spPr>
-          <a:xfrm>
-            <a:off x="8450622" y="5082612"/>
-            <a:ext cx="424737" cy="176256"/>
-          </a:xfrm>
-          <a:prstGeom prst="roundRect">
-            <a:avLst/>
-          </a:prstGeom>
-        </p:spPr>
-        <p:style>
-          <a:lnRef idx="2">
-            <a:schemeClr val="accent1">
-              <a:shade val="50000"/>
-            </a:schemeClr>
-          </a:lnRef>
-          <a:fillRef idx="1">
-            <a:schemeClr val="accent1"/>
-          </a:fillRef>
-          <a:effectRef idx="0">
-            <a:schemeClr val="accent1"/>
-          </a:effectRef>
-          <a:fontRef idx="minor">
-            <a:schemeClr val="lt1"/>
-          </a:fontRef>
-        </p:style>
-        <p:txBody>
-          <a:bodyPr rtlCol="0" anchor="ctr"/>
-          <a:lstStyle/>
-          <a:p>
-            <a:pPr algn="ctr"/>
-            <a:r>
-              <a:rPr lang="en-US" sz="600" dirty="0">
-                <a:latin typeface="Dubai" panose="020B0503030403030204" pitchFamily="34" charset="-78"/>
-                <a:cs typeface="Dubai" panose="020B0503030403030204" pitchFamily="34" charset="-78"/>
-              </a:rPr>
-              <a:t>delete</a:t>
-            </a:r>
-            <a:endParaRPr lang="en-US" sz="3200" dirty="0">
-              <a:latin typeface="Dubai" panose="020B0503030403030204" pitchFamily="34" charset="-78"/>
-              <a:cs typeface="Dubai" panose="020B0503030403030204" pitchFamily="34" charset="-78"/>
-            </a:endParaRPr>
-          </a:p>
-        </p:txBody>
-      </p:sp>
-      <p:sp>
-        <p:nvSpPr>
-          <p:cNvPr id="132" name="Rectangle: Rounded Corners 131">
-            <a:extLst>
-              <a:ext uri="{FF2B5EF4-FFF2-40B4-BE49-F238E27FC236}">
-                <a16:creationId xmlns:a16="http://schemas.microsoft.com/office/drawing/2014/main" id="{4FA647F7-F364-4F90-BF58-2408212B5153}"/>
-              </a:ext>
-            </a:extLst>
-          </p:cNvPr>
-          <p:cNvSpPr/>
-          <p:nvPr/>
-        </p:nvSpPr>
-        <p:spPr>
-          <a:xfrm>
-            <a:off x="7894837" y="5082612"/>
-            <a:ext cx="424737" cy="176256"/>
-          </a:xfrm>
-          <a:prstGeom prst="roundRect">
-            <a:avLst/>
-          </a:prstGeom>
-        </p:spPr>
-        <p:style>
-          <a:lnRef idx="2">
-            <a:schemeClr val="accent1">
-              <a:shade val="50000"/>
-            </a:schemeClr>
-          </a:lnRef>
-          <a:fillRef idx="1">
-            <a:schemeClr val="accent1"/>
-          </a:fillRef>
-          <a:effectRef idx="0">
-            <a:schemeClr val="accent1"/>
-          </a:effectRef>
-          <a:fontRef idx="minor">
-            <a:schemeClr val="lt1"/>
-          </a:fontRef>
-        </p:style>
-        <p:txBody>
-          <a:bodyPr rtlCol="0" anchor="ctr"/>
-          <a:lstStyle/>
-          <a:p>
-            <a:pPr algn="ctr"/>
-            <a:r>
-              <a:rPr lang="en-US" sz="600" dirty="0">
-                <a:latin typeface="Dubai" panose="020B0503030403030204" pitchFamily="34" charset="-78"/>
-                <a:cs typeface="Dubai" panose="020B0503030403030204" pitchFamily="34" charset="-78"/>
-              </a:rPr>
-              <a:t>update</a:t>
-            </a:r>
-            <a:endParaRPr lang="en-US" sz="3200" dirty="0">
-              <a:latin typeface="Dubai" panose="020B0503030403030204" pitchFamily="34" charset="-78"/>
-              <a:cs typeface="Dubai" panose="020B0503030403030204" pitchFamily="34" charset="-78"/>
-            </a:endParaRPr>
-          </a:p>
-        </p:txBody>
-      </p:sp>
-      <p:cxnSp>
-        <p:nvCxnSpPr>
           <p:cNvPr id="133" name="Connector: Elbow 132">
             <a:extLst>
               <a:ext uri="{FF2B5EF4-FFF2-40B4-BE49-F238E27FC236}">
@@ -20576,997 +19813,6 @@
           </a:fontRef>
         </p:style>
       </p:cxnSp>
-      <p:sp>
-        <p:nvSpPr>
-          <p:cNvPr id="156" name="Star: 5 Points 155">
-            <a:extLst>
-              <a:ext uri="{FF2B5EF4-FFF2-40B4-BE49-F238E27FC236}">
-                <a16:creationId xmlns:a16="http://schemas.microsoft.com/office/drawing/2014/main" id="{F8907793-F303-4809-B59C-243AB5759816}"/>
-              </a:ext>
-            </a:extLst>
-          </p:cNvPr>
-          <p:cNvSpPr/>
-          <p:nvPr/>
-        </p:nvSpPr>
-        <p:spPr>
-          <a:xfrm>
-            <a:off x="2676153" y="383694"/>
-            <a:ext cx="240127" cy="237401"/>
-          </a:xfrm>
-          <a:prstGeom prst="star5">
-            <a:avLst/>
-          </a:prstGeom>
-          <a:solidFill>
-            <a:srgbClr val="00B050"/>
-          </a:solidFill>
-        </p:spPr>
-        <p:style>
-          <a:lnRef idx="0">
-            <a:schemeClr val="accent6"/>
-          </a:lnRef>
-          <a:fillRef idx="3">
-            <a:schemeClr val="accent6"/>
-          </a:fillRef>
-          <a:effectRef idx="3">
-            <a:schemeClr val="accent6"/>
-          </a:effectRef>
-          <a:fontRef idx="minor">
-            <a:schemeClr val="lt1"/>
-          </a:fontRef>
-        </p:style>
-        <p:txBody>
-          <a:bodyPr rtlCol="0" anchor="ctr"/>
-          <a:lstStyle/>
-          <a:p>
-            <a:pPr algn="ctr"/>
-            <a:endParaRPr lang="en-US"/>
-          </a:p>
-        </p:txBody>
-      </p:sp>
-      <p:sp>
-        <p:nvSpPr>
-          <p:cNvPr id="157" name="Star: 5 Points 156">
-            <a:extLst>
-              <a:ext uri="{FF2B5EF4-FFF2-40B4-BE49-F238E27FC236}">
-                <a16:creationId xmlns:a16="http://schemas.microsoft.com/office/drawing/2014/main" id="{583B8A9A-ED88-4802-B0E4-55967C575EAF}"/>
-              </a:ext>
-            </a:extLst>
-          </p:cNvPr>
-          <p:cNvSpPr/>
-          <p:nvPr/>
-        </p:nvSpPr>
-        <p:spPr>
-          <a:xfrm>
-            <a:off x="2676153" y="688406"/>
-            <a:ext cx="240127" cy="237401"/>
-          </a:xfrm>
-          <a:prstGeom prst="star5">
-            <a:avLst/>
-          </a:prstGeom>
-          <a:solidFill>
-            <a:srgbClr val="FF0000"/>
-          </a:solidFill>
-        </p:spPr>
-        <p:style>
-          <a:lnRef idx="0">
-            <a:schemeClr val="accent6"/>
-          </a:lnRef>
-          <a:fillRef idx="3">
-            <a:schemeClr val="accent6"/>
-          </a:fillRef>
-          <a:effectRef idx="3">
-            <a:schemeClr val="accent6"/>
-          </a:effectRef>
-          <a:fontRef idx="minor">
-            <a:schemeClr val="lt1"/>
-          </a:fontRef>
-        </p:style>
-        <p:txBody>
-          <a:bodyPr rtlCol="0" anchor="ctr"/>
-          <a:lstStyle/>
-          <a:p>
-            <a:pPr algn="ctr"/>
-            <a:endParaRPr lang="en-US"/>
-          </a:p>
-        </p:txBody>
-      </p:sp>
-      <p:sp>
-        <p:nvSpPr>
-          <p:cNvPr id="158" name="Star: 5 Points 157">
-            <a:extLst>
-              <a:ext uri="{FF2B5EF4-FFF2-40B4-BE49-F238E27FC236}">
-                <a16:creationId xmlns:a16="http://schemas.microsoft.com/office/drawing/2014/main" id="{6475CC6A-0044-4B44-A893-D64BB3D3202B}"/>
-              </a:ext>
-            </a:extLst>
-          </p:cNvPr>
-          <p:cNvSpPr/>
-          <p:nvPr/>
-        </p:nvSpPr>
-        <p:spPr>
-          <a:xfrm>
-            <a:off x="2928762" y="690356"/>
-            <a:ext cx="240127" cy="237401"/>
-          </a:xfrm>
-          <a:prstGeom prst="star5">
-            <a:avLst/>
-          </a:prstGeom>
-          <a:solidFill>
-            <a:srgbClr val="FF0000"/>
-          </a:solidFill>
-        </p:spPr>
-        <p:style>
-          <a:lnRef idx="0">
-            <a:schemeClr val="accent6"/>
-          </a:lnRef>
-          <a:fillRef idx="3">
-            <a:schemeClr val="accent6"/>
-          </a:fillRef>
-          <a:effectRef idx="3">
-            <a:schemeClr val="accent6"/>
-          </a:effectRef>
-          <a:fontRef idx="minor">
-            <a:schemeClr val="lt1"/>
-          </a:fontRef>
-        </p:style>
-        <p:txBody>
-          <a:bodyPr rtlCol="0" anchor="ctr"/>
-          <a:lstStyle/>
-          <a:p>
-            <a:pPr algn="ctr"/>
-            <a:endParaRPr lang="en-US"/>
-          </a:p>
-        </p:txBody>
-      </p:sp>
-      <p:sp>
-        <p:nvSpPr>
-          <p:cNvPr id="159" name="Star: 5 Points 158">
-            <a:extLst>
-              <a:ext uri="{FF2B5EF4-FFF2-40B4-BE49-F238E27FC236}">
-                <a16:creationId xmlns:a16="http://schemas.microsoft.com/office/drawing/2014/main" id="{C364D6B2-0F70-47E9-9E86-EC6E99861A36}"/>
-              </a:ext>
-            </a:extLst>
-          </p:cNvPr>
-          <p:cNvSpPr/>
-          <p:nvPr/>
-        </p:nvSpPr>
-        <p:spPr>
-          <a:xfrm>
-            <a:off x="3181371" y="692306"/>
-            <a:ext cx="240127" cy="237401"/>
-          </a:xfrm>
-          <a:prstGeom prst="star5">
-            <a:avLst/>
-          </a:prstGeom>
-          <a:solidFill>
-            <a:srgbClr val="FF0000"/>
-          </a:solidFill>
-        </p:spPr>
-        <p:style>
-          <a:lnRef idx="0">
-            <a:schemeClr val="accent6"/>
-          </a:lnRef>
-          <a:fillRef idx="3">
-            <a:schemeClr val="accent6"/>
-          </a:fillRef>
-          <a:effectRef idx="3">
-            <a:schemeClr val="accent6"/>
-          </a:effectRef>
-          <a:fontRef idx="minor">
-            <a:schemeClr val="lt1"/>
-          </a:fontRef>
-        </p:style>
-        <p:txBody>
-          <a:bodyPr rtlCol="0" anchor="ctr"/>
-          <a:lstStyle/>
-          <a:p>
-            <a:pPr algn="ctr"/>
-            <a:endParaRPr lang="en-US"/>
-          </a:p>
-        </p:txBody>
-      </p:sp>
-      <p:sp>
-        <p:nvSpPr>
-          <p:cNvPr id="160" name="Star: 5 Points 159">
-            <a:extLst>
-              <a:ext uri="{FF2B5EF4-FFF2-40B4-BE49-F238E27FC236}">
-                <a16:creationId xmlns:a16="http://schemas.microsoft.com/office/drawing/2014/main" id="{5016D7D0-1891-4B90-B54C-9ABC59E35956}"/>
-              </a:ext>
-            </a:extLst>
-          </p:cNvPr>
-          <p:cNvSpPr/>
-          <p:nvPr/>
-        </p:nvSpPr>
-        <p:spPr>
-          <a:xfrm>
-            <a:off x="3433980" y="694256"/>
-            <a:ext cx="240127" cy="237401"/>
-          </a:xfrm>
-          <a:prstGeom prst="star5">
-            <a:avLst/>
-          </a:prstGeom>
-          <a:solidFill>
-            <a:srgbClr val="FF0000"/>
-          </a:solidFill>
-        </p:spPr>
-        <p:style>
-          <a:lnRef idx="0">
-            <a:schemeClr val="accent6"/>
-          </a:lnRef>
-          <a:fillRef idx="3">
-            <a:schemeClr val="accent6"/>
-          </a:fillRef>
-          <a:effectRef idx="3">
-            <a:schemeClr val="accent6"/>
-          </a:effectRef>
-          <a:fontRef idx="minor">
-            <a:schemeClr val="lt1"/>
-          </a:fontRef>
-        </p:style>
-        <p:txBody>
-          <a:bodyPr rtlCol="0" anchor="ctr"/>
-          <a:lstStyle/>
-          <a:p>
-            <a:pPr algn="ctr"/>
-            <a:endParaRPr lang="en-US"/>
-          </a:p>
-        </p:txBody>
-      </p:sp>
-      <p:sp>
-        <p:nvSpPr>
-          <p:cNvPr id="161" name="Star: 5 Points 160">
-            <a:extLst>
-              <a:ext uri="{FF2B5EF4-FFF2-40B4-BE49-F238E27FC236}">
-                <a16:creationId xmlns:a16="http://schemas.microsoft.com/office/drawing/2014/main" id="{1A4BB01B-1237-448E-9A8C-2B84D3DE9BDE}"/>
-              </a:ext>
-            </a:extLst>
-          </p:cNvPr>
-          <p:cNvSpPr/>
-          <p:nvPr/>
-        </p:nvSpPr>
-        <p:spPr>
-          <a:xfrm>
-            <a:off x="3686589" y="696206"/>
-            <a:ext cx="240127" cy="237401"/>
-          </a:xfrm>
-          <a:prstGeom prst="star5">
-            <a:avLst/>
-          </a:prstGeom>
-          <a:solidFill>
-            <a:srgbClr val="FF0000"/>
-          </a:solidFill>
-        </p:spPr>
-        <p:style>
-          <a:lnRef idx="0">
-            <a:schemeClr val="accent6"/>
-          </a:lnRef>
-          <a:fillRef idx="3">
-            <a:schemeClr val="accent6"/>
-          </a:fillRef>
-          <a:effectRef idx="3">
-            <a:schemeClr val="accent6"/>
-          </a:effectRef>
-          <a:fontRef idx="minor">
-            <a:schemeClr val="lt1"/>
-          </a:fontRef>
-        </p:style>
-        <p:txBody>
-          <a:bodyPr rtlCol="0" anchor="ctr"/>
-          <a:lstStyle/>
-          <a:p>
-            <a:pPr algn="ctr"/>
-            <a:endParaRPr lang="en-US"/>
-          </a:p>
-        </p:txBody>
-      </p:sp>
-      <p:sp>
-        <p:nvSpPr>
-          <p:cNvPr id="162" name="Star: 5 Points 161">
-            <a:extLst>
-              <a:ext uri="{FF2B5EF4-FFF2-40B4-BE49-F238E27FC236}">
-                <a16:creationId xmlns:a16="http://schemas.microsoft.com/office/drawing/2014/main" id="{D3E8A1E0-76AA-4F92-9A2E-1F52D21A7DE0}"/>
-              </a:ext>
-            </a:extLst>
-          </p:cNvPr>
-          <p:cNvSpPr/>
-          <p:nvPr/>
-        </p:nvSpPr>
-        <p:spPr>
-          <a:xfrm>
-            <a:off x="3939198" y="698156"/>
-            <a:ext cx="240127" cy="237401"/>
-          </a:xfrm>
-          <a:prstGeom prst="star5">
-            <a:avLst/>
-          </a:prstGeom>
-          <a:solidFill>
-            <a:srgbClr val="FF0000"/>
-          </a:solidFill>
-        </p:spPr>
-        <p:style>
-          <a:lnRef idx="0">
-            <a:schemeClr val="accent6"/>
-          </a:lnRef>
-          <a:fillRef idx="3">
-            <a:schemeClr val="accent6"/>
-          </a:fillRef>
-          <a:effectRef idx="3">
-            <a:schemeClr val="accent6"/>
-          </a:effectRef>
-          <a:fontRef idx="minor">
-            <a:schemeClr val="lt1"/>
-          </a:fontRef>
-        </p:style>
-        <p:txBody>
-          <a:bodyPr rtlCol="0" anchor="ctr"/>
-          <a:lstStyle/>
-          <a:p>
-            <a:pPr algn="ctr"/>
-            <a:endParaRPr lang="en-US"/>
-          </a:p>
-        </p:txBody>
-      </p:sp>
-      <p:sp>
-        <p:nvSpPr>
-          <p:cNvPr id="163" name="Star: 5 Points 162">
-            <a:extLst>
-              <a:ext uri="{FF2B5EF4-FFF2-40B4-BE49-F238E27FC236}">
-                <a16:creationId xmlns:a16="http://schemas.microsoft.com/office/drawing/2014/main" id="{5A8AA874-22A0-47E3-9231-EC2335AC5B56}"/>
-              </a:ext>
-            </a:extLst>
-          </p:cNvPr>
-          <p:cNvSpPr/>
-          <p:nvPr/>
-        </p:nvSpPr>
-        <p:spPr>
-          <a:xfrm>
-            <a:off x="4191807" y="700106"/>
-            <a:ext cx="240127" cy="237401"/>
-          </a:xfrm>
-          <a:prstGeom prst="star5">
-            <a:avLst/>
-          </a:prstGeom>
-          <a:solidFill>
-            <a:srgbClr val="FF0000"/>
-          </a:solidFill>
-        </p:spPr>
-        <p:style>
-          <a:lnRef idx="0">
-            <a:schemeClr val="accent6"/>
-          </a:lnRef>
-          <a:fillRef idx="3">
-            <a:schemeClr val="accent6"/>
-          </a:fillRef>
-          <a:effectRef idx="3">
-            <a:schemeClr val="accent6"/>
-          </a:effectRef>
-          <a:fontRef idx="minor">
-            <a:schemeClr val="lt1"/>
-          </a:fontRef>
-        </p:style>
-        <p:txBody>
-          <a:bodyPr rtlCol="0" anchor="ctr"/>
-          <a:lstStyle/>
-          <a:p>
-            <a:pPr algn="ctr"/>
-            <a:endParaRPr lang="en-US"/>
-          </a:p>
-        </p:txBody>
-      </p:sp>
-      <p:sp>
-        <p:nvSpPr>
-          <p:cNvPr id="164" name="Star: 5 Points 163">
-            <a:extLst>
-              <a:ext uri="{FF2B5EF4-FFF2-40B4-BE49-F238E27FC236}">
-                <a16:creationId xmlns:a16="http://schemas.microsoft.com/office/drawing/2014/main" id="{8F066CA2-9B88-4375-A8D8-801E5E56D198}"/>
-              </a:ext>
-            </a:extLst>
-          </p:cNvPr>
-          <p:cNvSpPr/>
-          <p:nvPr/>
-        </p:nvSpPr>
-        <p:spPr>
-          <a:xfrm>
-            <a:off x="4444416" y="702056"/>
-            <a:ext cx="240127" cy="237401"/>
-          </a:xfrm>
-          <a:prstGeom prst="star5">
-            <a:avLst/>
-          </a:prstGeom>
-          <a:solidFill>
-            <a:srgbClr val="FF0000"/>
-          </a:solidFill>
-        </p:spPr>
-        <p:style>
-          <a:lnRef idx="0">
-            <a:schemeClr val="accent6"/>
-          </a:lnRef>
-          <a:fillRef idx="3">
-            <a:schemeClr val="accent6"/>
-          </a:fillRef>
-          <a:effectRef idx="3">
-            <a:schemeClr val="accent6"/>
-          </a:effectRef>
-          <a:fontRef idx="minor">
-            <a:schemeClr val="lt1"/>
-          </a:fontRef>
-        </p:style>
-        <p:txBody>
-          <a:bodyPr rtlCol="0" anchor="ctr"/>
-          <a:lstStyle/>
-          <a:p>
-            <a:pPr algn="ctr"/>
-            <a:endParaRPr lang="en-US"/>
-          </a:p>
-        </p:txBody>
-      </p:sp>
-      <p:sp>
-        <p:nvSpPr>
-          <p:cNvPr id="165" name="Star: 5 Points 164">
-            <a:extLst>
-              <a:ext uri="{FF2B5EF4-FFF2-40B4-BE49-F238E27FC236}">
-                <a16:creationId xmlns:a16="http://schemas.microsoft.com/office/drawing/2014/main" id="{EE05EA2A-C0AD-48DB-9963-8B0BE84134F3}"/>
-              </a:ext>
-            </a:extLst>
-          </p:cNvPr>
-          <p:cNvSpPr/>
-          <p:nvPr/>
-        </p:nvSpPr>
-        <p:spPr>
-          <a:xfrm>
-            <a:off x="4697025" y="704006"/>
-            <a:ext cx="240127" cy="237401"/>
-          </a:xfrm>
-          <a:prstGeom prst="star5">
-            <a:avLst/>
-          </a:prstGeom>
-          <a:solidFill>
-            <a:srgbClr val="FF0000"/>
-          </a:solidFill>
-        </p:spPr>
-        <p:style>
-          <a:lnRef idx="0">
-            <a:schemeClr val="accent6"/>
-          </a:lnRef>
-          <a:fillRef idx="3">
-            <a:schemeClr val="accent6"/>
-          </a:fillRef>
-          <a:effectRef idx="3">
-            <a:schemeClr val="accent6"/>
-          </a:effectRef>
-          <a:fontRef idx="minor">
-            <a:schemeClr val="lt1"/>
-          </a:fontRef>
-        </p:style>
-        <p:txBody>
-          <a:bodyPr rtlCol="0" anchor="ctr"/>
-          <a:lstStyle/>
-          <a:p>
-            <a:pPr algn="ctr"/>
-            <a:endParaRPr lang="en-US"/>
-          </a:p>
-        </p:txBody>
-      </p:sp>
-      <p:sp>
-        <p:nvSpPr>
-          <p:cNvPr id="166" name="Star: 5 Points 165">
-            <a:extLst>
-              <a:ext uri="{FF2B5EF4-FFF2-40B4-BE49-F238E27FC236}">
-                <a16:creationId xmlns:a16="http://schemas.microsoft.com/office/drawing/2014/main" id="{F99F2342-B902-4E8B-A174-F91C8B13E8A9}"/>
-              </a:ext>
-            </a:extLst>
-          </p:cNvPr>
-          <p:cNvSpPr/>
-          <p:nvPr/>
-        </p:nvSpPr>
-        <p:spPr>
-          <a:xfrm>
-            <a:off x="4949634" y="705956"/>
-            <a:ext cx="240127" cy="237401"/>
-          </a:xfrm>
-          <a:prstGeom prst="star5">
-            <a:avLst/>
-          </a:prstGeom>
-          <a:solidFill>
-            <a:srgbClr val="FF0000"/>
-          </a:solidFill>
-        </p:spPr>
-        <p:style>
-          <a:lnRef idx="0">
-            <a:schemeClr val="accent6"/>
-          </a:lnRef>
-          <a:fillRef idx="3">
-            <a:schemeClr val="accent6"/>
-          </a:fillRef>
-          <a:effectRef idx="3">
-            <a:schemeClr val="accent6"/>
-          </a:effectRef>
-          <a:fontRef idx="minor">
-            <a:schemeClr val="lt1"/>
-          </a:fontRef>
-        </p:style>
-        <p:txBody>
-          <a:bodyPr rtlCol="0" anchor="ctr"/>
-          <a:lstStyle/>
-          <a:p>
-            <a:pPr algn="ctr"/>
-            <a:endParaRPr lang="en-US"/>
-          </a:p>
-        </p:txBody>
-      </p:sp>
-      <p:sp>
-        <p:nvSpPr>
-          <p:cNvPr id="167" name="Star: 5 Points 166">
-            <a:extLst>
-              <a:ext uri="{FF2B5EF4-FFF2-40B4-BE49-F238E27FC236}">
-                <a16:creationId xmlns:a16="http://schemas.microsoft.com/office/drawing/2014/main" id="{6F38E5BB-573D-498E-8EDE-BF94F0B5B0B8}"/>
-              </a:ext>
-            </a:extLst>
-          </p:cNvPr>
-          <p:cNvSpPr/>
-          <p:nvPr/>
-        </p:nvSpPr>
-        <p:spPr>
-          <a:xfrm>
-            <a:off x="5202243" y="707906"/>
-            <a:ext cx="240127" cy="237401"/>
-          </a:xfrm>
-          <a:prstGeom prst="star5">
-            <a:avLst/>
-          </a:prstGeom>
-          <a:solidFill>
-            <a:srgbClr val="FF0000"/>
-          </a:solidFill>
-        </p:spPr>
-        <p:style>
-          <a:lnRef idx="0">
-            <a:schemeClr val="accent6"/>
-          </a:lnRef>
-          <a:fillRef idx="3">
-            <a:schemeClr val="accent6"/>
-          </a:fillRef>
-          <a:effectRef idx="3">
-            <a:schemeClr val="accent6"/>
-          </a:effectRef>
-          <a:fontRef idx="minor">
-            <a:schemeClr val="lt1"/>
-          </a:fontRef>
-        </p:style>
-        <p:txBody>
-          <a:bodyPr rtlCol="0" anchor="ctr"/>
-          <a:lstStyle/>
-          <a:p>
-            <a:pPr algn="ctr"/>
-            <a:endParaRPr lang="en-US"/>
-          </a:p>
-        </p:txBody>
-      </p:sp>
-      <p:sp>
-        <p:nvSpPr>
-          <p:cNvPr id="168" name="Star: 5 Points 167">
-            <a:extLst>
-              <a:ext uri="{FF2B5EF4-FFF2-40B4-BE49-F238E27FC236}">
-                <a16:creationId xmlns:a16="http://schemas.microsoft.com/office/drawing/2014/main" id="{2C282A1F-4B9D-4ECD-ADC8-549EC692235C}"/>
-              </a:ext>
-            </a:extLst>
-          </p:cNvPr>
-          <p:cNvSpPr/>
-          <p:nvPr/>
-        </p:nvSpPr>
-        <p:spPr>
-          <a:xfrm>
-            <a:off x="5454852" y="709856"/>
-            <a:ext cx="240127" cy="237401"/>
-          </a:xfrm>
-          <a:prstGeom prst="star5">
-            <a:avLst/>
-          </a:prstGeom>
-          <a:solidFill>
-            <a:srgbClr val="FF0000"/>
-          </a:solidFill>
-        </p:spPr>
-        <p:style>
-          <a:lnRef idx="0">
-            <a:schemeClr val="accent6"/>
-          </a:lnRef>
-          <a:fillRef idx="3">
-            <a:schemeClr val="accent6"/>
-          </a:fillRef>
-          <a:effectRef idx="3">
-            <a:schemeClr val="accent6"/>
-          </a:effectRef>
-          <a:fontRef idx="minor">
-            <a:schemeClr val="lt1"/>
-          </a:fontRef>
-        </p:style>
-        <p:txBody>
-          <a:bodyPr rtlCol="0" anchor="ctr"/>
-          <a:lstStyle/>
-          <a:p>
-            <a:pPr algn="ctr"/>
-            <a:endParaRPr lang="en-US"/>
-          </a:p>
-        </p:txBody>
-      </p:sp>
-      <p:sp>
-        <p:nvSpPr>
-          <p:cNvPr id="169" name="Star: 5 Points 168">
-            <a:extLst>
-              <a:ext uri="{FF2B5EF4-FFF2-40B4-BE49-F238E27FC236}">
-                <a16:creationId xmlns:a16="http://schemas.microsoft.com/office/drawing/2014/main" id="{94D86F9F-9E79-4035-AD54-01BA6103631C}"/>
-              </a:ext>
-            </a:extLst>
-          </p:cNvPr>
-          <p:cNvSpPr/>
-          <p:nvPr/>
-        </p:nvSpPr>
-        <p:spPr>
-          <a:xfrm>
-            <a:off x="5707461" y="711806"/>
-            <a:ext cx="240127" cy="237401"/>
-          </a:xfrm>
-          <a:prstGeom prst="star5">
-            <a:avLst/>
-          </a:prstGeom>
-          <a:solidFill>
-            <a:srgbClr val="FF0000"/>
-          </a:solidFill>
-        </p:spPr>
-        <p:style>
-          <a:lnRef idx="0">
-            <a:schemeClr val="accent6"/>
-          </a:lnRef>
-          <a:fillRef idx="3">
-            <a:schemeClr val="accent6"/>
-          </a:fillRef>
-          <a:effectRef idx="3">
-            <a:schemeClr val="accent6"/>
-          </a:effectRef>
-          <a:fontRef idx="minor">
-            <a:schemeClr val="lt1"/>
-          </a:fontRef>
-        </p:style>
-        <p:txBody>
-          <a:bodyPr rtlCol="0" anchor="ctr"/>
-          <a:lstStyle/>
-          <a:p>
-            <a:pPr algn="ctr"/>
-            <a:endParaRPr lang="en-US"/>
-          </a:p>
-        </p:txBody>
-      </p:sp>
-      <p:sp>
-        <p:nvSpPr>
-          <p:cNvPr id="170" name="Star: 5 Points 169">
-            <a:extLst>
-              <a:ext uri="{FF2B5EF4-FFF2-40B4-BE49-F238E27FC236}">
-                <a16:creationId xmlns:a16="http://schemas.microsoft.com/office/drawing/2014/main" id="{B4B68FB9-A3EB-42E0-92F4-921A121B11A7}"/>
-              </a:ext>
-            </a:extLst>
-          </p:cNvPr>
-          <p:cNvSpPr/>
-          <p:nvPr/>
-        </p:nvSpPr>
-        <p:spPr>
-          <a:xfrm>
-            <a:off x="5960070" y="713756"/>
-            <a:ext cx="240127" cy="237401"/>
-          </a:xfrm>
-          <a:prstGeom prst="star5">
-            <a:avLst/>
-          </a:prstGeom>
-          <a:solidFill>
-            <a:srgbClr val="FF0000"/>
-          </a:solidFill>
-        </p:spPr>
-        <p:style>
-          <a:lnRef idx="0">
-            <a:schemeClr val="accent6"/>
-          </a:lnRef>
-          <a:fillRef idx="3">
-            <a:schemeClr val="accent6"/>
-          </a:fillRef>
-          <a:effectRef idx="3">
-            <a:schemeClr val="accent6"/>
-          </a:effectRef>
-          <a:fontRef idx="minor">
-            <a:schemeClr val="lt1"/>
-          </a:fontRef>
-        </p:style>
-        <p:txBody>
-          <a:bodyPr rtlCol="0" anchor="ctr"/>
-          <a:lstStyle/>
-          <a:p>
-            <a:pPr algn="ctr"/>
-            <a:endParaRPr lang="en-US"/>
-          </a:p>
-        </p:txBody>
-      </p:sp>
-      <p:sp>
-        <p:nvSpPr>
-          <p:cNvPr id="171" name="Star: 5 Points 170">
-            <a:extLst>
-              <a:ext uri="{FF2B5EF4-FFF2-40B4-BE49-F238E27FC236}">
-                <a16:creationId xmlns:a16="http://schemas.microsoft.com/office/drawing/2014/main" id="{4795F206-D8E5-4844-879F-B68BC78162B1}"/>
-              </a:ext>
-            </a:extLst>
-          </p:cNvPr>
-          <p:cNvSpPr/>
-          <p:nvPr/>
-        </p:nvSpPr>
-        <p:spPr>
-          <a:xfrm>
-            <a:off x="2916280" y="383693"/>
-            <a:ext cx="240127" cy="237401"/>
-          </a:xfrm>
-          <a:prstGeom prst="star5">
-            <a:avLst/>
-          </a:prstGeom>
-          <a:solidFill>
-            <a:srgbClr val="00B050"/>
-          </a:solidFill>
-        </p:spPr>
-        <p:style>
-          <a:lnRef idx="0">
-            <a:schemeClr val="accent6"/>
-          </a:lnRef>
-          <a:fillRef idx="3">
-            <a:schemeClr val="accent6"/>
-          </a:fillRef>
-          <a:effectRef idx="3">
-            <a:schemeClr val="accent6"/>
-          </a:effectRef>
-          <a:fontRef idx="minor">
-            <a:schemeClr val="lt1"/>
-          </a:fontRef>
-        </p:style>
-        <p:txBody>
-          <a:bodyPr rtlCol="0" anchor="ctr"/>
-          <a:lstStyle/>
-          <a:p>
-            <a:pPr algn="ctr"/>
-            <a:endParaRPr lang="en-US"/>
-          </a:p>
-        </p:txBody>
-      </p:sp>
-      <p:sp>
-        <p:nvSpPr>
-          <p:cNvPr id="172" name="Star: 5 Points 171">
-            <a:extLst>
-              <a:ext uri="{FF2B5EF4-FFF2-40B4-BE49-F238E27FC236}">
-                <a16:creationId xmlns:a16="http://schemas.microsoft.com/office/drawing/2014/main" id="{F5AD6D37-515B-4C7D-B546-101D0A1411D4}"/>
-              </a:ext>
-            </a:extLst>
-          </p:cNvPr>
-          <p:cNvSpPr/>
-          <p:nvPr/>
-        </p:nvSpPr>
-        <p:spPr>
-          <a:xfrm>
-            <a:off x="3659777" y="383692"/>
-            <a:ext cx="240127" cy="237401"/>
-          </a:xfrm>
-          <a:prstGeom prst="star5">
-            <a:avLst/>
-          </a:prstGeom>
-          <a:solidFill>
-            <a:srgbClr val="00B050"/>
-          </a:solidFill>
-        </p:spPr>
-        <p:style>
-          <a:lnRef idx="0">
-            <a:schemeClr val="accent6"/>
-          </a:lnRef>
-          <a:fillRef idx="3">
-            <a:schemeClr val="accent6"/>
-          </a:fillRef>
-          <a:effectRef idx="3">
-            <a:schemeClr val="accent6"/>
-          </a:effectRef>
-          <a:fontRef idx="minor">
-            <a:schemeClr val="lt1"/>
-          </a:fontRef>
-        </p:style>
-        <p:txBody>
-          <a:bodyPr rtlCol="0" anchor="ctr"/>
-          <a:lstStyle/>
-          <a:p>
-            <a:pPr algn="ctr"/>
-            <a:endParaRPr lang="en-US"/>
-          </a:p>
-        </p:txBody>
-      </p:sp>
-      <p:sp>
-        <p:nvSpPr>
-          <p:cNvPr id="173" name="Star: 5 Points 172">
-            <a:extLst>
-              <a:ext uri="{FF2B5EF4-FFF2-40B4-BE49-F238E27FC236}">
-                <a16:creationId xmlns:a16="http://schemas.microsoft.com/office/drawing/2014/main" id="{A6DF3005-3F31-4FAA-9506-096DA425161C}"/>
-              </a:ext>
-            </a:extLst>
-          </p:cNvPr>
-          <p:cNvSpPr/>
-          <p:nvPr/>
-        </p:nvSpPr>
-        <p:spPr>
-          <a:xfrm>
-            <a:off x="3167965" y="383692"/>
-            <a:ext cx="240127" cy="237401"/>
-          </a:xfrm>
-          <a:prstGeom prst="star5">
-            <a:avLst/>
-          </a:prstGeom>
-          <a:solidFill>
-            <a:srgbClr val="00B050"/>
-          </a:solidFill>
-        </p:spPr>
-        <p:style>
-          <a:lnRef idx="0">
-            <a:schemeClr val="accent6"/>
-          </a:lnRef>
-          <a:fillRef idx="3">
-            <a:schemeClr val="accent6"/>
-          </a:fillRef>
-          <a:effectRef idx="3">
-            <a:schemeClr val="accent6"/>
-          </a:effectRef>
-          <a:fontRef idx="minor">
-            <a:schemeClr val="lt1"/>
-          </a:fontRef>
-        </p:style>
-        <p:txBody>
-          <a:bodyPr rtlCol="0" anchor="ctr"/>
-          <a:lstStyle/>
-          <a:p>
-            <a:pPr algn="ctr"/>
-            <a:endParaRPr lang="en-US"/>
-          </a:p>
-        </p:txBody>
-      </p:sp>
-      <p:sp>
-        <p:nvSpPr>
-          <p:cNvPr id="174" name="Star: 5 Points 173">
-            <a:extLst>
-              <a:ext uri="{FF2B5EF4-FFF2-40B4-BE49-F238E27FC236}">
-                <a16:creationId xmlns:a16="http://schemas.microsoft.com/office/drawing/2014/main" id="{368C2486-56C3-4A0B-BA7C-2A116B0AA27A}"/>
-              </a:ext>
-            </a:extLst>
-          </p:cNvPr>
-          <p:cNvSpPr/>
-          <p:nvPr/>
-        </p:nvSpPr>
-        <p:spPr>
-          <a:xfrm>
-            <a:off x="3421498" y="383693"/>
-            <a:ext cx="240127" cy="237401"/>
-          </a:xfrm>
-          <a:prstGeom prst="star5">
-            <a:avLst/>
-          </a:prstGeom>
-          <a:solidFill>
-            <a:srgbClr val="00B050"/>
-          </a:solidFill>
-        </p:spPr>
-        <p:style>
-          <a:lnRef idx="0">
-            <a:schemeClr val="accent6"/>
-          </a:lnRef>
-          <a:fillRef idx="3">
-            <a:schemeClr val="accent6"/>
-          </a:fillRef>
-          <a:effectRef idx="3">
-            <a:schemeClr val="accent6"/>
-          </a:effectRef>
-          <a:fontRef idx="minor">
-            <a:schemeClr val="lt1"/>
-          </a:fontRef>
-        </p:style>
-        <p:txBody>
-          <a:bodyPr rtlCol="0" anchor="ctr"/>
-          <a:lstStyle/>
-          <a:p>
-            <a:pPr algn="ctr"/>
-            <a:endParaRPr lang="en-US"/>
-          </a:p>
-        </p:txBody>
-      </p:sp>
-      <p:sp>
-        <p:nvSpPr>
-          <p:cNvPr id="175" name="Star: 5 Points 174">
-            <a:extLst>
-              <a:ext uri="{FF2B5EF4-FFF2-40B4-BE49-F238E27FC236}">
-                <a16:creationId xmlns:a16="http://schemas.microsoft.com/office/drawing/2014/main" id="{782873AB-0A7D-4006-A15E-B0F9B356DFD5}"/>
-              </a:ext>
-            </a:extLst>
-          </p:cNvPr>
-          <p:cNvSpPr/>
-          <p:nvPr/>
-        </p:nvSpPr>
-        <p:spPr>
-          <a:xfrm>
-            <a:off x="3877934" y="383691"/>
-            <a:ext cx="240127" cy="237401"/>
-          </a:xfrm>
-          <a:prstGeom prst="star5">
-            <a:avLst/>
-          </a:prstGeom>
-          <a:solidFill>
-            <a:srgbClr val="00B050"/>
-          </a:solidFill>
-        </p:spPr>
-        <p:style>
-          <a:lnRef idx="0">
-            <a:schemeClr val="accent6"/>
-          </a:lnRef>
-          <a:fillRef idx="3">
-            <a:schemeClr val="accent6"/>
-          </a:fillRef>
-          <a:effectRef idx="3">
-            <a:schemeClr val="accent6"/>
-          </a:effectRef>
-          <a:fontRef idx="minor">
-            <a:schemeClr val="lt1"/>
-          </a:fontRef>
-        </p:style>
-        <p:txBody>
-          <a:bodyPr rtlCol="0" anchor="ctr"/>
-          <a:lstStyle/>
-          <a:p>
-            <a:pPr algn="ctr"/>
-            <a:endParaRPr lang="en-US"/>
-          </a:p>
-        </p:txBody>
-      </p:sp>
-      <p:sp>
-        <p:nvSpPr>
-          <p:cNvPr id="176" name="Star: 5 Points 175">
-            <a:extLst>
-              <a:ext uri="{FF2B5EF4-FFF2-40B4-BE49-F238E27FC236}">
-                <a16:creationId xmlns:a16="http://schemas.microsoft.com/office/drawing/2014/main" id="{5F230B37-A469-4748-BC76-478879E47D21}"/>
-              </a:ext>
-            </a:extLst>
-          </p:cNvPr>
-          <p:cNvSpPr/>
-          <p:nvPr/>
-        </p:nvSpPr>
-        <p:spPr>
-          <a:xfrm>
-            <a:off x="4122680" y="384953"/>
-            <a:ext cx="240127" cy="237401"/>
-          </a:xfrm>
-          <a:prstGeom prst="star5">
-            <a:avLst>
-              <a:gd name="adj" fmla="val 19098"/>
-              <a:gd name="hf" fmla="val 105146"/>
-              <a:gd name="vf" fmla="val 110557"/>
-            </a:avLst>
-          </a:prstGeom>
-          <a:solidFill>
-            <a:srgbClr val="00B050"/>
-          </a:solidFill>
-        </p:spPr>
-        <p:style>
-          <a:lnRef idx="0">
-            <a:schemeClr val="accent6"/>
-          </a:lnRef>
-          <a:fillRef idx="3">
-            <a:schemeClr val="accent6"/>
-          </a:fillRef>
-          <a:effectRef idx="3">
-            <a:schemeClr val="accent6"/>
-          </a:effectRef>
-          <a:fontRef idx="minor">
-            <a:schemeClr val="lt1"/>
-          </a:fontRef>
-        </p:style>
-        <p:txBody>
-          <a:bodyPr rtlCol="0" anchor="ctr"/>
-          <a:lstStyle/>
-          <a:p>
-            <a:pPr algn="ctr"/>
-            <a:endParaRPr lang="en-US"/>
-          </a:p>
-        </p:txBody>
-      </p:sp>
     </p:spTree>
     <p:extLst>
       <p:ext uri="{BB962C8B-B14F-4D97-AF65-F5344CB8AC3E}">
@@ -22792,6 +21038,23 @@
 </file>
 
 <file path=customXml/item1.xml><?xml version="1.0" encoding="utf-8"?>
+<?mso-contentType ?>
+<FormTemplates xmlns="http://schemas.microsoft.com/sharepoint/v3/contenttype/forms">
+  <Display>DocumentLibraryForm</Display>
+  <Edit>DocumentLibraryForm</Edit>
+  <New>DocumentLibraryForm</New>
+</FormTemplates>
+</file>
+
+<file path=customXml/item2.xml><?xml version="1.0" encoding="utf-8"?>
+<p:properties xmlns:p="http://schemas.microsoft.com/office/2006/metadata/properties" xmlns:xsi="http://www.w3.org/2001/XMLSchema-instance" xmlns:pc="http://schemas.microsoft.com/office/infopath/2007/PartnerControls">
+  <documentManagement>
+    <MediaServiceKeyPoints xmlns="71af3243-3dd4-4a8d-8c0d-dd76da1f02a5" xsi:nil="true"/>
+  </documentManagement>
+</p:properties>
+</file>
+
+<file path=customXml/item3.xml><?xml version="1.0" encoding="utf-8"?>
 <ct:contentTypeSchema xmlns:ct="http://schemas.microsoft.com/office/2006/metadata/contentType" xmlns:ma="http://schemas.microsoft.com/office/2006/metadata/properties/metaAttributes" ct:_="" ma:_="" ma:contentTypeName="Document" ma:contentTypeID="0x01010079F111ED35F8CC479449609E8A0923A6" ma:contentTypeVersion="11" ma:contentTypeDescription="Create a new document." ma:contentTypeScope="" ma:versionID="9677210f24a1be23c92c90fd886aa0aa">
   <xsd:schema xmlns:xsd="http://www.w3.org/2001/XMLSchema" xmlns:xs="http://www.w3.org/2001/XMLSchema" xmlns:p="http://schemas.microsoft.com/office/2006/metadata/properties" xmlns:ns2="71af3243-3dd4-4a8d-8c0d-dd76da1f02a5" xmlns:ns3="16c05727-aa75-4e4a-9b5f-8a80a1165891" targetNamespace="http://schemas.microsoft.com/office/2006/metadata/properties" ma:root="true" ma:fieldsID="60e05723c5c1908df1a1a4ebf11d344e" ns2:_="" ns3:_="">
     <xsd:import namespace="71af3243-3dd4-4a8d-8c0d-dd76da1f02a5"/>
@@ -23002,24 +21265,25 @@
 </ct:contentTypeSchema>
 </file>
 
-<file path=customXml/item2.xml><?xml version="1.0" encoding="utf-8"?>
-<p:properties xmlns:p="http://schemas.microsoft.com/office/2006/metadata/properties" xmlns:xsi="http://www.w3.org/2001/XMLSchema-instance" xmlns:pc="http://schemas.microsoft.com/office/infopath/2007/PartnerControls">
-  <documentManagement>
-    <MediaServiceKeyPoints xmlns="71af3243-3dd4-4a8d-8c0d-dd76da1f02a5" xsi:nil="true"/>
-  </documentManagement>
-</p:properties>
+<file path=customXml/itemProps1.xml><?xml version="1.0" encoding="utf-8"?>
+<ds:datastoreItem xmlns:ds="http://schemas.openxmlformats.org/officeDocument/2006/customXml" ds:itemID="{B0C07E3D-60A7-4F4E-8208-D9CCD01982CB}">
+  <ds:schemaRefs>
+    <ds:schemaRef ds:uri="http://schemas.microsoft.com/sharepoint/v3/contenttype/forms"/>
+  </ds:schemaRefs>
+</ds:datastoreItem>
 </file>
 
-<file path=customXml/item3.xml><?xml version="1.0" encoding="utf-8"?>
-<?mso-contentType ?>
-<FormTemplates xmlns="http://schemas.microsoft.com/sharepoint/v3/contenttype/forms">
-  <Display>DocumentLibraryForm</Display>
-  <Edit>DocumentLibraryForm</Edit>
-  <New>DocumentLibraryForm</New>
-</FormTemplates>
+<file path=customXml/itemProps2.xml><?xml version="1.0" encoding="utf-8"?>
+<ds:datastoreItem xmlns:ds="http://schemas.openxmlformats.org/officeDocument/2006/customXml" ds:itemID="{CEA9B47F-3DD8-4645-81DC-B88780643C07}">
+  <ds:schemaRefs>
+    <ds:schemaRef ds:uri="http://schemas.microsoft.com/office/2006/metadata/properties"/>
+    <ds:schemaRef ds:uri="http://schemas.microsoft.com/office/infopath/2007/PartnerControls"/>
+    <ds:schemaRef ds:uri="71af3243-3dd4-4a8d-8c0d-dd76da1f02a5"/>
+  </ds:schemaRefs>
+</ds:datastoreItem>
 </file>
 
-<file path=customXml/itemProps1.xml><?xml version="1.0" encoding="utf-8"?>
+<file path=customXml/itemProps3.xml><?xml version="1.0" encoding="utf-8"?>
 <ds:datastoreItem xmlns:ds="http://schemas.openxmlformats.org/officeDocument/2006/customXml" ds:itemID="{631071E6-22AE-499A-B09C-BF21CF5F7483}">
   <ds:schemaRefs>
     <ds:schemaRef ds:uri="http://schemas.microsoft.com/office/2006/metadata/contentType"/>
@@ -23036,22 +21300,4 @@
     <ds:schemaRef ds:uri="http://schemas.microsoft.com/internal/obd"/>
   </ds:schemaRefs>
 </ds:datastoreItem>
-</file>
-
-<file path=customXml/itemProps2.xml><?xml version="1.0" encoding="utf-8"?>
-<ds:datastoreItem xmlns:ds="http://schemas.openxmlformats.org/officeDocument/2006/customXml" ds:itemID="{CEA9B47F-3DD8-4645-81DC-B88780643C07}">
-  <ds:schemaRefs>
-    <ds:schemaRef ds:uri="http://schemas.microsoft.com/office/2006/metadata/properties"/>
-    <ds:schemaRef ds:uri="http://schemas.microsoft.com/office/infopath/2007/PartnerControls"/>
-    <ds:schemaRef ds:uri="71af3243-3dd4-4a8d-8c0d-dd76da1f02a5"/>
-  </ds:schemaRefs>
-</ds:datastoreItem>
-</file>
-
-<file path=customXml/itemProps3.xml><?xml version="1.0" encoding="utf-8"?>
-<ds:datastoreItem xmlns:ds="http://schemas.openxmlformats.org/officeDocument/2006/customXml" ds:itemID="{B0C07E3D-60A7-4F4E-8208-D9CCD01982CB}">
-  <ds:schemaRefs>
-    <ds:schemaRef ds:uri="http://schemas.microsoft.com/sharepoint/v3/contenttype/forms"/>
-  </ds:schemaRefs>
-</ds:datastoreItem>
 </file>
</xml_diff>